<commit_message>
Updated file after DT discussion on 240209
</commit_message>
<xml_diff>
--- a/dtls-for-sctp-design-team-report.pptx
+++ b/dtls-for-sctp-design-team-report.pptx
@@ -122,254 +122,6 @@
 </p:presentation>
 </file>
 
-<file path=ppt/revisionInfo.xml><?xml version="1.0" encoding="utf-8"?>
-<p1510:revInfo xmlns:a="http://schemas.openxmlformats.org/drawingml/2006/main" xmlns:r="http://schemas.openxmlformats.org/officeDocument/2006/relationships" xmlns:p1510="http://schemas.microsoft.com/office/powerpoint/2015/10/main">
-  <p1510:revLst>
-    <p1510:client id="{65FE58C0-ECD1-1042-825B-772B961FD0E1}" v="2" dt="2024-02-07T11:48:32.201"/>
-  </p1510:revLst>
-</p1510:revInfo>
-</file>
-
-<file path=ppt/changesInfos/changesInfo1.xml><?xml version="1.0" encoding="utf-8"?>
-<pc:chgInfo xmlns:a="http://schemas.openxmlformats.org/drawingml/2006/main" xmlns:r="http://schemas.openxmlformats.org/officeDocument/2006/relationships" xmlns:ac="http://schemas.microsoft.com/office/drawing/2013/main/command" xmlns:pc="http://schemas.microsoft.com/office/powerpoint/2013/main/command">
-  <pc:docChgLst>
-    <pc:chgData name="Magnus Westerlund" userId="d1f911fd-f2d9-4af0-9810-372c2434ea9e" providerId="ADAL" clId="{65FE58C0-ECD1-1042-825B-772B961FD0E1}"/>
-    <pc:docChg chg="undo custSel addSld delSld modSld">
-      <pc:chgData name="Magnus Westerlund" userId="d1f911fd-f2d9-4af0-9810-372c2434ea9e" providerId="ADAL" clId="{65FE58C0-ECD1-1042-825B-772B961FD0E1}" dt="2024-02-08T14:13:55.203" v="3419" actId="313"/>
-      <pc:docMkLst>
-        <pc:docMk/>
-      </pc:docMkLst>
-      <pc:sldChg chg="del">
-        <pc:chgData name="Magnus Westerlund" userId="d1f911fd-f2d9-4af0-9810-372c2434ea9e" providerId="ADAL" clId="{65FE58C0-ECD1-1042-825B-772B961FD0E1}" dt="2024-02-07T11:48:32.201" v="1" actId="2696"/>
-        <pc:sldMkLst>
-          <pc:docMk/>
-          <pc:sldMk cId="1425057228" sldId="256"/>
-        </pc:sldMkLst>
-      </pc:sldChg>
-      <pc:sldChg chg="del">
-        <pc:chgData name="Magnus Westerlund" userId="d1f911fd-f2d9-4af0-9810-372c2434ea9e" providerId="ADAL" clId="{65FE58C0-ECD1-1042-825B-772B961FD0E1}" dt="2024-02-07T11:48:32.201" v="1" actId="2696"/>
-        <pc:sldMkLst>
-          <pc:docMk/>
-          <pc:sldMk cId="2635833327" sldId="257"/>
-        </pc:sldMkLst>
-      </pc:sldChg>
-      <pc:sldChg chg="add">
-        <pc:chgData name="Magnus Westerlund" userId="d1f911fd-f2d9-4af0-9810-372c2434ea9e" providerId="ADAL" clId="{65FE58C0-ECD1-1042-825B-772B961FD0E1}" dt="2024-02-07T11:48:28.351" v="0"/>
-        <pc:sldMkLst>
-          <pc:docMk/>
-          <pc:sldMk cId="4182113765" sldId="258"/>
-        </pc:sldMkLst>
-      </pc:sldChg>
-      <pc:sldChg chg="add">
-        <pc:chgData name="Magnus Westerlund" userId="d1f911fd-f2d9-4af0-9810-372c2434ea9e" providerId="ADAL" clId="{65FE58C0-ECD1-1042-825B-772B961FD0E1}" dt="2024-02-07T11:48:28.351" v="0"/>
-        <pc:sldMkLst>
-          <pc:docMk/>
-          <pc:sldMk cId="2099562454" sldId="259"/>
-        </pc:sldMkLst>
-      </pc:sldChg>
-      <pc:sldChg chg="add">
-        <pc:chgData name="Magnus Westerlund" userId="d1f911fd-f2d9-4af0-9810-372c2434ea9e" providerId="ADAL" clId="{65FE58C0-ECD1-1042-825B-772B961FD0E1}" dt="2024-02-07T11:48:28.351" v="0"/>
-        <pc:sldMkLst>
-          <pc:docMk/>
-          <pc:sldMk cId="2030072273" sldId="260"/>
-        </pc:sldMkLst>
-      </pc:sldChg>
-      <pc:sldChg chg="modSp add mod">
-        <pc:chgData name="Magnus Westerlund" userId="d1f911fd-f2d9-4af0-9810-372c2434ea9e" providerId="ADAL" clId="{65FE58C0-ECD1-1042-825B-772B961FD0E1}" dt="2024-02-07T16:31:36.426" v="47" actId="313"/>
-        <pc:sldMkLst>
-          <pc:docMk/>
-          <pc:sldMk cId="2811002979" sldId="261"/>
-        </pc:sldMkLst>
-        <pc:spChg chg="mod">
-          <ac:chgData name="Magnus Westerlund" userId="d1f911fd-f2d9-4af0-9810-372c2434ea9e" providerId="ADAL" clId="{65FE58C0-ECD1-1042-825B-772B961FD0E1}" dt="2024-02-07T16:31:36.426" v="47" actId="313"/>
-          <ac:spMkLst>
-            <pc:docMk/>
-            <pc:sldMk cId="2811002979" sldId="261"/>
-            <ac:spMk id="3" creationId="{BE1E9D3F-CD6F-59F4-56AE-6A578804C46C}"/>
-          </ac:spMkLst>
-        </pc:spChg>
-      </pc:sldChg>
-      <pc:sldChg chg="add">
-        <pc:chgData name="Magnus Westerlund" userId="d1f911fd-f2d9-4af0-9810-372c2434ea9e" providerId="ADAL" clId="{65FE58C0-ECD1-1042-825B-772B961FD0E1}" dt="2024-02-07T11:48:28.351" v="0"/>
-        <pc:sldMkLst>
-          <pc:docMk/>
-          <pc:sldMk cId="3167921708" sldId="262"/>
-        </pc:sldMkLst>
-      </pc:sldChg>
-      <pc:sldChg chg="modSp add mod">
-        <pc:chgData name="Magnus Westerlund" userId="d1f911fd-f2d9-4af0-9810-372c2434ea9e" providerId="ADAL" clId="{65FE58C0-ECD1-1042-825B-772B961FD0E1}" dt="2024-02-08T13:02:10.410" v="2047" actId="20577"/>
-        <pc:sldMkLst>
-          <pc:docMk/>
-          <pc:sldMk cId="1711902471" sldId="263"/>
-        </pc:sldMkLst>
-        <pc:spChg chg="mod">
-          <ac:chgData name="Magnus Westerlund" userId="d1f911fd-f2d9-4af0-9810-372c2434ea9e" providerId="ADAL" clId="{65FE58C0-ECD1-1042-825B-772B961FD0E1}" dt="2024-02-08T13:02:10.410" v="2047" actId="20577"/>
-          <ac:spMkLst>
-            <pc:docMk/>
-            <pc:sldMk cId="1711902471" sldId="263"/>
-            <ac:spMk id="3" creationId="{5B3663F4-D611-29DF-D33B-4C185C21F0AE}"/>
-          </ac:spMkLst>
-        </pc:spChg>
-      </pc:sldChg>
-      <pc:sldChg chg="modSp add mod">
-        <pc:chgData name="Magnus Westerlund" userId="d1f911fd-f2d9-4af0-9810-372c2434ea9e" providerId="ADAL" clId="{65FE58C0-ECD1-1042-825B-772B961FD0E1}" dt="2024-02-08T13:02:38.866" v="2048" actId="20577"/>
-        <pc:sldMkLst>
-          <pc:docMk/>
-          <pc:sldMk cId="273416605" sldId="264"/>
-        </pc:sldMkLst>
-        <pc:spChg chg="mod">
-          <ac:chgData name="Magnus Westerlund" userId="d1f911fd-f2d9-4af0-9810-372c2434ea9e" providerId="ADAL" clId="{65FE58C0-ECD1-1042-825B-772B961FD0E1}" dt="2024-02-08T13:02:38.866" v="2048" actId="20577"/>
-          <ac:spMkLst>
-            <pc:docMk/>
-            <pc:sldMk cId="273416605" sldId="264"/>
-            <ac:spMk id="3" creationId="{7FA46C5C-8DCD-CB8D-A75B-CCEC202C15A4}"/>
-          </ac:spMkLst>
-        </pc:spChg>
-      </pc:sldChg>
-      <pc:sldChg chg="modSp new mod">
-        <pc:chgData name="Magnus Westerlund" userId="d1f911fd-f2d9-4af0-9810-372c2434ea9e" providerId="ADAL" clId="{65FE58C0-ECD1-1042-825B-772B961FD0E1}" dt="2024-02-08T13:23:26.877" v="2436" actId="20577"/>
-        <pc:sldMkLst>
-          <pc:docMk/>
-          <pc:sldMk cId="1639328033" sldId="265"/>
-        </pc:sldMkLst>
-        <pc:spChg chg="mod">
-          <ac:chgData name="Magnus Westerlund" userId="d1f911fd-f2d9-4af0-9810-372c2434ea9e" providerId="ADAL" clId="{65FE58C0-ECD1-1042-825B-772B961FD0E1}" dt="2024-02-07T16:33:00.995" v="52" actId="27636"/>
-          <ac:spMkLst>
-            <pc:docMk/>
-            <pc:sldMk cId="1639328033" sldId="265"/>
-            <ac:spMk id="2" creationId="{51350095-F72E-F3CA-5177-0D8D0F4531DB}"/>
-          </ac:spMkLst>
-        </pc:spChg>
-        <pc:spChg chg="mod">
-          <ac:chgData name="Magnus Westerlund" userId="d1f911fd-f2d9-4af0-9810-372c2434ea9e" providerId="ADAL" clId="{65FE58C0-ECD1-1042-825B-772B961FD0E1}" dt="2024-02-08T13:23:26.877" v="2436" actId="20577"/>
-          <ac:spMkLst>
-            <pc:docMk/>
-            <pc:sldMk cId="1639328033" sldId="265"/>
-            <ac:spMk id="3" creationId="{02E58B88-D52D-C1EB-05DA-225E50348C01}"/>
-          </ac:spMkLst>
-        </pc:spChg>
-      </pc:sldChg>
-      <pc:sldChg chg="modSp new mod">
-        <pc:chgData name="Magnus Westerlund" userId="d1f911fd-f2d9-4af0-9810-372c2434ea9e" providerId="ADAL" clId="{65FE58C0-ECD1-1042-825B-772B961FD0E1}" dt="2024-02-08T13:25:50.244" v="2473" actId="20577"/>
-        <pc:sldMkLst>
-          <pc:docMk/>
-          <pc:sldMk cId="2402584127" sldId="266"/>
-        </pc:sldMkLst>
-        <pc:spChg chg="mod">
-          <ac:chgData name="Magnus Westerlund" userId="d1f911fd-f2d9-4af0-9810-372c2434ea9e" providerId="ADAL" clId="{65FE58C0-ECD1-1042-825B-772B961FD0E1}" dt="2024-02-07T16:33:19.955" v="57" actId="27636"/>
-          <ac:spMkLst>
-            <pc:docMk/>
-            <pc:sldMk cId="2402584127" sldId="266"/>
-            <ac:spMk id="2" creationId="{DB3F2B3D-711D-D262-F353-211DA3487E52}"/>
-          </ac:spMkLst>
-        </pc:spChg>
-        <pc:spChg chg="mod">
-          <ac:chgData name="Magnus Westerlund" userId="d1f911fd-f2d9-4af0-9810-372c2434ea9e" providerId="ADAL" clId="{65FE58C0-ECD1-1042-825B-772B961FD0E1}" dt="2024-02-08T13:25:50.244" v="2473" actId="20577"/>
-          <ac:spMkLst>
-            <pc:docMk/>
-            <pc:sldMk cId="2402584127" sldId="266"/>
-            <ac:spMk id="3" creationId="{90801EEA-BAAF-063C-9095-693C0B68320E}"/>
-          </ac:spMkLst>
-        </pc:spChg>
-      </pc:sldChg>
-      <pc:sldChg chg="modSp new mod">
-        <pc:chgData name="Magnus Westerlund" userId="d1f911fd-f2d9-4af0-9810-372c2434ea9e" providerId="ADAL" clId="{65FE58C0-ECD1-1042-825B-772B961FD0E1}" dt="2024-02-08T13:25:35.895" v="2438" actId="27636"/>
-        <pc:sldMkLst>
-          <pc:docMk/>
-          <pc:sldMk cId="3259278772" sldId="267"/>
-        </pc:sldMkLst>
-        <pc:spChg chg="mod">
-          <ac:chgData name="Magnus Westerlund" userId="d1f911fd-f2d9-4af0-9810-372c2434ea9e" providerId="ADAL" clId="{65FE58C0-ECD1-1042-825B-772B961FD0E1}" dt="2024-02-07T16:33:32.835" v="62" actId="27636"/>
-          <ac:spMkLst>
-            <pc:docMk/>
-            <pc:sldMk cId="3259278772" sldId="267"/>
-            <ac:spMk id="2" creationId="{2C5E61FB-1A31-48B6-A4B8-BA9841BEDC98}"/>
-          </ac:spMkLst>
-        </pc:spChg>
-        <pc:spChg chg="mod">
-          <ac:chgData name="Magnus Westerlund" userId="d1f911fd-f2d9-4af0-9810-372c2434ea9e" providerId="ADAL" clId="{65FE58C0-ECD1-1042-825B-772B961FD0E1}" dt="2024-02-08T13:25:35.895" v="2438" actId="27636"/>
-          <ac:spMkLst>
-            <pc:docMk/>
-            <pc:sldMk cId="3259278772" sldId="267"/>
-            <ac:spMk id="3" creationId="{85C250AE-823E-D90B-713D-4275A3763199}"/>
-          </ac:spMkLst>
-        </pc:spChg>
-      </pc:sldChg>
-      <pc:sldChg chg="addSp delSp modSp new add del mod modClrScheme chgLayout">
-        <pc:chgData name="Magnus Westerlund" userId="d1f911fd-f2d9-4af0-9810-372c2434ea9e" providerId="ADAL" clId="{65FE58C0-ECD1-1042-825B-772B961FD0E1}" dt="2024-02-08T13:54:50.013" v="2598" actId="2696"/>
-        <pc:sldMkLst>
-          <pc:docMk/>
-          <pc:sldMk cId="2022855545" sldId="268"/>
-        </pc:sldMkLst>
-        <pc:spChg chg="mod ord">
-          <ac:chgData name="Magnus Westerlund" userId="d1f911fd-f2d9-4af0-9810-372c2434ea9e" providerId="ADAL" clId="{65FE58C0-ECD1-1042-825B-772B961FD0E1}" dt="2024-02-08T09:19:34.516" v="1214" actId="700"/>
-          <ac:spMkLst>
-            <pc:docMk/>
-            <pc:sldMk cId="2022855545" sldId="268"/>
-            <ac:spMk id="2" creationId="{B085C617-7B8D-969A-CED4-21224332DDC7}"/>
-          </ac:spMkLst>
-        </pc:spChg>
-        <pc:spChg chg="del mod ord">
-          <ac:chgData name="Magnus Westerlund" userId="d1f911fd-f2d9-4af0-9810-372c2434ea9e" providerId="ADAL" clId="{65FE58C0-ECD1-1042-825B-772B961FD0E1}" dt="2024-02-08T09:19:34.516" v="1214" actId="700"/>
-          <ac:spMkLst>
-            <pc:docMk/>
-            <pc:sldMk cId="2022855545" sldId="268"/>
-            <ac:spMk id="3" creationId="{75303524-E016-8B06-8427-2F28AA787992}"/>
-          </ac:spMkLst>
-        </pc:spChg>
-        <pc:spChg chg="add mod ord">
-          <ac:chgData name="Magnus Westerlund" userId="d1f911fd-f2d9-4af0-9810-372c2434ea9e" providerId="ADAL" clId="{65FE58C0-ECD1-1042-825B-772B961FD0E1}" dt="2024-02-08T09:21:21.751" v="1402" actId="14100"/>
-          <ac:spMkLst>
-            <pc:docMk/>
-            <pc:sldMk cId="2022855545" sldId="268"/>
-            <ac:spMk id="4" creationId="{080F0E8A-1203-5EF0-CADD-9B0CAFE0B98B}"/>
-          </ac:spMkLst>
-        </pc:spChg>
-        <pc:spChg chg="add mod ord">
-          <ac:chgData name="Magnus Westerlund" userId="d1f911fd-f2d9-4af0-9810-372c2434ea9e" providerId="ADAL" clId="{65FE58C0-ECD1-1042-825B-772B961FD0E1}" dt="2024-02-08T12:46:39.776" v="1807" actId="20577"/>
-          <ac:spMkLst>
-            <pc:docMk/>
-            <pc:sldMk cId="2022855545" sldId="268"/>
-            <ac:spMk id="5" creationId="{EC227CA4-BCFD-537E-BAFC-227ABF60ADE2}"/>
-          </ac:spMkLst>
-        </pc:spChg>
-        <pc:spChg chg="add mod">
-          <ac:chgData name="Magnus Westerlund" userId="d1f911fd-f2d9-4af0-9810-372c2434ea9e" providerId="ADAL" clId="{65FE58C0-ECD1-1042-825B-772B961FD0E1}" dt="2024-02-08T13:30:15.887" v="2476" actId="1076"/>
-          <ac:spMkLst>
-            <pc:docMk/>
-            <pc:sldMk cId="2022855545" sldId="268"/>
-            <ac:spMk id="6" creationId="{08E37DBD-8C45-CAD5-94E2-CE096F0884D5}"/>
-          </ac:spMkLst>
-        </pc:spChg>
-      </pc:sldChg>
-      <pc:sldChg chg="modSp new mod">
-        <pc:chgData name="Magnus Westerlund" userId="d1f911fd-f2d9-4af0-9810-372c2434ea9e" providerId="ADAL" clId="{65FE58C0-ECD1-1042-825B-772B961FD0E1}" dt="2024-02-08T14:13:55.203" v="3419" actId="313"/>
-        <pc:sldMkLst>
-          <pc:docMk/>
-          <pc:sldMk cId="789346574" sldId="269"/>
-        </pc:sldMkLst>
-        <pc:spChg chg="mod">
-          <ac:chgData name="Magnus Westerlund" userId="d1f911fd-f2d9-4af0-9810-372c2434ea9e" providerId="ADAL" clId="{65FE58C0-ECD1-1042-825B-772B961FD0E1}" dt="2024-02-08T13:30:36.776" v="2512" actId="20577"/>
-          <ac:spMkLst>
-            <pc:docMk/>
-            <pc:sldMk cId="789346574" sldId="269"/>
-            <ac:spMk id="2" creationId="{7F6347F7-BC35-2B2E-D9BA-0C1D078D92F5}"/>
-          </ac:spMkLst>
-        </pc:spChg>
-        <pc:spChg chg="mod">
-          <ac:chgData name="Magnus Westerlund" userId="d1f911fd-f2d9-4af0-9810-372c2434ea9e" providerId="ADAL" clId="{65FE58C0-ECD1-1042-825B-772B961FD0E1}" dt="2024-02-08T14:13:55.203" v="3419" actId="313"/>
-          <ac:spMkLst>
-            <pc:docMk/>
-            <pc:sldMk cId="789346574" sldId="269"/>
-            <ac:spMk id="3" creationId="{84654B2B-4844-BED8-3119-6D0BEC4A060C}"/>
-          </ac:spMkLst>
-        </pc:spChg>
-      </pc:sldChg>
-    </pc:docChg>
-  </pc:docChgLst>
-</pc:chgInfo>
-</file>
-
 <file path=ppt/slideLayouts/slideLayout1.xml><?xml version="1.0" encoding="utf-8"?>
 <p:sldLayout xmlns:a="http://schemas.openxmlformats.org/drawingml/2006/main" xmlns:r="http://schemas.openxmlformats.org/officeDocument/2006/relationships" xmlns:p="http://schemas.openxmlformats.org/presentationml/2006/main" type="title" preserve="1">
   <p:cSld name="Title Slide">
@@ -519,7 +271,7 @@
           <a:p>
             <a:fld id="{F590127B-264E-4C46-AF4D-D678C54EFD2B}" type="datetimeFigureOut">
               <a:rPr lang="en-US" smtClean="0"/>
-              <a:t>2/7/24</a:t>
+              <a:t>2/9/24</a:t>
             </a:fld>
             <a:endParaRPr lang="en-US"/>
           </a:p>
@@ -719,7 +471,7 @@
           <a:p>
             <a:fld id="{F590127B-264E-4C46-AF4D-D678C54EFD2B}" type="datetimeFigureOut">
               <a:rPr lang="en-US" smtClean="0"/>
-              <a:t>2/7/24</a:t>
+              <a:t>2/9/24</a:t>
             </a:fld>
             <a:endParaRPr lang="en-US"/>
           </a:p>
@@ -929,7 +681,7 @@
           <a:p>
             <a:fld id="{F590127B-264E-4C46-AF4D-D678C54EFD2B}" type="datetimeFigureOut">
               <a:rPr lang="en-US" smtClean="0"/>
-              <a:t>2/7/24</a:t>
+              <a:t>2/9/24</a:t>
             </a:fld>
             <a:endParaRPr lang="en-US"/>
           </a:p>
@@ -1129,7 +881,7 @@
           <a:p>
             <a:fld id="{F590127B-264E-4C46-AF4D-D678C54EFD2B}" type="datetimeFigureOut">
               <a:rPr lang="en-US" smtClean="0"/>
-              <a:t>2/7/24</a:t>
+              <a:t>2/9/24</a:t>
             </a:fld>
             <a:endParaRPr lang="en-US"/>
           </a:p>
@@ -1405,7 +1157,7 @@
           <a:p>
             <a:fld id="{F590127B-264E-4C46-AF4D-D678C54EFD2B}" type="datetimeFigureOut">
               <a:rPr lang="en-US" smtClean="0"/>
-              <a:t>2/7/24</a:t>
+              <a:t>2/9/24</a:t>
             </a:fld>
             <a:endParaRPr lang="en-US"/>
           </a:p>
@@ -1673,7 +1425,7 @@
           <a:p>
             <a:fld id="{F590127B-264E-4C46-AF4D-D678C54EFD2B}" type="datetimeFigureOut">
               <a:rPr lang="en-US" smtClean="0"/>
-              <a:t>2/7/24</a:t>
+              <a:t>2/9/24</a:t>
             </a:fld>
             <a:endParaRPr lang="en-US"/>
           </a:p>
@@ -2088,7 +1840,7 @@
           <a:p>
             <a:fld id="{F590127B-264E-4C46-AF4D-D678C54EFD2B}" type="datetimeFigureOut">
               <a:rPr lang="en-US" smtClean="0"/>
-              <a:t>2/7/24</a:t>
+              <a:t>2/9/24</a:t>
             </a:fld>
             <a:endParaRPr lang="en-US"/>
           </a:p>
@@ -2230,7 +1982,7 @@
           <a:p>
             <a:fld id="{F590127B-264E-4C46-AF4D-D678C54EFD2B}" type="datetimeFigureOut">
               <a:rPr lang="en-US" smtClean="0"/>
-              <a:t>2/7/24</a:t>
+              <a:t>2/9/24</a:t>
             </a:fld>
             <a:endParaRPr lang="en-US"/>
           </a:p>
@@ -2343,7 +2095,7 @@
           <a:p>
             <a:fld id="{F590127B-264E-4C46-AF4D-D678C54EFD2B}" type="datetimeFigureOut">
               <a:rPr lang="en-US" smtClean="0"/>
-              <a:t>2/7/24</a:t>
+              <a:t>2/9/24</a:t>
             </a:fld>
             <a:endParaRPr lang="en-US"/>
           </a:p>
@@ -2656,7 +2408,7 @@
           <a:p>
             <a:fld id="{F590127B-264E-4C46-AF4D-D678C54EFD2B}" type="datetimeFigureOut">
               <a:rPr lang="en-US" smtClean="0"/>
-              <a:t>2/7/24</a:t>
+              <a:t>2/9/24</a:t>
             </a:fld>
             <a:endParaRPr lang="en-US"/>
           </a:p>
@@ -2945,7 +2697,7 @@
           <a:p>
             <a:fld id="{F590127B-264E-4C46-AF4D-D678C54EFD2B}" type="datetimeFigureOut">
               <a:rPr lang="en-US" smtClean="0"/>
-              <a:t>2/7/24</a:t>
+              <a:t>2/9/24</a:t>
             </a:fld>
             <a:endParaRPr lang="en-US"/>
           </a:p>
@@ -3188,7 +2940,7 @@
           <a:p>
             <a:fld id="{F590127B-264E-4C46-AF4D-D678C54EFD2B}" type="datetimeFigureOut">
               <a:rPr lang="en-US" smtClean="0"/>
-              <a:t>2/7/24</a:t>
+              <a:t>2/9/24</a:t>
             </a:fld>
             <a:endParaRPr lang="en-US"/>
           </a:p>
@@ -3627,14 +3379,14 @@
           <a:lstStyle/>
           <a:p>
             <a:r>
-              <a:rPr lang="en-US" dirty="0"/>
+              <a:rPr lang="en-US"/>
               <a:t>DTLS based Security for SCTP</a:t>
             </a:r>
             <a:br>
-              <a:rPr lang="en-US" dirty="0"/>
+              <a:rPr lang="en-US"/>
             </a:br>
             <a:r>
-              <a:rPr lang="en-US" dirty="0"/>
+              <a:rPr lang="en-US"/>
               <a:t>Report from Design Team</a:t>
             </a:r>
           </a:p>
@@ -3662,7 +3414,7 @@
           <a:lstStyle/>
           <a:p>
             <a:r>
-              <a:rPr lang="en-US" dirty="0"/>
+              <a:rPr lang="en-US"/>
               <a:t>2024-02-02</a:t>
             </a:r>
           </a:p>
@@ -3722,23 +3474,23 @@
           <a:lstStyle/>
           <a:p>
             <a:r>
-              <a:rPr lang="en-US" dirty="0"/>
+              <a:rPr lang="en-US"/>
               <a:t>Michael </a:t>
             </a:r>
             <a:r>
-              <a:rPr lang="en-US" dirty="0" err="1"/>
+              <a:rPr lang="en-US" err="1"/>
               <a:t>Tüxen’s</a:t>
             </a:r>
             <a:r>
-              <a:rPr lang="en-US" dirty="0"/>
+              <a:rPr lang="en-US"/>
               <a:t> and Hannes </a:t>
             </a:r>
             <a:r>
-              <a:rPr lang="en-US" dirty="0" err="1"/>
+              <a:rPr lang="en-US" err="1"/>
               <a:t>Tschofenig’s</a:t>
             </a:r>
             <a:r>
-              <a:rPr lang="en-US" dirty="0"/>
+              <a:rPr lang="en-US"/>
               <a:t> DTLS over SCTP proposal</a:t>
             </a:r>
           </a:p>
@@ -3776,7 +3528,7 @@
             <a:pPr lvl="1"/>
             <a:r>
               <a:rPr lang="en-US" dirty="0"/>
-              <a:t>Requires in-order delivery on streams</a:t>
+              <a:t>Requires in-order reliable delivery on streams</a:t>
             </a:r>
           </a:p>
           <a:p>
@@ -3899,7 +3651,7 @@
           <a:lstStyle/>
           <a:p>
             <a:r>
-              <a:rPr lang="en-US" dirty="0"/>
+              <a:rPr lang="en-US"/>
               <a:t>Choosing a Solution</a:t>
             </a:r>
           </a:p>
@@ -3996,7 +3748,7 @@
           </a:p>
           <a:p>
             <a:r>
-              <a:rPr lang="en-GB" dirty="0"/>
+              <a:rPr lang="en-GB"/>
               <a:t>Else </a:t>
             </a:r>
           </a:p>
@@ -4077,13 +3829,13 @@
           <a:lstStyle/>
           <a:p>
             <a:r>
-              <a:rPr lang="en-GB" sz="4400" b="0" dirty="0">
+              <a:rPr lang="en-GB" sz="4400" b="0">
                 <a:effectLst/>
                 <a:latin typeface="Calibri" panose="020F0502020204030204" pitchFamily="34" charset="0"/>
               </a:rPr>
               <a:t>Design Team Participants </a:t>
             </a:r>
-            <a:endParaRPr lang="en-GB" dirty="0">
+            <a:endParaRPr lang="en-GB">
               <a:effectLst/>
             </a:endParaRPr>
           </a:p>
@@ -4111,7 +3863,7 @@
           <a:lstStyle/>
           <a:p>
             <a:r>
-              <a:rPr lang="en-GB" sz="2000" dirty="0">
+              <a:rPr lang="en-GB" sz="2000">
                 <a:solidFill>
                   <a:srgbClr val="212121"/>
                 </a:solidFill>
@@ -4123,7 +3875,7 @@
           </a:p>
           <a:p>
             <a:r>
-              <a:rPr lang="en-GB" sz="2000" dirty="0">
+              <a:rPr lang="en-GB" sz="2000">
                 <a:solidFill>
                   <a:srgbClr val="212121"/>
                 </a:solidFill>
@@ -4135,7 +3887,7 @@
           </a:p>
           <a:p>
             <a:r>
-              <a:rPr lang="en-GB" sz="2000" dirty="0">
+              <a:rPr lang="en-GB" sz="2000">
                 <a:solidFill>
                   <a:srgbClr val="212121"/>
                 </a:solidFill>
@@ -4145,7 +3897,7 @@
               <a:t>John </a:t>
             </a:r>
             <a:r>
-              <a:rPr lang="en-GB" sz="2000" dirty="0" err="1">
+              <a:rPr lang="en-GB" sz="2000" err="1">
                 <a:solidFill>
                   <a:srgbClr val="212121"/>
                 </a:solidFill>
@@ -4154,7 +3906,7 @@
               </a:rPr>
               <a:t>Mattsson</a:t>
             </a:r>
-            <a:endParaRPr lang="en-GB" sz="2000" dirty="0">
+            <a:endParaRPr lang="en-GB" sz="2000">
               <a:solidFill>
                 <a:srgbClr val="212121"/>
               </a:solidFill>
@@ -4164,7 +3916,7 @@
           </a:p>
           <a:p>
             <a:r>
-              <a:rPr lang="en-GB" sz="2000" dirty="0">
+              <a:rPr lang="en-GB" sz="2000">
                 <a:solidFill>
                   <a:srgbClr val="212121"/>
                 </a:solidFill>
@@ -4174,7 +3926,7 @@
               <a:t>Claudio </a:t>
             </a:r>
             <a:r>
-              <a:rPr lang="en-GB" sz="2000" dirty="0" err="1">
+              <a:rPr lang="en-GB" sz="2000" err="1">
                 <a:solidFill>
                   <a:srgbClr val="212121"/>
                 </a:solidFill>
@@ -4184,7 +3936,7 @@
               <a:t>Porfiri</a:t>
             </a:r>
             <a:r>
-              <a:rPr lang="en-GB" sz="2000" dirty="0">
+              <a:rPr lang="en-GB" sz="2000">
                 <a:solidFill>
                   <a:srgbClr val="212121"/>
                 </a:solidFill>
@@ -4196,7 +3948,7 @@
           </a:p>
           <a:p>
             <a:r>
-              <a:rPr lang="en-GB" sz="2000" dirty="0" err="1">
+              <a:rPr lang="en-GB" sz="2000" err="1">
                 <a:solidFill>
                   <a:srgbClr val="212121"/>
                 </a:solidFill>
@@ -4206,7 +3958,7 @@
               <a:t>Tirumaleswar</a:t>
             </a:r>
             <a:r>
-              <a:rPr lang="en-GB" sz="2000" dirty="0">
+              <a:rPr lang="en-GB" sz="2000">
                 <a:solidFill>
                   <a:srgbClr val="212121"/>
                 </a:solidFill>
@@ -4216,7 +3968,7 @@
               <a:t> </a:t>
             </a:r>
             <a:r>
-              <a:rPr lang="en-GB" sz="2000" dirty="0" err="1">
+              <a:rPr lang="en-GB" sz="2000" err="1">
                 <a:solidFill>
                   <a:srgbClr val="212121"/>
                 </a:solidFill>
@@ -4226,7 +3978,7 @@
               <a:t>Reddy.K</a:t>
             </a:r>
             <a:r>
-              <a:rPr lang="en-GB" sz="2000" dirty="0">
+              <a:rPr lang="en-GB" sz="2000">
                 <a:solidFill>
                   <a:srgbClr val="212121"/>
                 </a:solidFill>
@@ -4238,7 +3990,7 @@
           </a:p>
           <a:p>
             <a:r>
-              <a:rPr lang="en-GB" sz="2000" dirty="0" err="1">
+              <a:rPr lang="en-GB" sz="2000" err="1">
                 <a:solidFill>
                   <a:srgbClr val="212121"/>
                 </a:solidFill>
@@ -4248,7 +4000,7 @@
               <a:t>Zahed</a:t>
             </a:r>
             <a:r>
-              <a:rPr lang="en-GB" sz="2000" dirty="0">
+              <a:rPr lang="en-GB" sz="2000">
                 <a:solidFill>
                   <a:srgbClr val="212121"/>
                 </a:solidFill>
@@ -4258,7 +4010,7 @@
               <a:t> </a:t>
             </a:r>
             <a:r>
-              <a:rPr lang="en-GB" sz="2000" dirty="0" err="1">
+              <a:rPr lang="en-GB" sz="2000" err="1">
                 <a:solidFill>
                   <a:srgbClr val="212121"/>
                 </a:solidFill>
@@ -4267,7 +4019,7 @@
               </a:rPr>
               <a:t>Sarker</a:t>
             </a:r>
-            <a:endParaRPr lang="en-GB" sz="2000" dirty="0">
+            <a:endParaRPr lang="en-GB" sz="2000">
               <a:solidFill>
                 <a:srgbClr val="212121"/>
               </a:solidFill>
@@ -4276,7 +4028,7 @@
           </a:p>
           <a:p>
             <a:r>
-              <a:rPr lang="en-GB" sz="2000" dirty="0">
+              <a:rPr lang="en-GB" sz="2000">
                 <a:solidFill>
                   <a:srgbClr val="212121"/>
                 </a:solidFill>
@@ -4286,7 +4038,7 @@
               <a:t>Hannes </a:t>
             </a:r>
             <a:r>
-              <a:rPr lang="en-GB" sz="2000" dirty="0" err="1">
+              <a:rPr lang="en-GB" sz="2000" err="1">
                 <a:solidFill>
                   <a:srgbClr val="212121"/>
                 </a:solidFill>
@@ -4295,7 +4047,7 @@
               </a:rPr>
               <a:t>Tschofenig</a:t>
             </a:r>
-            <a:endParaRPr lang="en-GB" sz="2000" dirty="0">
+            <a:endParaRPr lang="en-GB" sz="2000">
               <a:solidFill>
                 <a:srgbClr val="212121"/>
               </a:solidFill>
@@ -4304,7 +4056,7 @@
           </a:p>
           <a:p>
             <a:r>
-              <a:rPr lang="en-GB" sz="2000" dirty="0">
+              <a:rPr lang="en-GB" sz="2000">
                 <a:solidFill>
                   <a:srgbClr val="212121"/>
                 </a:solidFill>
@@ -4314,7 +4066,7 @@
               <a:t>Michael </a:t>
             </a:r>
             <a:r>
-              <a:rPr lang="en-GB" sz="2000" dirty="0" err="1">
+              <a:rPr lang="en-GB" sz="2000" err="1">
                 <a:solidFill>
                   <a:srgbClr val="212121"/>
                 </a:solidFill>
@@ -4324,7 +4076,7 @@
               <a:t>Tüxen</a:t>
             </a:r>
             <a:r>
-              <a:rPr lang="en-GB" sz="2000" dirty="0">
+              <a:rPr lang="en-GB" sz="2000">
                 <a:solidFill>
                   <a:srgbClr val="212121"/>
                 </a:solidFill>
@@ -4333,11 +4085,11 @@
               </a:rPr>
               <a:t> </a:t>
             </a:r>
-            <a:endParaRPr lang="en-GB" sz="3200" dirty="0"/>
-          </a:p>
-          <a:p>
-            <a:r>
-              <a:rPr lang="en-GB" sz="2000" dirty="0">
+            <a:endParaRPr lang="en-GB" sz="3200"/>
+          </a:p>
+          <a:p>
+            <a:r>
+              <a:rPr lang="en-GB" sz="2000">
                 <a:solidFill>
                   <a:srgbClr val="212121"/>
                 </a:solidFill>
@@ -4346,12 +4098,12 @@
               </a:rPr>
               <a:t>Magnus Westerlund </a:t>
             </a:r>
-            <a:endParaRPr lang="en-GB" sz="3200" dirty="0">
+            <a:endParaRPr lang="en-GB" sz="3200">
               <a:effectLst/>
             </a:endParaRPr>
           </a:p>
           <a:p>
-            <a:endParaRPr lang="en-US" dirty="0"/>
+            <a:endParaRPr lang="en-US"/>
           </a:p>
         </p:txBody>
       </p:sp>
@@ -4407,7 +4159,7 @@
           <a:lstStyle/>
           <a:p>
             <a:r>
-              <a:rPr lang="en-US" dirty="0"/>
+              <a:rPr lang="en-US"/>
               <a:t>Requirements</a:t>
             </a:r>
           </a:p>
@@ -4435,47 +4187,47 @@
           <a:lstStyle/>
           <a:p>
             <a:r>
-              <a:rPr lang="en-US" dirty="0"/>
+              <a:rPr lang="en-US"/>
               <a:t>The Design Team discussed before New Year what was perceived as the requirements to fulfill 3GPPs needs</a:t>
             </a:r>
           </a:p>
           <a:p>
             <a:r>
-              <a:rPr lang="en-US" dirty="0"/>
+              <a:rPr lang="en-US"/>
               <a:t>Presented at IETF 118 in TSVWG session:</a:t>
             </a:r>
           </a:p>
           <a:p>
             <a:pPr lvl="1"/>
             <a:r>
-              <a:rPr lang="en-US" dirty="0">
+              <a:rPr lang="en-US">
                 <a:hlinkClick r:id="rId2"/>
               </a:rPr>
               <a:t>https://datatracker.ietf.org/meeting/118/materials/slides-118-tsvwg-sessb-3-tsvwg-design-team-to-set-requirements-for-dtlssctp</a:t>
             </a:r>
-            <a:endParaRPr lang="en-US" dirty="0"/>
-          </a:p>
-          <a:p>
-            <a:r>
-              <a:rPr lang="en-US" dirty="0"/>
+            <a:endParaRPr lang="en-US"/>
+          </a:p>
+          <a:p>
+            <a:r>
+              <a:rPr lang="en-US"/>
               <a:t>Further discussed and assigned importance: </a:t>
             </a:r>
           </a:p>
           <a:p>
             <a:pPr lvl="1"/>
             <a:r>
-              <a:rPr lang="en-US" dirty="0">
+              <a:rPr lang="en-US">
                 <a:hlinkClick r:id="rId3"/>
               </a:rPr>
               <a:t>https://github.com/sctplab/sctp-dtls-requirements/blob/main/SCTP_DTLS_REQ.pptx</a:t>
             </a:r>
-            <a:endParaRPr lang="en-US" dirty="0"/>
+            <a:endParaRPr lang="en-US"/>
           </a:p>
           <a:p>
             <a:pPr marL="0" indent="0">
               <a:buNone/>
             </a:pPr>
-            <a:endParaRPr lang="en-US" dirty="0"/>
+            <a:endParaRPr lang="en-US"/>
           </a:p>
         </p:txBody>
       </p:sp>
@@ -4531,7 +4283,7 @@
           <a:lstStyle/>
           <a:p>
             <a:r>
-              <a:rPr lang="en-US" dirty="0"/>
+              <a:rPr lang="en-US"/>
               <a:t>The Proposals on the Table</a:t>
             </a:r>
           </a:p>
@@ -4561,127 +4313,127 @@
           <a:lstStyle/>
           <a:p>
             <a:r>
-              <a:rPr lang="en-US" dirty="0"/>
+              <a:rPr lang="en-US"/>
               <a:t>DTLS over SCTP based on RFC 6083 proposed by Ericsson</a:t>
             </a:r>
           </a:p>
           <a:p>
             <a:pPr lvl="1"/>
             <a:r>
-              <a:rPr lang="en-US" dirty="0">
+              <a:rPr lang="en-US">
                 <a:hlinkClick r:id="rId2"/>
               </a:rPr>
               <a:t>https://datatracker.ietf.org/doc/draft-ietf-tsvwg-dtls-over-sctp-bis/</a:t>
             </a:r>
-            <a:endParaRPr lang="en-US" dirty="0"/>
-          </a:p>
-          <a:p>
-            <a:pPr lvl="1"/>
-            <a:r>
-              <a:rPr lang="en-US" dirty="0">
+            <a:endParaRPr lang="en-US"/>
+          </a:p>
+          <a:p>
+            <a:pPr lvl="1"/>
+            <a:r>
+              <a:rPr lang="en-US">
                 <a:hlinkClick r:id="rId3"/>
               </a:rPr>
               <a:t>https://datatracker.ietf.org/doc/draft-ietf-tsvwg-rfc4895-bis/</a:t>
             </a:r>
-            <a:endParaRPr lang="en-US" dirty="0"/>
-          </a:p>
-          <a:p>
-            <a:r>
-              <a:rPr lang="en-US" dirty="0"/>
+            <a:endParaRPr lang="en-US"/>
+          </a:p>
+          <a:p>
+            <a:r>
+              <a:rPr lang="en-US"/>
               <a:t>DTLS Chunk alternative solution proposed by Ericsson</a:t>
             </a:r>
           </a:p>
           <a:p>
             <a:pPr lvl="1"/>
             <a:r>
-              <a:rPr lang="en-US" dirty="0">
+              <a:rPr lang="en-US">
                 <a:hlinkClick r:id="rId4"/>
               </a:rPr>
               <a:t>https://datatracker.ietf.org/doc/draft-westerlund-tsvwg-sctp-dtls-chunk/</a:t>
             </a:r>
-            <a:endParaRPr lang="en-US" dirty="0"/>
-          </a:p>
-          <a:p>
-            <a:pPr lvl="1"/>
-            <a:r>
-              <a:rPr lang="en-US" dirty="0">
+            <a:endParaRPr lang="en-US"/>
+          </a:p>
+          <a:p>
+            <a:pPr lvl="1"/>
+            <a:r>
+              <a:rPr lang="en-US">
                 <a:hlinkClick r:id="rId5"/>
               </a:rPr>
               <a:t>https://datatracker.ietf.org/doc/draft-westerlund-tsvwg-sctp-dtls-handshake/</a:t>
             </a:r>
-            <a:endParaRPr lang="en-US" dirty="0"/>
-          </a:p>
-          <a:p>
-            <a:r>
-              <a:rPr lang="en-US" dirty="0"/>
+            <a:endParaRPr lang="en-US"/>
+          </a:p>
+          <a:p>
+            <a:r>
+              <a:rPr lang="en-US"/>
               <a:t>Michael </a:t>
             </a:r>
             <a:r>
-              <a:rPr lang="en-US" dirty="0" err="1"/>
+              <a:rPr lang="en-US" err="1"/>
               <a:t>Tüxen’s</a:t>
             </a:r>
             <a:r>
-              <a:rPr lang="en-US" dirty="0"/>
+              <a:rPr lang="en-US"/>
               <a:t> and Hannes </a:t>
             </a:r>
             <a:r>
-              <a:rPr lang="en-US" dirty="0" err="1"/>
+              <a:rPr lang="en-US" err="1"/>
               <a:t>Tschofenig’s</a:t>
             </a:r>
             <a:r>
-              <a:rPr lang="en-US" dirty="0"/>
+              <a:rPr lang="en-US"/>
               <a:t> DTLS over SCTP proposal</a:t>
             </a:r>
           </a:p>
           <a:p>
             <a:pPr lvl="1"/>
             <a:r>
-              <a:rPr lang="en-US" dirty="0">
+              <a:rPr lang="en-US">
                 <a:hlinkClick r:id="rId6"/>
               </a:rPr>
               <a:t>https://datatracker.ietf.org/doc/draft-tuexen-tsvwg-rfc6083-bis/</a:t>
             </a:r>
-            <a:endParaRPr lang="en-US" dirty="0"/>
-          </a:p>
-          <a:p>
-            <a:pPr lvl="1"/>
-            <a:r>
-              <a:rPr lang="en-US" dirty="0">
+            <a:endParaRPr lang="en-US"/>
+          </a:p>
+          <a:p>
+            <a:pPr lvl="1"/>
+            <a:r>
+              <a:rPr lang="en-US">
                 <a:hlinkClick r:id="rId7"/>
               </a:rPr>
               <a:t>https://datatracker.ietf.org/doc/draft-tuexen-tsvwg-sctp-ppid-frag/</a:t>
             </a:r>
-            <a:endParaRPr lang="en-US" dirty="0"/>
-          </a:p>
-          <a:p>
-            <a:pPr lvl="1"/>
-            <a:r>
-              <a:rPr lang="en-US" dirty="0">
+            <a:endParaRPr lang="en-US"/>
+          </a:p>
+          <a:p>
+            <a:pPr lvl="1"/>
+            <a:r>
+              <a:rPr lang="en-US">
                 <a:hlinkClick r:id="rId3"/>
               </a:rPr>
               <a:t>https://datatracker.ietf.org/doc/draft-ietf-tsvwg-rfc4895-bis/</a:t>
             </a:r>
-            <a:endParaRPr lang="en-US" dirty="0"/>
-          </a:p>
-          <a:p>
-            <a:pPr lvl="1"/>
-            <a:r>
-              <a:rPr lang="en-US" dirty="0">
+            <a:endParaRPr lang="en-US"/>
+          </a:p>
+          <a:p>
+            <a:pPr lvl="1"/>
+            <a:r>
+              <a:rPr lang="en-US">
                 <a:hlinkClick r:id="rId8"/>
               </a:rPr>
               <a:t>https://datatracker.ietf.org/doc/draft-tschofenig-tls-extended-key-update/</a:t>
             </a:r>
-            <a:endParaRPr lang="en-US" dirty="0"/>
-          </a:p>
-          <a:p>
-            <a:pPr lvl="1"/>
-            <a:r>
-              <a:rPr lang="en-US" dirty="0"/>
+            <a:endParaRPr lang="en-US"/>
+          </a:p>
+          <a:p>
+            <a:pPr lvl="1"/>
+            <a:r>
+              <a:rPr lang="en-US"/>
               <a:t>RFC 9261 for periodic Authentication</a:t>
             </a:r>
           </a:p>
           <a:p>
-            <a:endParaRPr lang="en-US" dirty="0"/>
+            <a:endParaRPr lang="en-US"/>
           </a:p>
         </p:txBody>
       </p:sp>
@@ -4737,7 +4489,7 @@
           <a:lstStyle/>
           <a:p>
             <a:r>
-              <a:rPr lang="en-US" dirty="0"/>
+              <a:rPr lang="en-US"/>
               <a:t>Analysis</a:t>
             </a:r>
           </a:p>
@@ -4824,7 +4576,7 @@
             <a:pPr lvl="1"/>
             <a:r>
               <a:rPr lang="en-US" dirty="0"/>
-              <a:t>IPR claims</a:t>
+              <a:t>IPR claims and impact on open source SCTP implementations</a:t>
             </a:r>
           </a:p>
           <a:p>
@@ -4894,7 +4646,7 @@
           <a:lstStyle/>
           <a:p>
             <a:r>
-              <a:rPr lang="en-US" dirty="0"/>
+              <a:rPr lang="en-US"/>
               <a:t>Completion Time</a:t>
             </a:r>
           </a:p>
@@ -4919,7 +4671,7 @@
         <p:spPr/>
         <p:txBody>
           <a:bodyPr>
-            <a:normAutofit lnSpcReduction="10000"/>
+            <a:normAutofit fontScale="92500" lnSpcReduction="20000"/>
           </a:bodyPr>
           <a:lstStyle/>
           <a:p>
@@ -5001,7 +4753,14 @@
             <a:pPr lvl="1"/>
             <a:r>
               <a:rPr lang="en-US" dirty="0"/>
-              <a:t>Expected time to be ready for publication request is at least 2-3 years</a:t>
+              <a:t>TSVWG documents expected to be ready for publication by end of 2024</a:t>
+            </a:r>
+          </a:p>
+          <a:p>
+            <a:pPr lvl="1"/>
+            <a:r>
+              <a:rPr lang="en-US" dirty="0"/>
+              <a:t>Assuming adoption the Key Updated in TLS WG is expected time to be ready for publication request is at least 2 years</a:t>
             </a:r>
           </a:p>
           <a:p>
@@ -5066,7 +4825,7 @@
           <a:lstStyle/>
           <a:p>
             <a:r>
-              <a:rPr lang="en-US" dirty="0"/>
+              <a:rPr lang="en-US"/>
               <a:t>IPR</a:t>
             </a:r>
           </a:p>
@@ -5096,44 +4855,44 @@
           <a:lstStyle/>
           <a:p>
             <a:r>
-              <a:rPr lang="en-US" dirty="0"/>
+              <a:rPr lang="en-US"/>
               <a:t>DTLS over SCTP per Ericsson’s proposal:</a:t>
             </a:r>
           </a:p>
           <a:p>
             <a:pPr lvl="1"/>
             <a:r>
-              <a:rPr lang="en-US" dirty="0"/>
+              <a:rPr lang="en-US"/>
               <a:t>Two IPR disclosures (RAND): </a:t>
             </a:r>
             <a:r>
-              <a:rPr lang="en-US" dirty="0">
+              <a:rPr lang="en-US">
                 <a:hlinkClick r:id="rId2"/>
               </a:rPr>
               <a:t>https://datatracker.ietf.org/ipr/5195/</a:t>
             </a:r>
             <a:r>
-              <a:rPr lang="en-US" dirty="0"/>
+              <a:rPr lang="en-US"/>
               <a:t> </a:t>
             </a:r>
             <a:r>
-              <a:rPr lang="en-US" dirty="0">
+              <a:rPr lang="en-US">
                 <a:hlinkClick r:id="rId3"/>
               </a:rPr>
               <a:t>https://datatracker.ietf.org/ipr/6218/</a:t>
             </a:r>
-            <a:endParaRPr lang="en-US" dirty="0"/>
-          </a:p>
-          <a:p>
-            <a:r>
-              <a:rPr lang="en-US" dirty="0"/>
+            <a:endParaRPr lang="en-US"/>
+          </a:p>
+          <a:p>
+            <a:r>
+              <a:rPr lang="en-US"/>
               <a:t>DTLS Chunk:</a:t>
             </a:r>
           </a:p>
           <a:p>
             <a:pPr lvl="1"/>
             <a:r>
-              <a:rPr lang="en-GB" b="0" i="0" u="none" strike="noStrike" dirty="0">
+              <a:rPr lang="en-GB" b="0" i="0" u="none" strike="noStrike">
                 <a:solidFill>
                   <a:srgbClr val="212529"/>
                 </a:solidFill>
@@ -5143,7 +4902,7 @@
               <a:t>draft-</a:t>
             </a:r>
             <a:r>
-              <a:rPr lang="en-GB" b="0" i="0" u="none" strike="noStrike" dirty="0" err="1">
+              <a:rPr lang="en-GB" b="0" i="0" u="none" strike="noStrike" err="1">
                 <a:solidFill>
                   <a:srgbClr val="212529"/>
                 </a:solidFill>
@@ -5153,7 +4912,7 @@
               <a:t>westerlund</a:t>
             </a:r>
             <a:r>
-              <a:rPr lang="en-GB" b="0" i="0" u="none" strike="noStrike" dirty="0">
+              <a:rPr lang="en-GB" b="0" i="0" u="none" strike="noStrike">
                 <a:solidFill>
                   <a:srgbClr val="212529"/>
                 </a:solidFill>
@@ -5163,7 +4922,7 @@
               <a:t>-</a:t>
             </a:r>
             <a:r>
-              <a:rPr lang="en-GB" b="0" i="0" u="none" strike="noStrike" dirty="0" err="1">
+              <a:rPr lang="en-GB" b="0" i="0" u="none" strike="noStrike" err="1">
                 <a:solidFill>
                   <a:srgbClr val="212529"/>
                 </a:solidFill>
@@ -5173,7 +4932,7 @@
               <a:t>tsvwg</a:t>
             </a:r>
             <a:r>
-              <a:rPr lang="en-GB" b="0" i="0" u="none" strike="noStrike" dirty="0">
+              <a:rPr lang="en-GB" b="0" i="0" u="none" strike="noStrike">
                 <a:solidFill>
                   <a:srgbClr val="212529"/>
                 </a:solidFill>
@@ -5183,7 +4942,7 @@
               <a:t>-</a:t>
             </a:r>
             <a:r>
-              <a:rPr lang="en-GB" b="0" i="0" u="none" strike="noStrike" dirty="0" err="1">
+              <a:rPr lang="en-GB" b="0" i="0" u="none" strike="noStrike" err="1">
                 <a:solidFill>
                   <a:srgbClr val="212529"/>
                 </a:solidFill>
@@ -5193,7 +4952,7 @@
               <a:t>sctp</a:t>
             </a:r>
             <a:r>
-              <a:rPr lang="en-GB" b="0" i="0" u="none" strike="noStrike" dirty="0">
+              <a:rPr lang="en-GB" b="0" i="0" u="none" strike="noStrike">
                 <a:solidFill>
                   <a:srgbClr val="212529"/>
                 </a:solidFill>
@@ -5203,7 +4962,7 @@
               <a:t>-</a:t>
             </a:r>
             <a:r>
-              <a:rPr lang="en-GB" b="0" i="0" u="none" strike="noStrike" dirty="0" err="1">
+              <a:rPr lang="en-GB" b="0" i="0" u="none" strike="noStrike" err="1">
                 <a:solidFill>
                   <a:srgbClr val="212529"/>
                 </a:solidFill>
@@ -5213,7 +4972,7 @@
               <a:t>dtls</a:t>
             </a:r>
             <a:r>
-              <a:rPr lang="en-GB" b="0" i="0" u="none" strike="noStrike" dirty="0">
+              <a:rPr lang="en-GB" b="0" i="0" u="none" strike="noStrike">
                 <a:solidFill>
                   <a:srgbClr val="212529"/>
                 </a:solidFill>
@@ -5223,7 +4982,7 @@
               <a:t>-chunk: </a:t>
             </a:r>
             <a:r>
-              <a:rPr lang="en-GB" b="0" i="0" u="none" strike="noStrike" dirty="0">
+              <a:rPr lang="en-GB" b="0" i="0" u="none" strike="noStrike">
                 <a:solidFill>
                   <a:srgbClr val="212529"/>
                 </a:solidFill>
@@ -5233,7 +4992,7 @@
               </a:rPr>
               <a:t>https://datatracker.ietf.org/ipr/6219/</a:t>
             </a:r>
-            <a:endParaRPr lang="en-GB" b="0" i="0" u="none" strike="noStrike" dirty="0">
+            <a:endParaRPr lang="en-GB" b="0" i="0" u="none" strike="noStrike">
               <a:solidFill>
                 <a:srgbClr val="212529"/>
               </a:solidFill>
@@ -5244,7 +5003,7 @@
           <a:p>
             <a:pPr lvl="2"/>
             <a:r>
-              <a:rPr lang="en-GB" dirty="0">
+              <a:rPr lang="en-GB">
                 <a:solidFill>
                   <a:srgbClr val="212529"/>
                 </a:solidFill>
@@ -5252,7 +5011,7 @@
               </a:rPr>
               <a:t>Defensive declaration with option of RAND (see disclosure)</a:t>
             </a:r>
-            <a:endParaRPr lang="en-GB" b="0" i="0" u="none" strike="noStrike" dirty="0">
+            <a:endParaRPr lang="en-GB" b="0" i="0" u="none" strike="noStrike">
               <a:solidFill>
                 <a:srgbClr val="212529"/>
               </a:solidFill>
@@ -5263,7 +5022,7 @@
           <a:p>
             <a:pPr lvl="1"/>
             <a:r>
-              <a:rPr lang="en-GB" b="0" i="0" u="none" strike="noStrike" dirty="0">
+              <a:rPr lang="en-GB" b="0" i="0" u="none" strike="noStrike">
                 <a:solidFill>
                   <a:srgbClr val="212529"/>
                 </a:solidFill>
@@ -5273,7 +5032,7 @@
               <a:t>draft-</a:t>
             </a:r>
             <a:r>
-              <a:rPr lang="en-GB" b="0" i="0" u="none" strike="noStrike" dirty="0" err="1">
+              <a:rPr lang="en-GB" b="0" i="0" u="none" strike="noStrike" err="1">
                 <a:solidFill>
                   <a:srgbClr val="212529"/>
                 </a:solidFill>
@@ -5283,7 +5042,7 @@
               <a:t>westerlund</a:t>
             </a:r>
             <a:r>
-              <a:rPr lang="en-GB" b="0" i="0" u="none" strike="noStrike" dirty="0">
+              <a:rPr lang="en-GB" b="0" i="0" u="none" strike="noStrike">
                 <a:solidFill>
                   <a:srgbClr val="212529"/>
                 </a:solidFill>
@@ -5293,7 +5052,7 @@
               <a:t>-</a:t>
             </a:r>
             <a:r>
-              <a:rPr lang="en-GB" b="0" i="0" u="none" strike="noStrike" dirty="0" err="1">
+              <a:rPr lang="en-GB" b="0" i="0" u="none" strike="noStrike" err="1">
                 <a:solidFill>
                   <a:srgbClr val="212529"/>
                 </a:solidFill>
@@ -5303,7 +5062,7 @@
               <a:t>tsvwg</a:t>
             </a:r>
             <a:r>
-              <a:rPr lang="en-GB" b="0" i="0" u="none" strike="noStrike" dirty="0">
+              <a:rPr lang="en-GB" b="0" i="0" u="none" strike="noStrike">
                 <a:solidFill>
                   <a:srgbClr val="212529"/>
                 </a:solidFill>
@@ -5313,7 +5072,7 @@
               <a:t>-</a:t>
             </a:r>
             <a:r>
-              <a:rPr lang="en-GB" b="0" i="0" u="none" strike="noStrike" dirty="0" err="1">
+              <a:rPr lang="en-GB" b="0" i="0" u="none" strike="noStrike" err="1">
                 <a:solidFill>
                   <a:srgbClr val="212529"/>
                 </a:solidFill>
@@ -5323,7 +5082,7 @@
               <a:t>sctp</a:t>
             </a:r>
             <a:r>
-              <a:rPr lang="en-GB" b="0" i="0" u="none" strike="noStrike" dirty="0">
+              <a:rPr lang="en-GB" b="0" i="0" u="none" strike="noStrike">
                 <a:solidFill>
                   <a:srgbClr val="212529"/>
                 </a:solidFill>
@@ -5333,7 +5092,7 @@
               <a:t>-</a:t>
             </a:r>
             <a:r>
-              <a:rPr lang="en-GB" b="0" i="0" u="none" strike="noStrike" dirty="0" err="1">
+              <a:rPr lang="en-GB" b="0" i="0" u="none" strike="noStrike" err="1">
                 <a:solidFill>
                   <a:srgbClr val="212529"/>
                 </a:solidFill>
@@ -5343,7 +5102,7 @@
               <a:t>dtls</a:t>
             </a:r>
             <a:r>
-              <a:rPr lang="en-GB" b="0" i="0" u="none" strike="noStrike" dirty="0">
+              <a:rPr lang="en-GB" b="0" i="0" u="none" strike="noStrike">
                 <a:solidFill>
                   <a:srgbClr val="212529"/>
                 </a:solidFill>
@@ -5353,7 +5112,7 @@
               <a:t>-handshake: </a:t>
             </a:r>
             <a:r>
-              <a:rPr lang="en-GB" b="0" i="0" u="none" strike="noStrike" dirty="0">
+              <a:rPr lang="en-GB" b="0" i="0" u="none" strike="noStrike">
                 <a:solidFill>
                   <a:srgbClr val="212529"/>
                 </a:solidFill>
@@ -5363,31 +5122,31 @@
               </a:rPr>
               <a:t>https://datatracker.ietf.org/ipr/6220/</a:t>
             </a:r>
-            <a:endParaRPr lang="en-US" dirty="0"/>
-          </a:p>
-          <a:p>
-            <a:r>
-              <a:rPr lang="en-US" dirty="0"/>
+            <a:endParaRPr lang="en-US"/>
+          </a:p>
+          <a:p>
+            <a:r>
+              <a:rPr lang="en-US"/>
               <a:t>DTLS over SCTP proposal by </a:t>
             </a:r>
             <a:r>
-              <a:rPr lang="en-US" dirty="0" err="1"/>
+              <a:rPr lang="en-US" err="1"/>
               <a:t>Tüxen</a:t>
             </a:r>
             <a:r>
-              <a:rPr lang="en-US" dirty="0"/>
+              <a:rPr lang="en-US"/>
               <a:t> et al</a:t>
             </a:r>
           </a:p>
           <a:p>
             <a:pPr lvl="1"/>
             <a:r>
-              <a:rPr lang="en-US" dirty="0"/>
+              <a:rPr lang="en-US"/>
               <a:t>No IPR disclosures</a:t>
             </a:r>
           </a:p>
           <a:p>
-            <a:endParaRPr lang="en-US" dirty="0"/>
+            <a:endParaRPr lang="en-US"/>
           </a:p>
         </p:txBody>
       </p:sp>
@@ -5445,7 +5204,7 @@
           <a:lstStyle/>
           <a:p>
             <a:r>
-              <a:rPr lang="en-US" dirty="0"/>
+              <a:rPr lang="en-US"/>
               <a:t>DTLS over SCTP based on RFC 6083 proposed by Ericsson</a:t>
             </a:r>
           </a:p>
@@ -5475,86 +5234,86 @@
           <a:lstStyle/>
           <a:p>
             <a:r>
-              <a:rPr lang="en-US" dirty="0"/>
+              <a:rPr lang="en-US"/>
               <a:t>Depending on DTLS 1.3 features</a:t>
             </a:r>
           </a:p>
           <a:p>
             <a:pPr lvl="1"/>
             <a:r>
-              <a:rPr lang="en-US" dirty="0"/>
+              <a:rPr lang="en-US"/>
               <a:t>DTLS Connection IDs</a:t>
             </a:r>
           </a:p>
           <a:p>
             <a:pPr lvl="2"/>
             <a:r>
-              <a:rPr lang="en-US" dirty="0"/>
+              <a:rPr lang="en-US"/>
               <a:t>Could be engineered around with an DTLS record encapsulation layer</a:t>
             </a:r>
           </a:p>
           <a:p>
             <a:r>
-              <a:rPr lang="en-US" dirty="0"/>
+              <a:rPr lang="en-US"/>
               <a:t>Rekeying issue</a:t>
             </a:r>
           </a:p>
           <a:p>
             <a:pPr lvl="1"/>
             <a:r>
-              <a:rPr lang="en-US" dirty="0"/>
+              <a:rPr lang="en-US"/>
               <a:t>Knowing when an old DTLS connection and its SCTP-AUTH key are no longer required</a:t>
             </a:r>
           </a:p>
           <a:p>
             <a:pPr lvl="1"/>
             <a:r>
-              <a:rPr lang="en-US" dirty="0"/>
+              <a:rPr lang="en-US"/>
               <a:t>Interaction with SCTP-AUTH API that limits when key can be replaced</a:t>
             </a:r>
           </a:p>
           <a:p>
             <a:r>
-              <a:rPr lang="en-US" dirty="0"/>
+              <a:rPr lang="en-US"/>
               <a:t>Beyond SCTP-AUTH all on top of SCTP Stack</a:t>
             </a:r>
           </a:p>
           <a:p>
             <a:r>
-              <a:rPr lang="en-US" dirty="0"/>
+              <a:rPr lang="en-US"/>
               <a:t>Relies on SCTP stack for any replay protection</a:t>
             </a:r>
           </a:p>
           <a:p>
             <a:r>
-              <a:rPr lang="en-US" dirty="0"/>
+              <a:rPr lang="en-US"/>
               <a:t>Two crypto passes: </a:t>
             </a:r>
           </a:p>
           <a:p>
             <a:pPr lvl="1"/>
             <a:r>
-              <a:rPr lang="en-US" dirty="0"/>
+              <a:rPr lang="en-US"/>
               <a:t>DTLS over ULP User Messages</a:t>
             </a:r>
           </a:p>
           <a:p>
             <a:pPr lvl="1"/>
             <a:r>
-              <a:rPr lang="en-US" dirty="0"/>
+              <a:rPr lang="en-US"/>
               <a:t>SCTP-AUTH over SCTP Packet Chunks</a:t>
             </a:r>
           </a:p>
           <a:p>
             <a:pPr lvl="1"/>
-            <a:endParaRPr lang="en-US" dirty="0"/>
-          </a:p>
-          <a:p>
-            <a:pPr lvl="1"/>
-            <a:endParaRPr lang="en-US" dirty="0"/>
-          </a:p>
-          <a:p>
-            <a:endParaRPr lang="en-US" dirty="0"/>
+            <a:endParaRPr lang="en-US"/>
+          </a:p>
+          <a:p>
+            <a:pPr lvl="1"/>
+            <a:endParaRPr lang="en-US"/>
+          </a:p>
+          <a:p>
+            <a:endParaRPr lang="en-US"/>
           </a:p>
         </p:txBody>
       </p:sp>
@@ -5612,7 +5371,7 @@
           <a:lstStyle/>
           <a:p>
             <a:r>
-              <a:rPr lang="en-US" dirty="0"/>
+              <a:rPr lang="en-US"/>
               <a:t>DTLS Chunk alternative solution proposed by Ericsson</a:t>
             </a:r>
           </a:p>
@@ -5636,7 +5395,9 @@
         </p:nvSpPr>
         <p:spPr/>
         <p:txBody>
-          <a:bodyPr/>
+          <a:bodyPr>
+            <a:normAutofit fontScale="92500" lnSpcReduction="10000"/>
+          </a:bodyPr>
           <a:lstStyle/>
           <a:p>
             <a:r>
@@ -5695,6 +5456,25 @@
             <a:r>
               <a:rPr lang="en-US" dirty="0"/>
               <a:t>Maximum SCTP Payload MTU: 16384 bytes</a:t>
+            </a:r>
+          </a:p>
+          <a:p>
+            <a:pPr lvl="1"/>
+            <a:r>
+              <a:rPr lang="en-US" dirty="0"/>
+              <a:t>Can be increased to 64 KB by DTLS Record size change (</a:t>
+            </a:r>
+            <a:r>
+              <a:rPr lang="en-GB" b="0" i="0" u="sng" dirty="0">
+                <a:effectLst/>
+                <a:latin typeface="Inter"/>
+                <a:hlinkClick r:id="rId2"/>
+              </a:rPr>
+              <a:t>draft-mattsson-tls-super-jumbo-record-limit-00</a:t>
+            </a:r>
+            <a:r>
+              <a:rPr lang="en-US" dirty="0"/>
+              <a:t>)</a:t>
             </a:r>
           </a:p>
           <a:p>

</xml_diff>

<commit_message>
Some edits and proposed future slides from the DT meeting.
</commit_message>
<xml_diff>
--- a/dtls-for-sctp-design-team-report.pptx
+++ b/dtls-for-sctp-design-team-report.pptx
@@ -12,10 +12,13 @@
     <p:sldId id="262" r:id="rId6"/>
     <p:sldId id="263" r:id="rId7"/>
     <p:sldId id="264" r:id="rId8"/>
-    <p:sldId id="265" r:id="rId9"/>
-    <p:sldId id="266" r:id="rId10"/>
-    <p:sldId id="267" r:id="rId11"/>
-    <p:sldId id="269" r:id="rId12"/>
+    <p:sldId id="270" r:id="rId9"/>
+    <p:sldId id="265" r:id="rId10"/>
+    <p:sldId id="266" r:id="rId11"/>
+    <p:sldId id="267" r:id="rId12"/>
+    <p:sldId id="269" r:id="rId13"/>
+    <p:sldId id="271" r:id="rId14"/>
+    <p:sldId id="272" r:id="rId15"/>
   </p:sldIdLst>
   <p:sldSz cx="12192000" cy="6858000"/>
   <p:notesSz cx="6858000" cy="9144000"/>
@@ -271,7 +274,7 @@
           <a:p>
             <a:fld id="{F590127B-264E-4C46-AF4D-D678C54EFD2B}" type="datetimeFigureOut">
               <a:rPr lang="en-US" smtClean="0"/>
-              <a:t>2/9/24</a:t>
+              <a:t>2/16/24</a:t>
             </a:fld>
             <a:endParaRPr lang="en-US"/>
           </a:p>
@@ -471,7 +474,7 @@
           <a:p>
             <a:fld id="{F590127B-264E-4C46-AF4D-D678C54EFD2B}" type="datetimeFigureOut">
               <a:rPr lang="en-US" smtClean="0"/>
-              <a:t>2/9/24</a:t>
+              <a:t>2/16/24</a:t>
             </a:fld>
             <a:endParaRPr lang="en-US"/>
           </a:p>
@@ -681,7 +684,7 @@
           <a:p>
             <a:fld id="{F590127B-264E-4C46-AF4D-D678C54EFD2B}" type="datetimeFigureOut">
               <a:rPr lang="en-US" smtClean="0"/>
-              <a:t>2/9/24</a:t>
+              <a:t>2/16/24</a:t>
             </a:fld>
             <a:endParaRPr lang="en-US"/>
           </a:p>
@@ -881,7 +884,7 @@
           <a:p>
             <a:fld id="{F590127B-264E-4C46-AF4D-D678C54EFD2B}" type="datetimeFigureOut">
               <a:rPr lang="en-US" smtClean="0"/>
-              <a:t>2/9/24</a:t>
+              <a:t>2/16/24</a:t>
             </a:fld>
             <a:endParaRPr lang="en-US"/>
           </a:p>
@@ -1157,7 +1160,7 @@
           <a:p>
             <a:fld id="{F590127B-264E-4C46-AF4D-D678C54EFD2B}" type="datetimeFigureOut">
               <a:rPr lang="en-US" smtClean="0"/>
-              <a:t>2/9/24</a:t>
+              <a:t>2/16/24</a:t>
             </a:fld>
             <a:endParaRPr lang="en-US"/>
           </a:p>
@@ -1425,7 +1428,7 @@
           <a:p>
             <a:fld id="{F590127B-264E-4C46-AF4D-D678C54EFD2B}" type="datetimeFigureOut">
               <a:rPr lang="en-US" smtClean="0"/>
-              <a:t>2/9/24</a:t>
+              <a:t>2/16/24</a:t>
             </a:fld>
             <a:endParaRPr lang="en-US"/>
           </a:p>
@@ -1840,7 +1843,7 @@
           <a:p>
             <a:fld id="{F590127B-264E-4C46-AF4D-D678C54EFD2B}" type="datetimeFigureOut">
               <a:rPr lang="en-US" smtClean="0"/>
-              <a:t>2/9/24</a:t>
+              <a:t>2/16/24</a:t>
             </a:fld>
             <a:endParaRPr lang="en-US"/>
           </a:p>
@@ -1982,7 +1985,7 @@
           <a:p>
             <a:fld id="{F590127B-264E-4C46-AF4D-D678C54EFD2B}" type="datetimeFigureOut">
               <a:rPr lang="en-US" smtClean="0"/>
-              <a:t>2/9/24</a:t>
+              <a:t>2/16/24</a:t>
             </a:fld>
             <a:endParaRPr lang="en-US"/>
           </a:p>
@@ -2095,7 +2098,7 @@
           <a:p>
             <a:fld id="{F590127B-264E-4C46-AF4D-D678C54EFD2B}" type="datetimeFigureOut">
               <a:rPr lang="en-US" smtClean="0"/>
-              <a:t>2/9/24</a:t>
+              <a:t>2/16/24</a:t>
             </a:fld>
             <a:endParaRPr lang="en-US"/>
           </a:p>
@@ -2408,7 +2411,7 @@
           <a:p>
             <a:fld id="{F590127B-264E-4C46-AF4D-D678C54EFD2B}" type="datetimeFigureOut">
               <a:rPr lang="en-US" smtClean="0"/>
-              <a:t>2/9/24</a:t>
+              <a:t>2/16/24</a:t>
             </a:fld>
             <a:endParaRPr lang="en-US"/>
           </a:p>
@@ -2697,7 +2700,7 @@
           <a:p>
             <a:fld id="{F590127B-264E-4C46-AF4D-D678C54EFD2B}" type="datetimeFigureOut">
               <a:rPr lang="en-US" smtClean="0"/>
-              <a:t>2/9/24</a:t>
+              <a:t>2/16/24</a:t>
             </a:fld>
             <a:endParaRPr lang="en-US"/>
           </a:p>
@@ -2940,7 +2943,7 @@
           <a:p>
             <a:fld id="{F590127B-264E-4C46-AF4D-D678C54EFD2B}" type="datetimeFigureOut">
               <a:rPr lang="en-US" smtClean="0"/>
-              <a:t>2/9/24</a:t>
+              <a:t>2/16/24</a:t>
             </a:fld>
             <a:endParaRPr lang="en-US"/>
           </a:p>
@@ -3455,7 +3458,7 @@
           <p:cNvPr id="2" name="Title 1">
             <a:extLst>
               <a:ext uri="{FF2B5EF4-FFF2-40B4-BE49-F238E27FC236}">
-                <a16:creationId xmlns:a16="http://schemas.microsoft.com/office/drawing/2014/main" id="{2C5E61FB-1A31-48B6-A4B8-BA9841BEDC98}"/>
+                <a16:creationId xmlns:a16="http://schemas.microsoft.com/office/drawing/2014/main" id="{DB3F2B3D-711D-D262-F353-211DA3487E52}"/>
               </a:ext>
             </a:extLst>
           </p:cNvPr>
@@ -3474,24 +3477,8 @@
           <a:lstStyle/>
           <a:p>
             <a:r>
-              <a:rPr lang="en-US"/>
-              <a:t>Michael </a:t>
-            </a:r>
-            <a:r>
-              <a:rPr lang="en-US" err="1"/>
-              <a:t>Tüxen’s</a:t>
-            </a:r>
-            <a:r>
-              <a:rPr lang="en-US"/>
-              <a:t> and Hannes </a:t>
-            </a:r>
-            <a:r>
-              <a:rPr lang="en-US" err="1"/>
-              <a:t>Tschofenig’s</a:t>
-            </a:r>
-            <a:r>
-              <a:rPr lang="en-US"/>
-              <a:t> DTLS over SCTP proposal</a:t>
+              <a:rPr lang="en-US" dirty="0"/>
+              <a:t>B - DTLS Chunk alternative solution proposed by Ericsson</a:t>
             </a:r>
           </a:p>
         </p:txBody>
@@ -3501,7 +3488,7 @@
           <p:cNvPr id="3" name="Content Placeholder 2">
             <a:extLst>
               <a:ext uri="{FF2B5EF4-FFF2-40B4-BE49-F238E27FC236}">
-                <a16:creationId xmlns:a16="http://schemas.microsoft.com/office/drawing/2014/main" id="{85C250AE-823E-D90B-713D-4275A3763199}"/>
+                <a16:creationId xmlns:a16="http://schemas.microsoft.com/office/drawing/2014/main" id="{90801EEA-BAAF-063C-9095-693C0B68320E}"/>
               </a:ext>
             </a:extLst>
           </p:cNvPr>
@@ -3515,86 +3502,88 @@
         <p:spPr/>
         <p:txBody>
           <a:bodyPr>
-            <a:normAutofit lnSpcReduction="10000"/>
+            <a:normAutofit fontScale="92500" lnSpcReduction="10000"/>
           </a:bodyPr>
           <a:lstStyle/>
           <a:p>
             <a:r>
               <a:rPr lang="en-US" dirty="0"/>
-              <a:t>Fragments ULP user messages into multiple SCTP messages</a:t>
-            </a:r>
-          </a:p>
-          <a:p>
-            <a:pPr lvl="1"/>
-            <a:r>
-              <a:rPr lang="en-US" dirty="0"/>
-              <a:t>Requires in-order reliable delivery on streams</a:t>
-            </a:r>
-          </a:p>
-          <a:p>
-            <a:pPr lvl="1"/>
-            <a:r>
-              <a:rPr lang="en-US" dirty="0"/>
-              <a:t>Enables I-Data like interleaving between streams of ULP user messages</a:t>
-            </a:r>
-          </a:p>
-          <a:p>
-            <a:pPr lvl="1"/>
-            <a:r>
-              <a:rPr lang="en-US" dirty="0"/>
-              <a:t>Does not work with partial reliability messages (RFC 3758)</a:t>
-            </a:r>
-          </a:p>
-          <a:p>
-            <a:r>
-              <a:rPr lang="en-US" dirty="0"/>
-              <a:t>Re-authentication based on RFC 9261</a:t>
-            </a:r>
-          </a:p>
-          <a:p>
-            <a:pPr lvl="1"/>
-            <a:r>
-              <a:rPr lang="en-US" dirty="0"/>
-              <a:t>Existing Implementations? </a:t>
-            </a:r>
-          </a:p>
-          <a:p>
-            <a:r>
-              <a:rPr lang="en-US" dirty="0"/>
-              <a:t>Relies on SCTP stack for any replay protection</a:t>
-            </a:r>
-          </a:p>
-          <a:p>
-            <a:r>
-              <a:rPr lang="en-US" dirty="0"/>
-              <a:t>Two crypto passes: </a:t>
-            </a:r>
-          </a:p>
-          <a:p>
-            <a:pPr lvl="1"/>
-            <a:r>
-              <a:rPr lang="en-US" dirty="0"/>
-              <a:t>DTLS over ULP User Messages</a:t>
-            </a:r>
-          </a:p>
-          <a:p>
-            <a:pPr lvl="1"/>
-            <a:r>
-              <a:rPr lang="en-US" dirty="0"/>
-              <a:t>SCTP-AUTH over SCTP Packet Chunks</a:t>
-            </a:r>
-          </a:p>
-          <a:p>
-            <a:endParaRPr lang="en-US" dirty="0"/>
-          </a:p>
-          <a:p>
-            <a:endParaRPr lang="en-US" dirty="0"/>
-          </a:p>
-          <a:p>
-            <a:endParaRPr lang="en-US" dirty="0"/>
-          </a:p>
-          <a:p>
-            <a:pPr lvl="1"/>
+              <a:t>One DTLS record per SCTP packet</a:t>
+            </a:r>
+          </a:p>
+          <a:p>
+            <a:pPr lvl="1"/>
+            <a:r>
+              <a:rPr lang="en-US" dirty="0"/>
+              <a:t>Simple rekeying</a:t>
+            </a:r>
+          </a:p>
+          <a:p>
+            <a:pPr lvl="1"/>
+            <a:r>
+              <a:rPr lang="en-US" dirty="0"/>
+              <a:t>Uses DTLS record size that are common in other DTLS applications</a:t>
+            </a:r>
+          </a:p>
+          <a:p>
+            <a:pPr lvl="1"/>
+            <a:r>
+              <a:rPr lang="en-US" dirty="0"/>
+              <a:t>DTLS Replay protection prevents SCTP stack having to process replayed old packets</a:t>
+            </a:r>
+          </a:p>
+          <a:p>
+            <a:pPr lvl="1"/>
+            <a:r>
+              <a:rPr lang="en-US" dirty="0"/>
+              <a:t>Single Crypto operation pass</a:t>
+            </a:r>
+          </a:p>
+          <a:p>
+            <a:r>
+              <a:rPr lang="en-US" dirty="0"/>
+              <a:t>Encrypts SCTP protocol as well as ULP Data</a:t>
+            </a:r>
+          </a:p>
+          <a:p>
+            <a:r>
+              <a:rPr lang="en-US" dirty="0"/>
+              <a:t>DTLS record processing integrated into SCTP stack</a:t>
+            </a:r>
+          </a:p>
+          <a:p>
+            <a:pPr lvl="1"/>
+            <a:r>
+              <a:rPr lang="en-US" dirty="0"/>
+              <a:t>Kernel SCTP implementations require split DTLS implementation</a:t>
+            </a:r>
+          </a:p>
+          <a:p>
+            <a:r>
+              <a:rPr lang="en-US" dirty="0"/>
+              <a:t>Maximum SCTP Payload MTU: 16384 bytes</a:t>
+            </a:r>
+          </a:p>
+          <a:p>
+            <a:pPr lvl="1"/>
+            <a:r>
+              <a:rPr lang="en-US" dirty="0"/>
+              <a:t>Can be increased to 64 KB by DTLS Record size change (</a:t>
+            </a:r>
+            <a:r>
+              <a:rPr lang="en-GB" b="0" i="0" u="sng" dirty="0">
+                <a:effectLst/>
+                <a:latin typeface="Inter"/>
+                <a:hlinkClick r:id="rId2"/>
+              </a:rPr>
+              <a:t>draft-mattsson-tls-super-jumbo-record-limit-00</a:t>
+            </a:r>
+            <a:r>
+              <a:rPr lang="en-US" dirty="0"/>
+              <a:t>)</a:t>
+            </a:r>
+          </a:p>
+          <a:p>
             <a:endParaRPr lang="en-US" dirty="0"/>
           </a:p>
         </p:txBody>
@@ -3602,7 +3591,7 @@
     </p:spTree>
     <p:extLst>
       <p:ext uri="{BB962C8B-B14F-4D97-AF65-F5344CB8AC3E}">
-        <p14:creationId xmlns:p14="http://schemas.microsoft.com/office/powerpoint/2010/main" val="3259278772"/>
+        <p14:creationId xmlns:p14="http://schemas.microsoft.com/office/powerpoint/2010/main" val="2402584127"/>
       </p:ext>
     </p:extLst>
   </p:cSld>
@@ -3634,6 +3623,192 @@
           <p:cNvPr id="2" name="Title 1">
             <a:extLst>
               <a:ext uri="{FF2B5EF4-FFF2-40B4-BE49-F238E27FC236}">
+                <a16:creationId xmlns:a16="http://schemas.microsoft.com/office/drawing/2014/main" id="{2C5E61FB-1A31-48B6-A4B8-BA9841BEDC98}"/>
+              </a:ext>
+            </a:extLst>
+          </p:cNvPr>
+          <p:cNvSpPr>
+            <a:spLocks noGrp="1"/>
+          </p:cNvSpPr>
+          <p:nvPr>
+            <p:ph type="title"/>
+          </p:nvPr>
+        </p:nvSpPr>
+        <p:spPr/>
+        <p:txBody>
+          <a:bodyPr>
+            <a:normAutofit/>
+          </a:bodyPr>
+          <a:lstStyle/>
+          <a:p>
+            <a:r>
+              <a:rPr lang="en-US" dirty="0"/>
+              <a:t>C - Michael </a:t>
+            </a:r>
+            <a:r>
+              <a:rPr lang="en-US" dirty="0" err="1"/>
+              <a:t>Tüxen’s</a:t>
+            </a:r>
+            <a:r>
+              <a:rPr lang="en-US" dirty="0"/>
+              <a:t> and Hannes </a:t>
+            </a:r>
+            <a:r>
+              <a:rPr lang="en-US" dirty="0" err="1"/>
+              <a:t>Tschofenig’s</a:t>
+            </a:r>
+            <a:r>
+              <a:rPr lang="en-US" dirty="0"/>
+              <a:t> DTLS over SCTP proposal</a:t>
+            </a:r>
+          </a:p>
+        </p:txBody>
+      </p:sp>
+      <p:sp>
+        <p:nvSpPr>
+          <p:cNvPr id="3" name="Content Placeholder 2">
+            <a:extLst>
+              <a:ext uri="{FF2B5EF4-FFF2-40B4-BE49-F238E27FC236}">
+                <a16:creationId xmlns:a16="http://schemas.microsoft.com/office/drawing/2014/main" id="{85C250AE-823E-D90B-713D-4275A3763199}"/>
+              </a:ext>
+            </a:extLst>
+          </p:cNvPr>
+          <p:cNvSpPr>
+            <a:spLocks noGrp="1"/>
+          </p:cNvSpPr>
+          <p:nvPr>
+            <p:ph idx="1"/>
+          </p:nvPr>
+        </p:nvSpPr>
+        <p:spPr/>
+        <p:txBody>
+          <a:bodyPr>
+            <a:normAutofit lnSpcReduction="10000"/>
+          </a:bodyPr>
+          <a:lstStyle/>
+          <a:p>
+            <a:r>
+              <a:rPr lang="en-US" dirty="0"/>
+              <a:t>Fragments ULP user messages into multiple SCTP messages</a:t>
+            </a:r>
+          </a:p>
+          <a:p>
+            <a:pPr lvl="1"/>
+            <a:r>
+              <a:rPr lang="en-US" dirty="0"/>
+              <a:t>Requires in-order reliable delivery on streams</a:t>
+            </a:r>
+          </a:p>
+          <a:p>
+            <a:pPr lvl="1"/>
+            <a:r>
+              <a:rPr lang="en-US" dirty="0"/>
+              <a:t>Enables I-Data like interleaving between streams of ULP user messages</a:t>
+            </a:r>
+          </a:p>
+          <a:p>
+            <a:pPr lvl="1"/>
+            <a:r>
+              <a:rPr lang="en-US" dirty="0"/>
+              <a:t>Does not work with partial reliability messages (RFC 3758)</a:t>
+            </a:r>
+          </a:p>
+          <a:p>
+            <a:r>
+              <a:rPr lang="en-US" dirty="0"/>
+              <a:t>Re-authentication based on RFC 9261</a:t>
+            </a:r>
+          </a:p>
+          <a:p>
+            <a:pPr lvl="1"/>
+            <a:r>
+              <a:rPr lang="en-US" dirty="0"/>
+              <a:t>Cloudflare have implementations, none currently open source</a:t>
+            </a:r>
+          </a:p>
+          <a:p>
+            <a:pPr lvl="1"/>
+            <a:r>
+              <a:rPr lang="en-US" dirty="0"/>
+              <a:t>Implementations are not particular large, one no more than ~300 lines</a:t>
+            </a:r>
+          </a:p>
+          <a:p>
+            <a:r>
+              <a:rPr lang="en-US" dirty="0"/>
+              <a:t>Relies on SCTP stack for any replay protection</a:t>
+            </a:r>
+          </a:p>
+          <a:p>
+            <a:r>
+              <a:rPr lang="en-US" dirty="0"/>
+              <a:t>Two crypto passes: </a:t>
+            </a:r>
+          </a:p>
+          <a:p>
+            <a:pPr lvl="1"/>
+            <a:r>
+              <a:rPr lang="en-US" dirty="0"/>
+              <a:t>DTLS over ULP User Messages</a:t>
+            </a:r>
+          </a:p>
+          <a:p>
+            <a:pPr lvl="1"/>
+            <a:r>
+              <a:rPr lang="en-US" dirty="0"/>
+              <a:t>SCTP-AUTH over SCTP Packet Chunks</a:t>
+            </a:r>
+          </a:p>
+          <a:p>
+            <a:endParaRPr lang="en-US" dirty="0"/>
+          </a:p>
+          <a:p>
+            <a:endParaRPr lang="en-US" dirty="0"/>
+          </a:p>
+          <a:p>
+            <a:endParaRPr lang="en-US" dirty="0"/>
+          </a:p>
+          <a:p>
+            <a:pPr lvl="1"/>
+            <a:endParaRPr lang="en-US" dirty="0"/>
+          </a:p>
+        </p:txBody>
+      </p:sp>
+    </p:spTree>
+    <p:extLst>
+      <p:ext uri="{BB962C8B-B14F-4D97-AF65-F5344CB8AC3E}">
+        <p14:creationId xmlns:p14="http://schemas.microsoft.com/office/powerpoint/2010/main" val="3259278772"/>
+      </p:ext>
+    </p:extLst>
+  </p:cSld>
+  <p:clrMapOvr>
+    <a:masterClrMapping/>
+  </p:clrMapOvr>
+</p:sld>
+</file>
+
+<file path=ppt/slides/slide12.xml><?xml version="1.0" encoding="utf-8"?>
+<p:sld xmlns:a="http://schemas.openxmlformats.org/drawingml/2006/main" xmlns:r="http://schemas.openxmlformats.org/officeDocument/2006/relationships" xmlns:p="http://schemas.openxmlformats.org/presentationml/2006/main">
+  <p:cSld>
+    <p:spTree>
+      <p:nvGrpSpPr>
+        <p:cNvPr id="1" name=""/>
+        <p:cNvGrpSpPr/>
+        <p:nvPr/>
+      </p:nvGrpSpPr>
+      <p:grpSpPr>
+        <a:xfrm>
+          <a:off x="0" y="0"/>
+          <a:ext cx="0" cy="0"/>
+          <a:chOff x="0" y="0"/>
+          <a:chExt cx="0" cy="0"/>
+        </a:xfrm>
+      </p:grpSpPr>
+      <p:sp>
+        <p:nvSpPr>
+          <p:cNvPr id="2" name="Title 1">
+            <a:extLst>
+              <a:ext uri="{FF2B5EF4-FFF2-40B4-BE49-F238E27FC236}">
                 <a16:creationId xmlns:a16="http://schemas.microsoft.com/office/drawing/2014/main" id="{7F6347F7-BC35-2B2E-D9BA-0C1D078D92F5}"/>
               </a:ext>
             </a:extLst>
@@ -3748,8 +3923,8 @@
           </a:p>
           <a:p>
             <a:r>
-              <a:rPr lang="en-GB"/>
-              <a:t>Else </a:t>
+              <a:rPr lang="en-GB" dirty="0"/>
+              <a:t>Else</a:t>
             </a:r>
           </a:p>
           <a:p>
@@ -3781,6 +3956,172 @@
     <p:extLst>
       <p:ext uri="{BB962C8B-B14F-4D97-AF65-F5344CB8AC3E}">
         <p14:creationId xmlns:p14="http://schemas.microsoft.com/office/powerpoint/2010/main" val="789346574"/>
+      </p:ext>
+    </p:extLst>
+  </p:cSld>
+  <p:clrMapOvr>
+    <a:masterClrMapping/>
+  </p:clrMapOvr>
+</p:sld>
+</file>
+
+<file path=ppt/slides/slide13.xml><?xml version="1.0" encoding="utf-8"?>
+<p:sld xmlns:a="http://schemas.openxmlformats.org/drawingml/2006/main" xmlns:r="http://schemas.openxmlformats.org/officeDocument/2006/relationships" xmlns:p="http://schemas.openxmlformats.org/presentationml/2006/main">
+  <p:cSld>
+    <p:spTree>
+      <p:nvGrpSpPr>
+        <p:cNvPr id="1" name=""/>
+        <p:cNvGrpSpPr/>
+        <p:nvPr/>
+      </p:nvGrpSpPr>
+      <p:grpSpPr>
+        <a:xfrm>
+          <a:off x="0" y="0"/>
+          <a:ext cx="0" cy="0"/>
+          <a:chOff x="0" y="0"/>
+          <a:chExt cx="0" cy="0"/>
+        </a:xfrm>
+      </p:grpSpPr>
+      <p:sp>
+        <p:nvSpPr>
+          <p:cNvPr id="2" name="Title 1">
+            <a:extLst>
+              <a:ext uri="{FF2B5EF4-FFF2-40B4-BE49-F238E27FC236}">
+                <a16:creationId xmlns:a16="http://schemas.microsoft.com/office/drawing/2014/main" id="{7BA05CC7-0418-64D6-2C75-95C4C88BFF6C}"/>
+              </a:ext>
+            </a:extLst>
+          </p:cNvPr>
+          <p:cNvSpPr>
+            <a:spLocks noGrp="1"/>
+          </p:cNvSpPr>
+          <p:nvPr>
+            <p:ph type="title"/>
+          </p:nvPr>
+        </p:nvSpPr>
+        <p:spPr/>
+        <p:txBody>
+          <a:bodyPr/>
+          <a:lstStyle/>
+          <a:p>
+            <a:r>
+              <a:rPr lang="en-US" dirty="0"/>
+              <a:t>Summary Slide (Table)</a:t>
+            </a:r>
+          </a:p>
+        </p:txBody>
+      </p:sp>
+      <p:sp>
+        <p:nvSpPr>
+          <p:cNvPr id="3" name="Content Placeholder 2">
+            <a:extLst>
+              <a:ext uri="{FF2B5EF4-FFF2-40B4-BE49-F238E27FC236}">
+                <a16:creationId xmlns:a16="http://schemas.microsoft.com/office/drawing/2014/main" id="{180F53EC-93D6-9DDE-37A3-E839A2770623}"/>
+              </a:ext>
+            </a:extLst>
+          </p:cNvPr>
+          <p:cNvSpPr>
+            <a:spLocks noGrp="1"/>
+          </p:cNvSpPr>
+          <p:nvPr>
+            <p:ph idx="1"/>
+          </p:nvPr>
+        </p:nvSpPr>
+        <p:spPr/>
+        <p:txBody>
+          <a:bodyPr/>
+          <a:lstStyle/>
+          <a:p>
+            <a:endParaRPr lang="en-US"/>
+          </a:p>
+        </p:txBody>
+      </p:sp>
+    </p:spTree>
+    <p:extLst>
+      <p:ext uri="{BB962C8B-B14F-4D97-AF65-F5344CB8AC3E}">
+        <p14:creationId xmlns:p14="http://schemas.microsoft.com/office/powerpoint/2010/main" val="194758082"/>
+      </p:ext>
+    </p:extLst>
+  </p:cSld>
+  <p:clrMapOvr>
+    <a:masterClrMapping/>
+  </p:clrMapOvr>
+</p:sld>
+</file>
+
+<file path=ppt/slides/slide14.xml><?xml version="1.0" encoding="utf-8"?>
+<p:sld xmlns:a="http://schemas.openxmlformats.org/drawingml/2006/main" xmlns:r="http://schemas.openxmlformats.org/officeDocument/2006/relationships" xmlns:p="http://schemas.openxmlformats.org/presentationml/2006/main">
+  <p:cSld>
+    <p:spTree>
+      <p:nvGrpSpPr>
+        <p:cNvPr id="1" name=""/>
+        <p:cNvGrpSpPr/>
+        <p:nvPr/>
+      </p:nvGrpSpPr>
+      <p:grpSpPr>
+        <a:xfrm>
+          <a:off x="0" y="0"/>
+          <a:ext cx="0" cy="0"/>
+          <a:chOff x="0" y="0"/>
+          <a:chExt cx="0" cy="0"/>
+        </a:xfrm>
+      </p:grpSpPr>
+      <p:sp>
+        <p:nvSpPr>
+          <p:cNvPr id="2" name="Title 1">
+            <a:extLst>
+              <a:ext uri="{FF2B5EF4-FFF2-40B4-BE49-F238E27FC236}">
+                <a16:creationId xmlns:a16="http://schemas.microsoft.com/office/drawing/2014/main" id="{3BE4773F-F8CE-4962-F632-B98EE92C957E}"/>
+              </a:ext>
+            </a:extLst>
+          </p:cNvPr>
+          <p:cNvSpPr>
+            <a:spLocks noGrp="1"/>
+          </p:cNvSpPr>
+          <p:nvPr>
+            <p:ph type="title"/>
+          </p:nvPr>
+        </p:nvSpPr>
+        <p:spPr/>
+        <p:txBody>
+          <a:bodyPr/>
+          <a:lstStyle/>
+          <a:p>
+            <a:r>
+              <a:rPr lang="en-US" dirty="0"/>
+              <a:t>WG Question</a:t>
+            </a:r>
+          </a:p>
+        </p:txBody>
+      </p:sp>
+      <p:sp>
+        <p:nvSpPr>
+          <p:cNvPr id="3" name="Content Placeholder 2">
+            <a:extLst>
+              <a:ext uri="{FF2B5EF4-FFF2-40B4-BE49-F238E27FC236}">
+                <a16:creationId xmlns:a16="http://schemas.microsoft.com/office/drawing/2014/main" id="{5F9D3E2F-7FBC-9A5C-EE1D-F9DA827A3C6B}"/>
+              </a:ext>
+            </a:extLst>
+          </p:cNvPr>
+          <p:cNvSpPr>
+            <a:spLocks noGrp="1"/>
+          </p:cNvSpPr>
+          <p:nvPr>
+            <p:ph idx="1"/>
+          </p:nvPr>
+        </p:nvSpPr>
+        <p:spPr/>
+        <p:txBody>
+          <a:bodyPr/>
+          <a:lstStyle/>
+          <a:p>
+            <a:endParaRPr lang="en-US"/>
+          </a:p>
+        </p:txBody>
+      </p:sp>
+    </p:spTree>
+    <p:extLst>
+      <p:ext uri="{BB962C8B-B14F-4D97-AF65-F5344CB8AC3E}">
+        <p14:creationId xmlns:p14="http://schemas.microsoft.com/office/powerpoint/2010/main" val="1014273544"/>
       </p:ext>
     </p:extLst>
   </p:cSld>
@@ -4313,127 +4654,127 @@
           <a:lstStyle/>
           <a:p>
             <a:r>
-              <a:rPr lang="en-US"/>
-              <a:t>DTLS over SCTP based on RFC 6083 proposed by Ericsson</a:t>
-            </a:r>
-          </a:p>
-          <a:p>
-            <a:pPr lvl="1"/>
-            <a:r>
-              <a:rPr lang="en-US">
+              <a:rPr lang="en-US" dirty="0"/>
+              <a:t>A: DTLS over SCTP based on RFC 6083 proposed by Ericsson</a:t>
+            </a:r>
+          </a:p>
+          <a:p>
+            <a:pPr lvl="1"/>
+            <a:r>
+              <a:rPr lang="en-US" dirty="0">
                 <a:hlinkClick r:id="rId2"/>
               </a:rPr>
               <a:t>https://datatracker.ietf.org/doc/draft-ietf-tsvwg-dtls-over-sctp-bis/</a:t>
             </a:r>
-            <a:endParaRPr lang="en-US"/>
-          </a:p>
-          <a:p>
-            <a:pPr lvl="1"/>
-            <a:r>
-              <a:rPr lang="en-US">
+            <a:endParaRPr lang="en-US" dirty="0"/>
+          </a:p>
+          <a:p>
+            <a:pPr lvl="1"/>
+            <a:r>
+              <a:rPr lang="en-US" dirty="0">
                 <a:hlinkClick r:id="rId3"/>
               </a:rPr>
               <a:t>https://datatracker.ietf.org/doc/draft-ietf-tsvwg-rfc4895-bis/</a:t>
             </a:r>
-            <a:endParaRPr lang="en-US"/>
-          </a:p>
-          <a:p>
-            <a:r>
-              <a:rPr lang="en-US"/>
-              <a:t>DTLS Chunk alternative solution proposed by Ericsson</a:t>
-            </a:r>
-          </a:p>
-          <a:p>
-            <a:pPr lvl="1"/>
-            <a:r>
-              <a:rPr lang="en-US">
+            <a:endParaRPr lang="en-US" dirty="0"/>
+          </a:p>
+          <a:p>
+            <a:r>
+              <a:rPr lang="en-US" dirty="0"/>
+              <a:t>B: DTLS Chunk alternative solution proposed by Ericsson</a:t>
+            </a:r>
+          </a:p>
+          <a:p>
+            <a:pPr lvl="1"/>
+            <a:r>
+              <a:rPr lang="en-US" dirty="0">
                 <a:hlinkClick r:id="rId4"/>
               </a:rPr>
               <a:t>https://datatracker.ietf.org/doc/draft-westerlund-tsvwg-sctp-dtls-chunk/</a:t>
             </a:r>
-            <a:endParaRPr lang="en-US"/>
-          </a:p>
-          <a:p>
-            <a:pPr lvl="1"/>
-            <a:r>
-              <a:rPr lang="en-US">
+            <a:endParaRPr lang="en-US" dirty="0"/>
+          </a:p>
+          <a:p>
+            <a:pPr lvl="1"/>
+            <a:r>
+              <a:rPr lang="en-US" dirty="0">
                 <a:hlinkClick r:id="rId5"/>
               </a:rPr>
               <a:t>https://datatracker.ietf.org/doc/draft-westerlund-tsvwg-sctp-dtls-handshake/</a:t>
             </a:r>
-            <a:endParaRPr lang="en-US"/>
-          </a:p>
-          <a:p>
-            <a:r>
-              <a:rPr lang="en-US"/>
-              <a:t>Michael </a:t>
-            </a:r>
-            <a:r>
-              <a:rPr lang="en-US" err="1"/>
+            <a:endParaRPr lang="en-US" dirty="0"/>
+          </a:p>
+          <a:p>
+            <a:r>
+              <a:rPr lang="en-US" dirty="0"/>
+              <a:t>C: Michael </a:t>
+            </a:r>
+            <a:r>
+              <a:rPr lang="en-US" dirty="0" err="1"/>
               <a:t>Tüxen’s</a:t>
             </a:r>
             <a:r>
-              <a:rPr lang="en-US"/>
+              <a:rPr lang="en-US" dirty="0"/>
               <a:t> and Hannes </a:t>
             </a:r>
             <a:r>
-              <a:rPr lang="en-US" err="1"/>
+              <a:rPr lang="en-US" dirty="0" err="1"/>
               <a:t>Tschofenig’s</a:t>
             </a:r>
             <a:r>
-              <a:rPr lang="en-US"/>
+              <a:rPr lang="en-US" dirty="0"/>
               <a:t> DTLS over SCTP proposal</a:t>
             </a:r>
           </a:p>
           <a:p>
             <a:pPr lvl="1"/>
             <a:r>
-              <a:rPr lang="en-US">
+              <a:rPr lang="en-US" dirty="0">
                 <a:hlinkClick r:id="rId6"/>
               </a:rPr>
               <a:t>https://datatracker.ietf.org/doc/draft-tuexen-tsvwg-rfc6083-bis/</a:t>
             </a:r>
-            <a:endParaRPr lang="en-US"/>
-          </a:p>
-          <a:p>
-            <a:pPr lvl="1"/>
-            <a:r>
-              <a:rPr lang="en-US">
+            <a:endParaRPr lang="en-US" dirty="0"/>
+          </a:p>
+          <a:p>
+            <a:pPr lvl="1"/>
+            <a:r>
+              <a:rPr lang="en-US" dirty="0">
                 <a:hlinkClick r:id="rId7"/>
               </a:rPr>
               <a:t>https://datatracker.ietf.org/doc/draft-tuexen-tsvwg-sctp-ppid-frag/</a:t>
             </a:r>
-            <a:endParaRPr lang="en-US"/>
-          </a:p>
-          <a:p>
-            <a:pPr lvl="1"/>
-            <a:r>
-              <a:rPr lang="en-US">
+            <a:endParaRPr lang="en-US" dirty="0"/>
+          </a:p>
+          <a:p>
+            <a:pPr lvl="1"/>
+            <a:r>
+              <a:rPr lang="en-US" dirty="0">
                 <a:hlinkClick r:id="rId3"/>
               </a:rPr>
               <a:t>https://datatracker.ietf.org/doc/draft-ietf-tsvwg-rfc4895-bis/</a:t>
             </a:r>
-            <a:endParaRPr lang="en-US"/>
-          </a:p>
-          <a:p>
-            <a:pPr lvl="1"/>
-            <a:r>
-              <a:rPr lang="en-US">
+            <a:endParaRPr lang="en-US" dirty="0"/>
+          </a:p>
+          <a:p>
+            <a:pPr lvl="1"/>
+            <a:r>
+              <a:rPr lang="en-US" dirty="0">
                 <a:hlinkClick r:id="rId8"/>
               </a:rPr>
               <a:t>https://datatracker.ietf.org/doc/draft-tschofenig-tls-extended-key-update/</a:t>
             </a:r>
-            <a:endParaRPr lang="en-US"/>
-          </a:p>
-          <a:p>
-            <a:pPr lvl="1"/>
-            <a:r>
-              <a:rPr lang="en-US"/>
+            <a:endParaRPr lang="en-US" dirty="0"/>
+          </a:p>
+          <a:p>
+            <a:pPr lvl="1"/>
+            <a:r>
+              <a:rPr lang="en-US" dirty="0"/>
               <a:t>RFC 9261 for periodic Authentication</a:t>
             </a:r>
           </a:p>
           <a:p>
-            <a:endParaRPr lang="en-US"/>
+            <a:endParaRPr lang="en-US" dirty="0"/>
           </a:p>
         </p:txBody>
       </p:sp>
@@ -4677,7 +5018,7 @@
           <a:p>
             <a:r>
               <a:rPr lang="en-US" dirty="0"/>
-              <a:t>DTLS over SCTP per Ericsson’s proposal:</a:t>
+              <a:t>A - DTLS over SCTP per Ericsson’s proposal:</a:t>
             </a:r>
           </a:p>
           <a:p>
@@ -4704,7 +5045,7 @@
           <a:p>
             <a:r>
               <a:rPr lang="en-US" dirty="0"/>
-              <a:t>DTLS Chunk:</a:t>
+              <a:t>B - DTLS Chunk:</a:t>
             </a:r>
           </a:p>
           <a:p>
@@ -4724,7 +5065,7 @@
           <a:p>
             <a:r>
               <a:rPr lang="en-US" dirty="0"/>
-              <a:t>DTLS over SCTP proposal by </a:t>
+              <a:t>C - DTLS over SCTP proposal by </a:t>
             </a:r>
             <a:r>
               <a:rPr lang="en-US" dirty="0" err="1"/>
@@ -4855,44 +5196,44 @@
           <a:lstStyle/>
           <a:p>
             <a:r>
-              <a:rPr lang="en-US"/>
-              <a:t>DTLS over SCTP per Ericsson’s proposal:</a:t>
-            </a:r>
-          </a:p>
-          <a:p>
-            <a:pPr lvl="1"/>
-            <a:r>
-              <a:rPr lang="en-US"/>
+              <a:rPr lang="en-US" dirty="0"/>
+              <a:t>A - DTLS over SCTP per Ericsson’s proposal:</a:t>
+            </a:r>
+          </a:p>
+          <a:p>
+            <a:pPr lvl="1"/>
+            <a:r>
+              <a:rPr lang="en-US" dirty="0"/>
               <a:t>Two IPR disclosures (RAND): </a:t>
             </a:r>
             <a:r>
-              <a:rPr lang="en-US">
+              <a:rPr lang="en-US" dirty="0">
                 <a:hlinkClick r:id="rId2"/>
               </a:rPr>
               <a:t>https://datatracker.ietf.org/ipr/5195/</a:t>
             </a:r>
             <a:r>
-              <a:rPr lang="en-US"/>
+              <a:rPr lang="en-US" dirty="0"/>
               <a:t> </a:t>
             </a:r>
             <a:r>
-              <a:rPr lang="en-US">
+              <a:rPr lang="en-US" dirty="0">
                 <a:hlinkClick r:id="rId3"/>
               </a:rPr>
               <a:t>https://datatracker.ietf.org/ipr/6218/</a:t>
             </a:r>
-            <a:endParaRPr lang="en-US"/>
-          </a:p>
-          <a:p>
-            <a:r>
-              <a:rPr lang="en-US"/>
-              <a:t>DTLS Chunk:</a:t>
-            </a:r>
-          </a:p>
-          <a:p>
-            <a:pPr lvl="1"/>
-            <a:r>
-              <a:rPr lang="en-GB" b="0" i="0" u="none" strike="noStrike">
+            <a:endParaRPr lang="en-US" dirty="0"/>
+          </a:p>
+          <a:p>
+            <a:r>
+              <a:rPr lang="en-US" dirty="0"/>
+              <a:t>B - DTLS Chunk:</a:t>
+            </a:r>
+          </a:p>
+          <a:p>
+            <a:pPr lvl="1"/>
+            <a:r>
+              <a:rPr lang="en-GB" b="0" i="0" u="none" strike="noStrike" dirty="0">
                 <a:solidFill>
                   <a:srgbClr val="212529"/>
                 </a:solidFill>
@@ -4902,7 +5243,7 @@
               <a:t>draft-</a:t>
             </a:r>
             <a:r>
-              <a:rPr lang="en-GB" b="0" i="0" u="none" strike="noStrike" err="1">
+              <a:rPr lang="en-GB" b="0" i="0" u="none" strike="noStrike" dirty="0" err="1">
                 <a:solidFill>
                   <a:srgbClr val="212529"/>
                 </a:solidFill>
@@ -4912,7 +5253,7 @@
               <a:t>westerlund</a:t>
             </a:r>
             <a:r>
-              <a:rPr lang="en-GB" b="0" i="0" u="none" strike="noStrike">
+              <a:rPr lang="en-GB" b="0" i="0" u="none" strike="noStrike" dirty="0">
                 <a:solidFill>
                   <a:srgbClr val="212529"/>
                 </a:solidFill>
@@ -4922,7 +5263,7 @@
               <a:t>-</a:t>
             </a:r>
             <a:r>
-              <a:rPr lang="en-GB" b="0" i="0" u="none" strike="noStrike" err="1">
+              <a:rPr lang="en-GB" b="0" i="0" u="none" strike="noStrike" dirty="0" err="1">
                 <a:solidFill>
                   <a:srgbClr val="212529"/>
                 </a:solidFill>
@@ -4932,7 +5273,7 @@
               <a:t>tsvwg</a:t>
             </a:r>
             <a:r>
-              <a:rPr lang="en-GB" b="0" i="0" u="none" strike="noStrike">
+              <a:rPr lang="en-GB" b="0" i="0" u="none" strike="noStrike" dirty="0">
                 <a:solidFill>
                   <a:srgbClr val="212529"/>
                 </a:solidFill>
@@ -4942,7 +5283,7 @@
               <a:t>-</a:t>
             </a:r>
             <a:r>
-              <a:rPr lang="en-GB" b="0" i="0" u="none" strike="noStrike" err="1">
+              <a:rPr lang="en-GB" b="0" i="0" u="none" strike="noStrike" dirty="0" err="1">
                 <a:solidFill>
                   <a:srgbClr val="212529"/>
                 </a:solidFill>
@@ -4952,7 +5293,7 @@
               <a:t>sctp</a:t>
             </a:r>
             <a:r>
-              <a:rPr lang="en-GB" b="0" i="0" u="none" strike="noStrike">
+              <a:rPr lang="en-GB" b="0" i="0" u="none" strike="noStrike" dirty="0">
                 <a:solidFill>
                   <a:srgbClr val="212529"/>
                 </a:solidFill>
@@ -4962,7 +5303,7 @@
               <a:t>-</a:t>
             </a:r>
             <a:r>
-              <a:rPr lang="en-GB" b="0" i="0" u="none" strike="noStrike" err="1">
+              <a:rPr lang="en-GB" b="0" i="0" u="none" strike="noStrike" dirty="0" err="1">
                 <a:solidFill>
                   <a:srgbClr val="212529"/>
                 </a:solidFill>
@@ -4972,7 +5313,7 @@
               <a:t>dtls</a:t>
             </a:r>
             <a:r>
-              <a:rPr lang="en-GB" b="0" i="0" u="none" strike="noStrike">
+              <a:rPr lang="en-GB" b="0" i="0" u="none" strike="noStrike" dirty="0">
                 <a:solidFill>
                   <a:srgbClr val="212529"/>
                 </a:solidFill>
@@ -4982,7 +5323,7 @@
               <a:t>-chunk: </a:t>
             </a:r>
             <a:r>
-              <a:rPr lang="en-GB" b="0" i="0" u="none" strike="noStrike">
+              <a:rPr lang="en-GB" b="0" i="0" u="none" strike="noStrike" dirty="0">
                 <a:solidFill>
                   <a:srgbClr val="212529"/>
                 </a:solidFill>
@@ -4992,7 +5333,7 @@
               </a:rPr>
               <a:t>https://datatracker.ietf.org/ipr/6219/</a:t>
             </a:r>
-            <a:endParaRPr lang="en-GB" b="0" i="0" u="none" strike="noStrike">
+            <a:endParaRPr lang="en-GB" b="0" i="0" u="none" strike="noStrike" dirty="0">
               <a:solidFill>
                 <a:srgbClr val="212529"/>
               </a:solidFill>
@@ -5003,7 +5344,7 @@
           <a:p>
             <a:pPr lvl="2"/>
             <a:r>
-              <a:rPr lang="en-GB">
+              <a:rPr lang="en-GB" dirty="0">
                 <a:solidFill>
                   <a:srgbClr val="212529"/>
                 </a:solidFill>
@@ -5011,7 +5352,7 @@
               </a:rPr>
               <a:t>Defensive declaration with option of RAND (see disclosure)</a:t>
             </a:r>
-            <a:endParaRPr lang="en-GB" b="0" i="0" u="none" strike="noStrike">
+            <a:endParaRPr lang="en-GB" b="0" i="0" u="none" strike="noStrike" dirty="0">
               <a:solidFill>
                 <a:srgbClr val="212529"/>
               </a:solidFill>
@@ -5022,7 +5363,7 @@
           <a:p>
             <a:pPr lvl="1"/>
             <a:r>
-              <a:rPr lang="en-GB" b="0" i="0" u="none" strike="noStrike">
+              <a:rPr lang="en-GB" b="0" i="0" u="none" strike="noStrike" dirty="0">
                 <a:solidFill>
                   <a:srgbClr val="212529"/>
                 </a:solidFill>
@@ -5032,7 +5373,7 @@
               <a:t>draft-</a:t>
             </a:r>
             <a:r>
-              <a:rPr lang="en-GB" b="0" i="0" u="none" strike="noStrike" err="1">
+              <a:rPr lang="en-GB" b="0" i="0" u="none" strike="noStrike" dirty="0" err="1">
                 <a:solidFill>
                   <a:srgbClr val="212529"/>
                 </a:solidFill>
@@ -5042,7 +5383,7 @@
               <a:t>westerlund</a:t>
             </a:r>
             <a:r>
-              <a:rPr lang="en-GB" b="0" i="0" u="none" strike="noStrike">
+              <a:rPr lang="en-GB" b="0" i="0" u="none" strike="noStrike" dirty="0">
                 <a:solidFill>
                   <a:srgbClr val="212529"/>
                 </a:solidFill>
@@ -5052,7 +5393,7 @@
               <a:t>-</a:t>
             </a:r>
             <a:r>
-              <a:rPr lang="en-GB" b="0" i="0" u="none" strike="noStrike" err="1">
+              <a:rPr lang="en-GB" b="0" i="0" u="none" strike="noStrike" dirty="0" err="1">
                 <a:solidFill>
                   <a:srgbClr val="212529"/>
                 </a:solidFill>
@@ -5062,7 +5403,7 @@
               <a:t>tsvwg</a:t>
             </a:r>
             <a:r>
-              <a:rPr lang="en-GB" b="0" i="0" u="none" strike="noStrike">
+              <a:rPr lang="en-GB" b="0" i="0" u="none" strike="noStrike" dirty="0">
                 <a:solidFill>
                   <a:srgbClr val="212529"/>
                 </a:solidFill>
@@ -5072,7 +5413,7 @@
               <a:t>-</a:t>
             </a:r>
             <a:r>
-              <a:rPr lang="en-GB" b="0" i="0" u="none" strike="noStrike" err="1">
+              <a:rPr lang="en-GB" b="0" i="0" u="none" strike="noStrike" dirty="0" err="1">
                 <a:solidFill>
                   <a:srgbClr val="212529"/>
                 </a:solidFill>
@@ -5082,7 +5423,7 @@
               <a:t>sctp</a:t>
             </a:r>
             <a:r>
-              <a:rPr lang="en-GB" b="0" i="0" u="none" strike="noStrike">
+              <a:rPr lang="en-GB" b="0" i="0" u="none" strike="noStrike" dirty="0">
                 <a:solidFill>
                   <a:srgbClr val="212529"/>
                 </a:solidFill>
@@ -5092,7 +5433,7 @@
               <a:t>-</a:t>
             </a:r>
             <a:r>
-              <a:rPr lang="en-GB" b="0" i="0" u="none" strike="noStrike" err="1">
+              <a:rPr lang="en-GB" b="0" i="0" u="none" strike="noStrike" dirty="0" err="1">
                 <a:solidFill>
                   <a:srgbClr val="212529"/>
                 </a:solidFill>
@@ -5102,7 +5443,7 @@
               <a:t>dtls</a:t>
             </a:r>
             <a:r>
-              <a:rPr lang="en-GB" b="0" i="0" u="none" strike="noStrike">
+              <a:rPr lang="en-GB" b="0" i="0" u="none" strike="noStrike" dirty="0">
                 <a:solidFill>
                   <a:srgbClr val="212529"/>
                 </a:solidFill>
@@ -5112,7 +5453,7 @@
               <a:t>-handshake: </a:t>
             </a:r>
             <a:r>
-              <a:rPr lang="en-GB" b="0" i="0" u="none" strike="noStrike">
+              <a:rPr lang="en-GB" b="0" i="0" u="none" strike="noStrike" dirty="0">
                 <a:solidFill>
                   <a:srgbClr val="212529"/>
                 </a:solidFill>
@@ -5122,31 +5463,31 @@
               </a:rPr>
               <a:t>https://datatracker.ietf.org/ipr/6220/</a:t>
             </a:r>
-            <a:endParaRPr lang="en-US"/>
-          </a:p>
-          <a:p>
-            <a:r>
-              <a:rPr lang="en-US"/>
-              <a:t>DTLS over SCTP proposal by </a:t>
-            </a:r>
-            <a:r>
-              <a:rPr lang="en-US" err="1"/>
+            <a:endParaRPr lang="en-US" dirty="0"/>
+          </a:p>
+          <a:p>
+            <a:r>
+              <a:rPr lang="en-US" dirty="0"/>
+              <a:t>C - DTLS over SCTP proposal by </a:t>
+            </a:r>
+            <a:r>
+              <a:rPr lang="en-US" dirty="0" err="1"/>
               <a:t>Tüxen</a:t>
             </a:r>
             <a:r>
-              <a:rPr lang="en-US"/>
+              <a:rPr lang="en-US" dirty="0"/>
               <a:t> et al</a:t>
             </a:r>
           </a:p>
           <a:p>
             <a:pPr lvl="1"/>
             <a:r>
-              <a:rPr lang="en-US"/>
+              <a:rPr lang="en-US" dirty="0"/>
               <a:t>No IPR disclosures</a:t>
             </a:r>
           </a:p>
           <a:p>
-            <a:endParaRPr lang="en-US"/>
+            <a:endParaRPr lang="en-US" dirty="0"/>
           </a:p>
         </p:txBody>
       </p:sp>
@@ -5185,7 +5526,7 @@
           <p:cNvPr id="2" name="Title 1">
             <a:extLst>
               <a:ext uri="{FF2B5EF4-FFF2-40B4-BE49-F238E27FC236}">
-                <a16:creationId xmlns:a16="http://schemas.microsoft.com/office/drawing/2014/main" id="{51350095-F72E-F3CA-5177-0D8D0F4531DB}"/>
+                <a16:creationId xmlns:a16="http://schemas.microsoft.com/office/drawing/2014/main" id="{4BE99FFC-5000-754A-6D7C-DFFAAD034BD9}"/>
               </a:ext>
             </a:extLst>
           </p:cNvPr>
@@ -5198,14 +5539,12 @@
         </p:nvSpPr>
         <p:spPr/>
         <p:txBody>
-          <a:bodyPr>
-            <a:normAutofit/>
-          </a:bodyPr>
-          <a:lstStyle/>
-          <a:p>
-            <a:r>
-              <a:rPr lang="en-US"/>
-              <a:t>DTLS over SCTP based on RFC 6083 proposed by Ericsson</a:t>
+          <a:bodyPr/>
+          <a:lstStyle/>
+          <a:p>
+            <a:r>
+              <a:rPr lang="en-US" dirty="0"/>
+              <a:t>IPR Implications </a:t>
             </a:r>
           </a:p>
         </p:txBody>
@@ -5215,7 +5554,7 @@
           <p:cNvPr id="3" name="Content Placeholder 2">
             <a:extLst>
               <a:ext uri="{FF2B5EF4-FFF2-40B4-BE49-F238E27FC236}">
-                <a16:creationId xmlns:a16="http://schemas.microsoft.com/office/drawing/2014/main" id="{02E58B88-D52D-C1EB-05DA-225E50348C01}"/>
+                <a16:creationId xmlns:a16="http://schemas.microsoft.com/office/drawing/2014/main" id="{D431D616-3093-A2FB-089D-6C1E791E9973}"/>
               </a:ext>
             </a:extLst>
           </p:cNvPr>
@@ -5228,90 +5567,8 @@
         </p:nvSpPr>
         <p:spPr/>
         <p:txBody>
-          <a:bodyPr>
-            <a:normAutofit fontScale="92500" lnSpcReduction="10000"/>
-          </a:bodyPr>
-          <a:lstStyle/>
-          <a:p>
-            <a:r>
-              <a:rPr lang="en-US"/>
-              <a:t>Depending on DTLS 1.3 features</a:t>
-            </a:r>
-          </a:p>
-          <a:p>
-            <a:pPr lvl="1"/>
-            <a:r>
-              <a:rPr lang="en-US"/>
-              <a:t>DTLS Connection IDs</a:t>
-            </a:r>
-          </a:p>
-          <a:p>
-            <a:pPr lvl="2"/>
-            <a:r>
-              <a:rPr lang="en-US"/>
-              <a:t>Could be engineered around with an DTLS record encapsulation layer</a:t>
-            </a:r>
-          </a:p>
-          <a:p>
-            <a:r>
-              <a:rPr lang="en-US"/>
-              <a:t>Rekeying issue</a:t>
-            </a:r>
-          </a:p>
-          <a:p>
-            <a:pPr lvl="1"/>
-            <a:r>
-              <a:rPr lang="en-US"/>
-              <a:t>Knowing when an old DTLS connection and its SCTP-AUTH key are no longer required</a:t>
-            </a:r>
-          </a:p>
-          <a:p>
-            <a:pPr lvl="1"/>
-            <a:r>
-              <a:rPr lang="en-US"/>
-              <a:t>Interaction with SCTP-AUTH API that limits when key can be replaced</a:t>
-            </a:r>
-          </a:p>
-          <a:p>
-            <a:r>
-              <a:rPr lang="en-US"/>
-              <a:t>Beyond SCTP-AUTH all on top of SCTP Stack</a:t>
-            </a:r>
-          </a:p>
-          <a:p>
-            <a:r>
-              <a:rPr lang="en-US"/>
-              <a:t>Relies on SCTP stack for any replay protection</a:t>
-            </a:r>
-          </a:p>
-          <a:p>
-            <a:r>
-              <a:rPr lang="en-US"/>
-              <a:t>Two crypto passes: </a:t>
-            </a:r>
-          </a:p>
-          <a:p>
-            <a:pPr lvl="1"/>
-            <a:r>
-              <a:rPr lang="en-US"/>
-              <a:t>DTLS over ULP User Messages</a:t>
-            </a:r>
-          </a:p>
-          <a:p>
-            <a:pPr lvl="1"/>
-            <a:r>
-              <a:rPr lang="en-US"/>
-              <a:t>SCTP-AUTH over SCTP Packet Chunks</a:t>
-            </a:r>
-          </a:p>
-          <a:p>
-            <a:pPr lvl="1"/>
-            <a:endParaRPr lang="en-US"/>
-          </a:p>
-          <a:p>
-            <a:pPr lvl="1"/>
-            <a:endParaRPr lang="en-US"/>
-          </a:p>
+          <a:bodyPr/>
+          <a:lstStyle/>
           <a:p>
             <a:endParaRPr lang="en-US"/>
           </a:p>
@@ -5320,7 +5577,7 @@
     </p:spTree>
     <p:extLst>
       <p:ext uri="{BB962C8B-B14F-4D97-AF65-F5344CB8AC3E}">
-        <p14:creationId xmlns:p14="http://schemas.microsoft.com/office/powerpoint/2010/main" val="1639328033"/>
+        <p14:creationId xmlns:p14="http://schemas.microsoft.com/office/powerpoint/2010/main" val="3199833337"/>
       </p:ext>
     </p:extLst>
   </p:cSld>
@@ -5352,7 +5609,7 @@
           <p:cNvPr id="2" name="Title 1">
             <a:extLst>
               <a:ext uri="{FF2B5EF4-FFF2-40B4-BE49-F238E27FC236}">
-                <a16:creationId xmlns:a16="http://schemas.microsoft.com/office/drawing/2014/main" id="{DB3F2B3D-711D-D262-F353-211DA3487E52}"/>
+                <a16:creationId xmlns:a16="http://schemas.microsoft.com/office/drawing/2014/main" id="{51350095-F72E-F3CA-5177-0D8D0F4531DB}"/>
               </a:ext>
             </a:extLst>
           </p:cNvPr>
@@ -5371,8 +5628,8 @@
           <a:lstStyle/>
           <a:p>
             <a:r>
-              <a:rPr lang="en-US"/>
-              <a:t>DTLS Chunk alternative solution proposed by Ericsson</a:t>
+              <a:rPr lang="en-US" dirty="0"/>
+              <a:t>A - DTLS over SCTP based on RFC 6083 proposed by Ericsson</a:t>
             </a:r>
           </a:p>
         </p:txBody>
@@ -5382,7 +5639,7 @@
           <p:cNvPr id="3" name="Content Placeholder 2">
             <a:extLst>
               <a:ext uri="{FF2B5EF4-FFF2-40B4-BE49-F238E27FC236}">
-                <a16:creationId xmlns:a16="http://schemas.microsoft.com/office/drawing/2014/main" id="{90801EEA-BAAF-063C-9095-693C0B68320E}"/>
+                <a16:creationId xmlns:a16="http://schemas.microsoft.com/office/drawing/2014/main" id="{02E58B88-D52D-C1EB-05DA-225E50348C01}"/>
               </a:ext>
             </a:extLst>
           </p:cNvPr>
@@ -5401,91 +5658,93 @@
           <a:lstStyle/>
           <a:p>
             <a:r>
-              <a:rPr lang="en-US" dirty="0"/>
-              <a:t>One DTLS record per SCTP packet</a:t>
-            </a:r>
-          </a:p>
-          <a:p>
-            <a:pPr lvl="1"/>
-            <a:r>
-              <a:rPr lang="en-US" dirty="0"/>
-              <a:t>Simple rekeying</a:t>
-            </a:r>
-          </a:p>
-          <a:p>
-            <a:pPr lvl="1"/>
-            <a:r>
-              <a:rPr lang="en-US" dirty="0"/>
-              <a:t>Uses DTLS record size that are common in other DTLS applications</a:t>
-            </a:r>
-          </a:p>
-          <a:p>
-            <a:pPr lvl="1"/>
-            <a:r>
-              <a:rPr lang="en-US" dirty="0"/>
-              <a:t>DTLS Replay protection prevents SCTP stack having to process replayed old packets</a:t>
-            </a:r>
-          </a:p>
-          <a:p>
-            <a:pPr lvl="1"/>
-            <a:r>
-              <a:rPr lang="en-US" dirty="0"/>
-              <a:t>Single Crypto operation pass</a:t>
-            </a:r>
-          </a:p>
-          <a:p>
-            <a:r>
-              <a:rPr lang="en-US" dirty="0"/>
-              <a:t>Encrypts SCTP protocol as well as ULP Data</a:t>
-            </a:r>
-          </a:p>
-          <a:p>
-            <a:r>
-              <a:rPr lang="en-US" dirty="0"/>
-              <a:t>DTLS record processing integrated into SCTP stack</a:t>
-            </a:r>
-          </a:p>
-          <a:p>
-            <a:pPr lvl="1"/>
-            <a:r>
-              <a:rPr lang="en-US" dirty="0"/>
-              <a:t>Kernel SCTP implementations require split DTLS implementation</a:t>
-            </a:r>
-          </a:p>
-          <a:p>
-            <a:r>
-              <a:rPr lang="en-US" dirty="0"/>
-              <a:t>Maximum SCTP Payload MTU: 16384 bytes</a:t>
-            </a:r>
-          </a:p>
-          <a:p>
-            <a:pPr lvl="1"/>
-            <a:r>
-              <a:rPr lang="en-US" dirty="0"/>
-              <a:t>Can be increased to 64 KB by DTLS Record size change (</a:t>
-            </a:r>
-            <a:r>
-              <a:rPr lang="en-GB" b="0" i="0" u="sng" dirty="0">
-                <a:effectLst/>
-                <a:latin typeface="Inter"/>
-                <a:hlinkClick r:id="rId2"/>
-              </a:rPr>
-              <a:t>draft-mattsson-tls-super-jumbo-record-limit-00</a:t>
-            </a:r>
-            <a:r>
-              <a:rPr lang="en-US" dirty="0"/>
-              <a:t>)</a:t>
-            </a:r>
-          </a:p>
-          <a:p>
-            <a:endParaRPr lang="en-US" dirty="0"/>
+              <a:rPr lang="en-US"/>
+              <a:t>Depending on DTLS 1.3 features</a:t>
+            </a:r>
+          </a:p>
+          <a:p>
+            <a:pPr lvl="1"/>
+            <a:r>
+              <a:rPr lang="en-US"/>
+              <a:t>DTLS Connection IDs</a:t>
+            </a:r>
+          </a:p>
+          <a:p>
+            <a:pPr lvl="2"/>
+            <a:r>
+              <a:rPr lang="en-US"/>
+              <a:t>Could be engineered around with an DTLS record encapsulation layer</a:t>
+            </a:r>
+          </a:p>
+          <a:p>
+            <a:r>
+              <a:rPr lang="en-US"/>
+              <a:t>Rekeying issue</a:t>
+            </a:r>
+          </a:p>
+          <a:p>
+            <a:pPr lvl="1"/>
+            <a:r>
+              <a:rPr lang="en-US"/>
+              <a:t>Knowing when an old DTLS connection and its SCTP-AUTH key are no longer required</a:t>
+            </a:r>
+          </a:p>
+          <a:p>
+            <a:pPr lvl="1"/>
+            <a:r>
+              <a:rPr lang="en-US"/>
+              <a:t>Interaction with SCTP-AUTH API that limits when key can be replaced</a:t>
+            </a:r>
+          </a:p>
+          <a:p>
+            <a:r>
+              <a:rPr lang="en-US"/>
+              <a:t>Beyond SCTP-AUTH all on top of SCTP Stack</a:t>
+            </a:r>
+          </a:p>
+          <a:p>
+            <a:r>
+              <a:rPr lang="en-US"/>
+              <a:t>Relies on SCTP stack for any replay protection</a:t>
+            </a:r>
+          </a:p>
+          <a:p>
+            <a:r>
+              <a:rPr lang="en-US"/>
+              <a:t>Two crypto passes: </a:t>
+            </a:r>
+          </a:p>
+          <a:p>
+            <a:pPr lvl="1"/>
+            <a:r>
+              <a:rPr lang="en-US"/>
+              <a:t>DTLS over ULP User Messages</a:t>
+            </a:r>
+          </a:p>
+          <a:p>
+            <a:pPr lvl="1"/>
+            <a:r>
+              <a:rPr lang="en-US"/>
+              <a:t>SCTP-AUTH over SCTP Packet Chunks</a:t>
+            </a:r>
+          </a:p>
+          <a:p>
+            <a:pPr lvl="1"/>
+            <a:endParaRPr lang="en-US"/>
+          </a:p>
+          <a:p>
+            <a:pPr lvl="1"/>
+            <a:endParaRPr lang="en-US"/>
+          </a:p>
+          <a:p>
+            <a:endParaRPr lang="en-US"/>
           </a:p>
         </p:txBody>
       </p:sp>
     </p:spTree>
     <p:extLst>
       <p:ext uri="{BB962C8B-B14F-4D97-AF65-F5344CB8AC3E}">
-        <p14:creationId xmlns:p14="http://schemas.microsoft.com/office/powerpoint/2010/main" val="2402584127"/>
+        <p14:creationId xmlns:p14="http://schemas.microsoft.com/office/powerpoint/2010/main" val="1639328033"/>
       </p:ext>
     </p:extLst>
   </p:cSld>

</xml_diff>

<commit_message>
Summary slide from Zahed.
</commit_message>
<xml_diff>
--- a/dtls-for-sctp-design-team-report.pptx
+++ b/dtls-for-sctp-design-team-report.pptx
@@ -274,7 +274,7 @@
           <a:p>
             <a:fld id="{F590127B-264E-4C46-AF4D-D678C54EFD2B}" type="datetimeFigureOut">
               <a:rPr lang="en-US" smtClean="0"/>
-              <a:t>2/16/24</a:t>
+              <a:t>2/23/24</a:t>
             </a:fld>
             <a:endParaRPr lang="en-US"/>
           </a:p>
@@ -474,7 +474,7 @@
           <a:p>
             <a:fld id="{F590127B-264E-4C46-AF4D-D678C54EFD2B}" type="datetimeFigureOut">
               <a:rPr lang="en-US" smtClean="0"/>
-              <a:t>2/16/24</a:t>
+              <a:t>2/23/24</a:t>
             </a:fld>
             <a:endParaRPr lang="en-US"/>
           </a:p>
@@ -684,7 +684,7 @@
           <a:p>
             <a:fld id="{F590127B-264E-4C46-AF4D-D678C54EFD2B}" type="datetimeFigureOut">
               <a:rPr lang="en-US" smtClean="0"/>
-              <a:t>2/16/24</a:t>
+              <a:t>2/23/24</a:t>
             </a:fld>
             <a:endParaRPr lang="en-US"/>
           </a:p>
@@ -884,7 +884,7 @@
           <a:p>
             <a:fld id="{F590127B-264E-4C46-AF4D-D678C54EFD2B}" type="datetimeFigureOut">
               <a:rPr lang="en-US" smtClean="0"/>
-              <a:t>2/16/24</a:t>
+              <a:t>2/23/24</a:t>
             </a:fld>
             <a:endParaRPr lang="en-US"/>
           </a:p>
@@ -1160,7 +1160,7 @@
           <a:p>
             <a:fld id="{F590127B-264E-4C46-AF4D-D678C54EFD2B}" type="datetimeFigureOut">
               <a:rPr lang="en-US" smtClean="0"/>
-              <a:t>2/16/24</a:t>
+              <a:t>2/23/24</a:t>
             </a:fld>
             <a:endParaRPr lang="en-US"/>
           </a:p>
@@ -1428,7 +1428,7 @@
           <a:p>
             <a:fld id="{F590127B-264E-4C46-AF4D-D678C54EFD2B}" type="datetimeFigureOut">
               <a:rPr lang="en-US" smtClean="0"/>
-              <a:t>2/16/24</a:t>
+              <a:t>2/23/24</a:t>
             </a:fld>
             <a:endParaRPr lang="en-US"/>
           </a:p>
@@ -1843,7 +1843,7 @@
           <a:p>
             <a:fld id="{F590127B-264E-4C46-AF4D-D678C54EFD2B}" type="datetimeFigureOut">
               <a:rPr lang="en-US" smtClean="0"/>
-              <a:t>2/16/24</a:t>
+              <a:t>2/23/24</a:t>
             </a:fld>
             <a:endParaRPr lang="en-US"/>
           </a:p>
@@ -1985,7 +1985,7 @@
           <a:p>
             <a:fld id="{F590127B-264E-4C46-AF4D-D678C54EFD2B}" type="datetimeFigureOut">
               <a:rPr lang="en-US" smtClean="0"/>
-              <a:t>2/16/24</a:t>
+              <a:t>2/23/24</a:t>
             </a:fld>
             <a:endParaRPr lang="en-US"/>
           </a:p>
@@ -2098,7 +2098,7 @@
           <a:p>
             <a:fld id="{F590127B-264E-4C46-AF4D-D678C54EFD2B}" type="datetimeFigureOut">
               <a:rPr lang="en-US" smtClean="0"/>
-              <a:t>2/16/24</a:t>
+              <a:t>2/23/24</a:t>
             </a:fld>
             <a:endParaRPr lang="en-US"/>
           </a:p>
@@ -2411,7 +2411,7 @@
           <a:p>
             <a:fld id="{F590127B-264E-4C46-AF4D-D678C54EFD2B}" type="datetimeFigureOut">
               <a:rPr lang="en-US" smtClean="0"/>
-              <a:t>2/16/24</a:t>
+              <a:t>2/23/24</a:t>
             </a:fld>
             <a:endParaRPr lang="en-US"/>
           </a:p>
@@ -2700,7 +2700,7 @@
           <a:p>
             <a:fld id="{F590127B-264E-4C46-AF4D-D678C54EFD2B}" type="datetimeFigureOut">
               <a:rPr lang="en-US" smtClean="0"/>
-              <a:t>2/16/24</a:t>
+              <a:t>2/23/24</a:t>
             </a:fld>
             <a:endParaRPr lang="en-US"/>
           </a:p>
@@ -2943,7 +2943,7 @@
           <a:p>
             <a:fld id="{F590127B-264E-4C46-AF4D-D678C54EFD2B}" type="datetimeFigureOut">
               <a:rPr lang="en-US" smtClean="0"/>
-              <a:t>2/16/24</a:t>
+              <a:t>2/23/24</a:t>
             </a:fld>
             <a:endParaRPr lang="en-US"/>
           </a:p>
@@ -4010,31 +4010,802 @@
           </a:p>
         </p:txBody>
       </p:sp>
-      <p:sp>
-        <p:nvSpPr>
-          <p:cNvPr id="3" name="Content Placeholder 2">
-            <a:extLst>
-              <a:ext uri="{FF2B5EF4-FFF2-40B4-BE49-F238E27FC236}">
-                <a16:creationId xmlns:a16="http://schemas.microsoft.com/office/drawing/2014/main" id="{180F53EC-93D6-9DDE-37A3-E839A2770623}"/>
-              </a:ext>
-            </a:extLst>
-          </p:cNvPr>
-          <p:cNvSpPr>
-            <a:spLocks noGrp="1"/>
-          </p:cNvSpPr>
+      <p:graphicFrame>
+        <p:nvGraphicFramePr>
+          <p:cNvPr id="4" name="Content Placeholder 3">
+            <a:extLst>
+              <a:ext uri="{FF2B5EF4-FFF2-40B4-BE49-F238E27FC236}">
+                <a16:creationId xmlns:a16="http://schemas.microsoft.com/office/drawing/2014/main" id="{AF1F8EF6-FC2B-EF38-B9F5-DB6E0778E8AE}"/>
+              </a:ext>
+            </a:extLst>
+          </p:cNvPr>
+          <p:cNvGraphicFramePr>
+            <a:graphicFrameLocks noGrp="1"/>
+          </p:cNvGraphicFramePr>
           <p:nvPr>
             <p:ph idx="1"/>
-          </p:nvPr>
-        </p:nvSpPr>
-        <p:spPr/>
-        <p:txBody>
-          <a:bodyPr/>
-          <a:lstStyle/>
-          <a:p>
-            <a:endParaRPr lang="en-US"/>
-          </a:p>
-        </p:txBody>
-      </p:sp>
+            <p:extLst>
+              <p:ext uri="{D42A27DB-BD31-4B8C-83A1-F6EECF244321}">
+                <p14:modId xmlns:p14="http://schemas.microsoft.com/office/powerpoint/2010/main" val="2162992760"/>
+              </p:ext>
+            </p:extLst>
+          </p:nvPr>
+        </p:nvGraphicFramePr>
+        <p:xfrm>
+          <a:off x="255494" y="293635"/>
+          <a:ext cx="11681012" cy="6270730"/>
+        </p:xfrm>
+        <a:graphic>
+          <a:graphicData uri="http://schemas.openxmlformats.org/drawingml/2006/table">
+            <a:tbl>
+              <a:tblPr firstRow="1" bandRow="1">
+                <a:tableStyleId>{5C22544A-7EE6-4342-B048-85BDC9FD1C3A}</a:tableStyleId>
+              </a:tblPr>
+              <a:tblGrid>
+                <a:gridCol w="1016715">
+                  <a:extLst>
+                    <a:ext uri="{9D8B030D-6E8A-4147-A177-3AD203B41FA5}">
+                      <a16:colId xmlns:a16="http://schemas.microsoft.com/office/drawing/2014/main" val="1327860837"/>
+                    </a:ext>
+                  </a:extLst>
+                </a:gridCol>
+                <a:gridCol w="3949148">
+                  <a:extLst>
+                    <a:ext uri="{9D8B030D-6E8A-4147-A177-3AD203B41FA5}">
+                      <a16:colId xmlns:a16="http://schemas.microsoft.com/office/drawing/2014/main" val="1155448698"/>
+                    </a:ext>
+                  </a:extLst>
+                </a:gridCol>
+                <a:gridCol w="967408">
+                  <a:extLst>
+                    <a:ext uri="{9D8B030D-6E8A-4147-A177-3AD203B41FA5}">
+                      <a16:colId xmlns:a16="http://schemas.microsoft.com/office/drawing/2014/main" val="2041670446"/>
+                    </a:ext>
+                  </a:extLst>
+                </a:gridCol>
+                <a:gridCol w="1311965">
+                  <a:extLst>
+                    <a:ext uri="{9D8B030D-6E8A-4147-A177-3AD203B41FA5}">
+                      <a16:colId xmlns:a16="http://schemas.microsoft.com/office/drawing/2014/main" val="479998577"/>
+                    </a:ext>
+                  </a:extLst>
+                </a:gridCol>
+                <a:gridCol w="1258957">
+                  <a:extLst>
+                    <a:ext uri="{9D8B030D-6E8A-4147-A177-3AD203B41FA5}">
+                      <a16:colId xmlns:a16="http://schemas.microsoft.com/office/drawing/2014/main" val="2134915857"/>
+                    </a:ext>
+                  </a:extLst>
+                </a:gridCol>
+                <a:gridCol w="3176819">
+                  <a:extLst>
+                    <a:ext uri="{9D8B030D-6E8A-4147-A177-3AD203B41FA5}">
+                      <a16:colId xmlns:a16="http://schemas.microsoft.com/office/drawing/2014/main" val="648747510"/>
+                    </a:ext>
+                  </a:extLst>
+                </a:gridCol>
+              </a:tblGrid>
+              <a:tr h="696228">
+                <a:tc>
+                  <a:txBody>
+                    <a:bodyPr/>
+                    <a:lstStyle/>
+                    <a:p>
+                      <a:pPr algn="ctr"/>
+                      <a:r>
+                        <a:rPr lang="en-US" dirty="0"/>
+                        <a:t>Options</a:t>
+                      </a:r>
+                    </a:p>
+                  </a:txBody>
+                  <a:tcPr/>
+                </a:tc>
+                <a:tc>
+                  <a:txBody>
+                    <a:bodyPr/>
+                    <a:lstStyle/>
+                    <a:p>
+                      <a:pPr algn="ctr"/>
+                      <a:r>
+                        <a:rPr lang="en-US" dirty="0"/>
+                        <a:t>Drafts</a:t>
+                      </a:r>
+                    </a:p>
+                  </a:txBody>
+                  <a:tcPr/>
+                </a:tc>
+                <a:tc>
+                  <a:txBody>
+                    <a:bodyPr/>
+                    <a:lstStyle/>
+                    <a:p>
+                      <a:pPr algn="ctr"/>
+                      <a:r>
+                        <a:rPr lang="en-US" dirty="0"/>
+                        <a:t>WG involved</a:t>
+                      </a:r>
+                    </a:p>
+                  </a:txBody>
+                  <a:tcPr/>
+                </a:tc>
+                <a:tc>
+                  <a:txBody>
+                    <a:bodyPr/>
+                    <a:lstStyle/>
+                    <a:p>
+                      <a:pPr algn="ctr"/>
+                      <a:r>
+                        <a:rPr lang="en-US" dirty="0"/>
+                        <a:t>IPRs</a:t>
+                      </a:r>
+                    </a:p>
+                  </a:txBody>
+                  <a:tcPr/>
+                </a:tc>
+                <a:tc>
+                  <a:txBody>
+                    <a:bodyPr/>
+                    <a:lstStyle/>
+                    <a:p>
+                      <a:pPr algn="ctr"/>
+                      <a:r>
+                        <a:rPr lang="en-US" dirty="0"/>
+                        <a:t>Time estimation</a:t>
+                      </a:r>
+                    </a:p>
+                  </a:txBody>
+                  <a:tcPr/>
+                </a:tc>
+                <a:tc>
+                  <a:txBody>
+                    <a:bodyPr/>
+                    <a:lstStyle/>
+                    <a:p>
+                      <a:pPr algn="ctr"/>
+                      <a:r>
+                        <a:rPr lang="en-US" dirty="0"/>
+                        <a:t>Implementation aspects</a:t>
+                      </a:r>
+                    </a:p>
+                  </a:txBody>
+                  <a:tcPr/>
+                </a:tc>
+                <a:extLst>
+                  <a:ext uri="{0D108BD9-81ED-4DB2-BD59-A6C34878D82A}">
+                    <a16:rowId xmlns:a16="http://schemas.microsoft.com/office/drawing/2014/main" val="1551752104"/>
+                  </a:ext>
+                </a:extLst>
+              </a:tr>
+              <a:tr h="994611">
+                <a:tc>
+                  <a:txBody>
+                    <a:bodyPr/>
+                    <a:lstStyle/>
+                    <a:p>
+                      <a:r>
+                        <a:rPr lang="en-US" dirty="0"/>
+                        <a:t>Option A</a:t>
+                      </a:r>
+                    </a:p>
+                  </a:txBody>
+                  <a:tcPr/>
+                </a:tc>
+                <a:tc>
+                  <a:txBody>
+                    <a:bodyPr/>
+                    <a:lstStyle/>
+                    <a:p>
+                      <a:pPr marL="285750" marR="0" lvl="0" indent="-285750" algn="l" defTabSz="914400" rtl="0" eaLnBrk="1" fontAlgn="auto" latinLnBrk="0" hangingPunct="1">
+                        <a:lnSpc>
+                          <a:spcPct val="100000"/>
+                        </a:lnSpc>
+                        <a:spcBef>
+                          <a:spcPts val="0"/>
+                        </a:spcBef>
+                        <a:spcAft>
+                          <a:spcPts val="0"/>
+                        </a:spcAft>
+                        <a:buClrTx/>
+                        <a:buSzTx/>
+                        <a:buFont typeface="Arial" panose="020B0604020202020204" pitchFamily="34" charset="0"/>
+                        <a:buChar char="•"/>
+                        <a:tabLst/>
+                        <a:defRPr/>
+                      </a:pPr>
+                      <a:r>
+                        <a:rPr lang="en-US" dirty="0">
+                          <a:hlinkClick r:id="rId2"/>
+                        </a:rPr>
+                        <a:t>https://datatracker.ietf.org/doc/draft-ietf-tsvwg-dtls-over-sctp-bis/</a:t>
+                      </a:r>
+                      <a:endParaRPr lang="en-US" dirty="0"/>
+                    </a:p>
+                    <a:p>
+                      <a:pPr marL="285750" marR="0" lvl="0" indent="-285750" algn="l" defTabSz="914400" rtl="0" eaLnBrk="1" fontAlgn="auto" latinLnBrk="0" hangingPunct="1">
+                        <a:lnSpc>
+                          <a:spcPct val="100000"/>
+                        </a:lnSpc>
+                        <a:spcBef>
+                          <a:spcPts val="0"/>
+                        </a:spcBef>
+                        <a:spcAft>
+                          <a:spcPts val="0"/>
+                        </a:spcAft>
+                        <a:buClrTx/>
+                        <a:buSzTx/>
+                        <a:buFont typeface="Arial" panose="020B0604020202020204" pitchFamily="34" charset="0"/>
+                        <a:buChar char="•"/>
+                        <a:tabLst/>
+                        <a:defRPr/>
+                      </a:pPr>
+                      <a:r>
+                        <a:rPr lang="en-US" dirty="0">
+                          <a:hlinkClick r:id="rId3"/>
+                        </a:rPr>
+                        <a:t>https://datatracker.ietf.org/doc/draft-ietf-tsvwg-rfc4895-bis/</a:t>
+                      </a:r>
+                      <a:endParaRPr lang="en-US" dirty="0"/>
+                    </a:p>
+                  </a:txBody>
+                  <a:tcPr marL="0" marR="0" marT="0" marB="0"/>
+                </a:tc>
+                <a:tc>
+                  <a:txBody>
+                    <a:bodyPr/>
+                    <a:lstStyle/>
+                    <a:p>
+                      <a:r>
+                        <a:rPr lang="en-US" dirty="0"/>
+                        <a:t>TSVWG</a:t>
+                      </a:r>
+                    </a:p>
+                  </a:txBody>
+                  <a:tcPr/>
+                </a:tc>
+                <a:tc>
+                  <a:txBody>
+                    <a:bodyPr/>
+                    <a:lstStyle/>
+                    <a:p>
+                      <a:r>
+                        <a:rPr lang="en-US" dirty="0"/>
+                        <a:t>Two IPR disclosures (RAND)</a:t>
+                      </a:r>
+                    </a:p>
+                  </a:txBody>
+                  <a:tcPr/>
+                </a:tc>
+                <a:tc>
+                  <a:txBody>
+                    <a:bodyPr/>
+                    <a:lstStyle/>
+                    <a:p>
+                      <a:r>
+                        <a:rPr lang="en-US" dirty="0"/>
+                        <a:t>By end of 2024</a:t>
+                      </a:r>
+                    </a:p>
+                  </a:txBody>
+                  <a:tcPr/>
+                </a:tc>
+                <a:tc>
+                  <a:txBody>
+                    <a:bodyPr/>
+                    <a:lstStyle/>
+                    <a:p>
+                      <a:r>
+                        <a:rPr lang="en-US" dirty="0"/>
+                        <a:t>TDB- IPR impact</a:t>
+                      </a:r>
+                    </a:p>
+                    <a:p>
+                      <a:r>
+                        <a:rPr lang="en-US" dirty="0"/>
+                        <a:t>Major dependencies on implementation on top of SCTP stack</a:t>
+                      </a:r>
+                    </a:p>
+                  </a:txBody>
+                  <a:tcPr/>
+                </a:tc>
+                <a:extLst>
+                  <a:ext uri="{0D108BD9-81ED-4DB2-BD59-A6C34878D82A}">
+                    <a16:rowId xmlns:a16="http://schemas.microsoft.com/office/drawing/2014/main" val="2563062240"/>
+                  </a:ext>
+                </a:extLst>
+              </a:tr>
+              <a:tr h="1292994">
+                <a:tc>
+                  <a:txBody>
+                    <a:bodyPr/>
+                    <a:lstStyle/>
+                    <a:p>
+                      <a:r>
+                        <a:rPr lang="en-US" dirty="0"/>
+                        <a:t>Option B</a:t>
+                      </a:r>
+                    </a:p>
+                  </a:txBody>
+                  <a:tcPr/>
+                </a:tc>
+                <a:tc>
+                  <a:txBody>
+                    <a:bodyPr/>
+                    <a:lstStyle/>
+                    <a:p>
+                      <a:pPr marL="285750" marR="0" lvl="0" indent="-285750" algn="l" defTabSz="914400" rtl="0" eaLnBrk="1" fontAlgn="auto" latinLnBrk="0" hangingPunct="1">
+                        <a:lnSpc>
+                          <a:spcPct val="100000"/>
+                        </a:lnSpc>
+                        <a:spcBef>
+                          <a:spcPts val="0"/>
+                        </a:spcBef>
+                        <a:spcAft>
+                          <a:spcPts val="0"/>
+                        </a:spcAft>
+                        <a:buClrTx/>
+                        <a:buSzTx/>
+                        <a:buFont typeface="Arial" panose="020B0604020202020204" pitchFamily="34" charset="0"/>
+                        <a:buChar char="•"/>
+                        <a:tabLst/>
+                        <a:defRPr/>
+                      </a:pPr>
+                      <a:r>
+                        <a:rPr lang="en-US" dirty="0">
+                          <a:hlinkClick r:id="rId4"/>
+                        </a:rPr>
+                        <a:t>https://datatracker.ietf.org/doc/draft-westerlund-tsvwg-sctp-dtls-chunk/</a:t>
+                      </a:r>
+                      <a:endParaRPr lang="en-US" dirty="0"/>
+                    </a:p>
+                    <a:p>
+                      <a:pPr marL="285750" marR="0" lvl="0" indent="-285750" algn="l" defTabSz="914400" rtl="0" eaLnBrk="1" fontAlgn="auto" latinLnBrk="0" hangingPunct="1">
+                        <a:lnSpc>
+                          <a:spcPct val="100000"/>
+                        </a:lnSpc>
+                        <a:spcBef>
+                          <a:spcPts val="0"/>
+                        </a:spcBef>
+                        <a:spcAft>
+                          <a:spcPts val="0"/>
+                        </a:spcAft>
+                        <a:buClrTx/>
+                        <a:buSzTx/>
+                        <a:buFont typeface="Arial" panose="020B0604020202020204" pitchFamily="34" charset="0"/>
+                        <a:buChar char="•"/>
+                        <a:tabLst/>
+                        <a:defRPr/>
+                      </a:pPr>
+                      <a:r>
+                        <a:rPr lang="en-US" dirty="0">
+                          <a:hlinkClick r:id="rId5"/>
+                        </a:rPr>
+                        <a:t>https://datatracker.ietf.org/doc/draft-westerlund-tsvwg-sctp-dtls-handshake/</a:t>
+                      </a:r>
+                      <a:endParaRPr lang="en-US" dirty="0"/>
+                    </a:p>
+                  </a:txBody>
+                  <a:tcPr/>
+                </a:tc>
+                <a:tc>
+                  <a:txBody>
+                    <a:bodyPr/>
+                    <a:lstStyle/>
+                    <a:p>
+                      <a:pPr marL="0" marR="0" lvl="0" indent="0" algn="l" defTabSz="914400" rtl="0" eaLnBrk="1" fontAlgn="auto" latinLnBrk="0" hangingPunct="1">
+                        <a:lnSpc>
+                          <a:spcPct val="100000"/>
+                        </a:lnSpc>
+                        <a:spcBef>
+                          <a:spcPts val="0"/>
+                        </a:spcBef>
+                        <a:spcAft>
+                          <a:spcPts val="0"/>
+                        </a:spcAft>
+                        <a:buClrTx/>
+                        <a:buSzTx/>
+                        <a:buFontTx/>
+                        <a:buNone/>
+                        <a:tabLst/>
+                        <a:defRPr/>
+                      </a:pPr>
+                      <a:r>
+                        <a:rPr lang="en-US" dirty="0"/>
+                        <a:t>TSVWG</a:t>
+                      </a:r>
+                    </a:p>
+                    <a:p>
+                      <a:endParaRPr lang="en-US" dirty="0"/>
+                    </a:p>
+                  </a:txBody>
+                  <a:tcPr/>
+                </a:tc>
+                <a:tc>
+                  <a:txBody>
+                    <a:bodyPr/>
+                    <a:lstStyle/>
+                    <a:p>
+                      <a:r>
+                        <a:rPr lang="en-US" dirty="0"/>
+                        <a:t>Two IPR disclosures (RAND)</a:t>
+                      </a:r>
+                    </a:p>
+                  </a:txBody>
+                  <a:tcPr/>
+                </a:tc>
+                <a:tc>
+                  <a:txBody>
+                    <a:bodyPr/>
+                    <a:lstStyle/>
+                    <a:p>
+                      <a:pPr marL="0" marR="0" lvl="0" indent="0" algn="l" defTabSz="914400" rtl="0" eaLnBrk="1" fontAlgn="auto" latinLnBrk="0" hangingPunct="1">
+                        <a:lnSpc>
+                          <a:spcPct val="100000"/>
+                        </a:lnSpc>
+                        <a:spcBef>
+                          <a:spcPts val="0"/>
+                        </a:spcBef>
+                        <a:spcAft>
+                          <a:spcPts val="0"/>
+                        </a:spcAft>
+                        <a:buClrTx/>
+                        <a:buSzTx/>
+                        <a:buFontTx/>
+                        <a:buNone/>
+                        <a:tabLst/>
+                        <a:defRPr/>
+                      </a:pPr>
+                      <a:r>
+                        <a:rPr lang="en-US" dirty="0"/>
+                        <a:t>By end of 2024</a:t>
+                      </a:r>
+                    </a:p>
+                    <a:p>
+                      <a:endParaRPr lang="en-US" dirty="0"/>
+                    </a:p>
+                  </a:txBody>
+                  <a:tcPr/>
+                </a:tc>
+                <a:tc>
+                  <a:txBody>
+                    <a:bodyPr/>
+                    <a:lstStyle/>
+                    <a:p>
+                      <a:r>
+                        <a:rPr lang="en-US" dirty="0"/>
+                        <a:t>TDB –IPR impact</a:t>
+                      </a:r>
+                    </a:p>
+                    <a:p>
+                      <a:r>
+                        <a:rPr lang="en-US" dirty="0"/>
+                        <a:t>DTLS record processing integrated into SCTP stack</a:t>
+                      </a:r>
+                    </a:p>
+                    <a:p>
+                      <a:r>
+                        <a:rPr lang="en-US" dirty="0"/>
+                        <a:t>SCTP kernel stack required split DTLS implementation</a:t>
+                      </a:r>
+                    </a:p>
+                  </a:txBody>
+                  <a:tcPr/>
+                </a:tc>
+                <a:extLst>
+                  <a:ext uri="{0D108BD9-81ED-4DB2-BD59-A6C34878D82A}">
+                    <a16:rowId xmlns:a16="http://schemas.microsoft.com/office/drawing/2014/main" val="1268890620"/>
+                  </a:ext>
+                </a:extLst>
+              </a:tr>
+              <a:tr h="2704570">
+                <a:tc>
+                  <a:txBody>
+                    <a:bodyPr/>
+                    <a:lstStyle/>
+                    <a:p>
+                      <a:r>
+                        <a:rPr lang="en-US" dirty="0"/>
+                        <a:t>Option C</a:t>
+                      </a:r>
+                    </a:p>
+                  </a:txBody>
+                  <a:tcPr/>
+                </a:tc>
+                <a:tc>
+                  <a:txBody>
+                    <a:bodyPr/>
+                    <a:lstStyle/>
+                    <a:p>
+                      <a:pPr marL="285750" marR="0" lvl="0" indent="-285750" algn="l" defTabSz="914400" rtl="0" eaLnBrk="1" fontAlgn="auto" latinLnBrk="0" hangingPunct="1">
+                        <a:lnSpc>
+                          <a:spcPct val="100000"/>
+                        </a:lnSpc>
+                        <a:spcBef>
+                          <a:spcPts val="0"/>
+                        </a:spcBef>
+                        <a:spcAft>
+                          <a:spcPts val="0"/>
+                        </a:spcAft>
+                        <a:buClrTx/>
+                        <a:buSzTx/>
+                        <a:buFont typeface="Arial" panose="020B0604020202020204" pitchFamily="34" charset="0"/>
+                        <a:buChar char="•"/>
+                        <a:tabLst/>
+                        <a:defRPr/>
+                      </a:pPr>
+                      <a:r>
+                        <a:rPr lang="en-US" dirty="0">
+                          <a:hlinkClick r:id="rId6"/>
+                        </a:rPr>
+                        <a:t>https://datatracker.ietf.org/doc/draft-tuexen-tsvwg-rfc6083-bis/</a:t>
+                      </a:r>
+                      <a:endParaRPr lang="en-US" dirty="0"/>
+                    </a:p>
+                    <a:p>
+                      <a:pPr marL="285750" marR="0" lvl="0" indent="-285750" algn="l" defTabSz="914400" rtl="0" eaLnBrk="1" fontAlgn="auto" latinLnBrk="0" hangingPunct="1">
+                        <a:lnSpc>
+                          <a:spcPct val="100000"/>
+                        </a:lnSpc>
+                        <a:spcBef>
+                          <a:spcPts val="0"/>
+                        </a:spcBef>
+                        <a:spcAft>
+                          <a:spcPts val="0"/>
+                        </a:spcAft>
+                        <a:buClrTx/>
+                        <a:buSzTx/>
+                        <a:buFont typeface="Arial" panose="020B0604020202020204" pitchFamily="34" charset="0"/>
+                        <a:buChar char="•"/>
+                        <a:tabLst/>
+                        <a:defRPr/>
+                      </a:pPr>
+                      <a:r>
+                        <a:rPr lang="en-US" dirty="0">
+                          <a:hlinkClick r:id="rId7"/>
+                        </a:rPr>
+                        <a:t>https://datatracker.ietf.org/doc/draft-tuexen-tsvwg-sctp-ppid-frag/</a:t>
+                      </a:r>
+                      <a:endParaRPr lang="en-US" dirty="0"/>
+                    </a:p>
+                    <a:p>
+                      <a:pPr marL="285750" marR="0" lvl="0" indent="-285750" algn="l" defTabSz="914400" rtl="0" eaLnBrk="1" fontAlgn="auto" latinLnBrk="0" hangingPunct="1">
+                        <a:lnSpc>
+                          <a:spcPct val="100000"/>
+                        </a:lnSpc>
+                        <a:spcBef>
+                          <a:spcPts val="0"/>
+                        </a:spcBef>
+                        <a:spcAft>
+                          <a:spcPts val="0"/>
+                        </a:spcAft>
+                        <a:buClrTx/>
+                        <a:buSzTx/>
+                        <a:buFont typeface="Arial" panose="020B0604020202020204" pitchFamily="34" charset="0"/>
+                        <a:buChar char="•"/>
+                        <a:tabLst/>
+                        <a:defRPr/>
+                      </a:pPr>
+                      <a:r>
+                        <a:rPr lang="en-US" dirty="0">
+                          <a:hlinkClick r:id="rId3"/>
+                        </a:rPr>
+                        <a:t>https://datatracker.ietf.org/doc/draft-ietf-tsvwg-rfc4895-bis/</a:t>
+                      </a:r>
+                      <a:endParaRPr lang="en-US" dirty="0"/>
+                    </a:p>
+                    <a:p>
+                      <a:pPr marL="285750" marR="0" lvl="0" indent="-285750" algn="l" defTabSz="914400" rtl="0" eaLnBrk="1" fontAlgn="auto" latinLnBrk="0" hangingPunct="1">
+                        <a:lnSpc>
+                          <a:spcPct val="100000"/>
+                        </a:lnSpc>
+                        <a:spcBef>
+                          <a:spcPts val="0"/>
+                        </a:spcBef>
+                        <a:spcAft>
+                          <a:spcPts val="0"/>
+                        </a:spcAft>
+                        <a:buClrTx/>
+                        <a:buSzTx/>
+                        <a:buFont typeface="Arial" panose="020B0604020202020204" pitchFamily="34" charset="0"/>
+                        <a:buChar char="•"/>
+                        <a:tabLst/>
+                        <a:defRPr/>
+                      </a:pPr>
+                      <a:r>
+                        <a:rPr lang="en-US" dirty="0">
+                          <a:hlinkClick r:id="rId8"/>
+                        </a:rPr>
+                        <a:t>https://datatracker.ietf.org/doc/draft-tschofenig-tls-extended-key-update/</a:t>
+                      </a:r>
+                      <a:endParaRPr lang="en-US" dirty="0"/>
+                    </a:p>
+                    <a:p>
+                      <a:pPr marL="285750" marR="0" lvl="0" indent="-285750" algn="l" defTabSz="914400" rtl="0" eaLnBrk="1" fontAlgn="auto" latinLnBrk="0" hangingPunct="1">
+                        <a:lnSpc>
+                          <a:spcPct val="100000"/>
+                        </a:lnSpc>
+                        <a:spcBef>
+                          <a:spcPts val="0"/>
+                        </a:spcBef>
+                        <a:spcAft>
+                          <a:spcPts val="0"/>
+                        </a:spcAft>
+                        <a:buClrTx/>
+                        <a:buSzTx/>
+                        <a:buFont typeface="Arial" panose="020B0604020202020204" pitchFamily="34" charset="0"/>
+                        <a:buChar char="•"/>
+                        <a:tabLst/>
+                        <a:defRPr/>
+                      </a:pPr>
+                      <a:r>
+                        <a:rPr lang="en-US" dirty="0"/>
+                        <a:t>RFC 9261 for periodic Authentication</a:t>
+                      </a:r>
+                    </a:p>
+                  </a:txBody>
+                  <a:tcPr/>
+                </a:tc>
+                <a:tc>
+                  <a:txBody>
+                    <a:bodyPr/>
+                    <a:lstStyle/>
+                    <a:p>
+                      <a:pPr marL="0" marR="0" lvl="0" indent="0" algn="l" defTabSz="914400" rtl="0" eaLnBrk="1" fontAlgn="auto" latinLnBrk="0" hangingPunct="1">
+                        <a:lnSpc>
+                          <a:spcPct val="100000"/>
+                        </a:lnSpc>
+                        <a:spcBef>
+                          <a:spcPts val="0"/>
+                        </a:spcBef>
+                        <a:spcAft>
+                          <a:spcPts val="0"/>
+                        </a:spcAft>
+                        <a:buClrTx/>
+                        <a:buSzTx/>
+                        <a:buFontTx/>
+                        <a:buNone/>
+                        <a:tabLst/>
+                        <a:defRPr/>
+                      </a:pPr>
+                      <a:r>
+                        <a:rPr lang="en-US" dirty="0"/>
+                        <a:t>TSVWG, TLS</a:t>
+                      </a:r>
+                    </a:p>
+                    <a:p>
+                      <a:endParaRPr lang="en-US" dirty="0"/>
+                    </a:p>
+                  </a:txBody>
+                  <a:tcPr/>
+                </a:tc>
+                <a:tc>
+                  <a:txBody>
+                    <a:bodyPr/>
+                    <a:lstStyle/>
+                    <a:p>
+                      <a:r>
+                        <a:rPr lang="en-US" dirty="0"/>
+                        <a:t>0 IPR disclosures</a:t>
+                      </a:r>
+                    </a:p>
+                  </a:txBody>
+                  <a:tcPr/>
+                </a:tc>
+                <a:tc>
+                  <a:txBody>
+                    <a:bodyPr/>
+                    <a:lstStyle/>
+                    <a:p>
+                      <a:pPr marL="0" marR="0" lvl="0" indent="0" algn="l" defTabSz="914400" rtl="0" eaLnBrk="1" fontAlgn="auto" latinLnBrk="0" hangingPunct="1">
+                        <a:lnSpc>
+                          <a:spcPct val="100000"/>
+                        </a:lnSpc>
+                        <a:spcBef>
+                          <a:spcPts val="0"/>
+                        </a:spcBef>
+                        <a:spcAft>
+                          <a:spcPts val="0"/>
+                        </a:spcAft>
+                        <a:buClrTx/>
+                        <a:buSzTx/>
+                        <a:buFontTx/>
+                        <a:buNone/>
+                        <a:tabLst/>
+                        <a:defRPr/>
+                      </a:pPr>
+                      <a:r>
+                        <a:rPr lang="en-US" dirty="0"/>
+                        <a:t>By end of 2024 at TSVWG</a:t>
+                      </a:r>
+                    </a:p>
+                    <a:p>
+                      <a:pPr marL="0" marR="0" lvl="0" indent="0" algn="l" defTabSz="914400" rtl="0" eaLnBrk="1" fontAlgn="auto" latinLnBrk="0" hangingPunct="1">
+                        <a:lnSpc>
+                          <a:spcPct val="100000"/>
+                        </a:lnSpc>
+                        <a:spcBef>
+                          <a:spcPts val="0"/>
+                        </a:spcBef>
+                        <a:spcAft>
+                          <a:spcPts val="0"/>
+                        </a:spcAft>
+                        <a:buClrTx/>
+                        <a:buSzTx/>
+                        <a:buFontTx/>
+                        <a:buNone/>
+                        <a:tabLst/>
+                        <a:defRPr/>
+                      </a:pPr>
+                      <a:endParaRPr lang="en-US" dirty="0"/>
+                    </a:p>
+                    <a:p>
+                      <a:pPr marL="0" marR="0" lvl="0" indent="0" algn="l" defTabSz="914400" rtl="0" eaLnBrk="1" fontAlgn="auto" latinLnBrk="0" hangingPunct="1">
+                        <a:lnSpc>
+                          <a:spcPct val="100000"/>
+                        </a:lnSpc>
+                        <a:spcBef>
+                          <a:spcPts val="0"/>
+                        </a:spcBef>
+                        <a:spcAft>
+                          <a:spcPts val="0"/>
+                        </a:spcAft>
+                        <a:buClrTx/>
+                        <a:buSzTx/>
+                        <a:buFontTx/>
+                        <a:buNone/>
+                        <a:tabLst/>
+                        <a:defRPr/>
+                      </a:pPr>
+                      <a:r>
+                        <a:rPr lang="en-US" dirty="0"/>
+                        <a:t>By end of 2025 at TLS</a:t>
+                      </a:r>
+                    </a:p>
+                    <a:p>
+                      <a:endParaRPr lang="en-US" dirty="0"/>
+                    </a:p>
+                  </a:txBody>
+                  <a:tcPr/>
+                </a:tc>
+                <a:tc>
+                  <a:txBody>
+                    <a:bodyPr/>
+                    <a:lstStyle/>
+                    <a:p>
+                      <a:r>
+                        <a:rPr lang="en-US" dirty="0"/>
+                        <a:t>No Implementation obstacles.</a:t>
+                      </a:r>
+                    </a:p>
+                    <a:p>
+                      <a:r>
+                        <a:rPr lang="en-US" dirty="0"/>
+                        <a:t>Should be available in opensource SCTP implementations.</a:t>
+                      </a:r>
+                    </a:p>
+                    <a:p>
+                      <a:r>
+                        <a:rPr lang="en-US" dirty="0"/>
+                        <a:t>No changes to current split between SCTP stack and SSL/</a:t>
+                      </a:r>
+                      <a:r>
+                        <a:rPr lang="en-US"/>
+                        <a:t>TLS libraries</a:t>
+                      </a:r>
+                      <a:endParaRPr lang="en-US" dirty="0"/>
+                    </a:p>
+                  </a:txBody>
+                  <a:tcPr/>
+                </a:tc>
+                <a:extLst>
+                  <a:ext uri="{0D108BD9-81ED-4DB2-BD59-A6C34878D82A}">
+                    <a16:rowId xmlns:a16="http://schemas.microsoft.com/office/drawing/2014/main" val="955483414"/>
+                  </a:ext>
+                </a:extLst>
+              </a:tr>
+            </a:tbl>
+          </a:graphicData>
+        </a:graphic>
+      </p:graphicFrame>
     </p:spTree>
     <p:extLst>
       <p:ext uri="{BB962C8B-B14F-4D97-AF65-F5344CB8AC3E}">

</xml_diff>

<commit_message>
Adding IPR implications, and edits to summary
</commit_message>
<xml_diff>
--- a/dtls-for-sctp-design-team-report.pptx
+++ b/dtls-for-sctp-design-team-report.pptx
@@ -4,6 +4,9 @@
   <p:sldMasterIdLst>
     <p:sldMasterId id="2147483648" r:id="rId1"/>
   </p:sldMasterIdLst>
+  <p:notesMasterIdLst>
+    <p:notesMasterId r:id="rId16"/>
+  </p:notesMasterIdLst>
   <p:sldIdLst>
     <p:sldId id="258" r:id="rId2"/>
     <p:sldId id="259" r:id="rId3"/>
@@ -123,6 +126,440 @@
     </p:ext>
   </p:extLst>
 </p:presentation>
+</file>
+
+<file path=ppt/notesMasters/notesMaster1.xml><?xml version="1.0" encoding="utf-8"?>
+<p:notesMaster xmlns:a="http://schemas.openxmlformats.org/drawingml/2006/main" xmlns:r="http://schemas.openxmlformats.org/officeDocument/2006/relationships" xmlns:p="http://schemas.openxmlformats.org/presentationml/2006/main">
+  <p:cSld>
+    <p:bg>
+      <p:bgRef idx="1001">
+        <a:schemeClr val="bg1"/>
+      </p:bgRef>
+    </p:bg>
+    <p:spTree>
+      <p:nvGrpSpPr>
+        <p:cNvPr id="1" name=""/>
+        <p:cNvGrpSpPr/>
+        <p:nvPr/>
+      </p:nvGrpSpPr>
+      <p:grpSpPr>
+        <a:xfrm>
+          <a:off x="0" y="0"/>
+          <a:ext cx="0" cy="0"/>
+          <a:chOff x="0" y="0"/>
+          <a:chExt cx="0" cy="0"/>
+        </a:xfrm>
+      </p:grpSpPr>
+      <p:sp>
+        <p:nvSpPr>
+          <p:cNvPr id="2" name="Header Placeholder 1"/>
+          <p:cNvSpPr>
+            <a:spLocks noGrp="1"/>
+          </p:cNvSpPr>
+          <p:nvPr>
+            <p:ph type="hdr" sz="quarter"/>
+          </p:nvPr>
+        </p:nvSpPr>
+        <p:spPr>
+          <a:xfrm>
+            <a:off x="0" y="0"/>
+            <a:ext cx="2971800" cy="458788"/>
+          </a:xfrm>
+          <a:prstGeom prst="rect">
+            <a:avLst/>
+          </a:prstGeom>
+        </p:spPr>
+        <p:txBody>
+          <a:bodyPr vert="horz" lIns="91440" tIns="45720" rIns="91440" bIns="45720" rtlCol="0"/>
+          <a:lstStyle>
+            <a:lvl1pPr algn="l">
+              <a:defRPr sz="1200"/>
+            </a:lvl1pPr>
+          </a:lstStyle>
+          <a:p>
+            <a:endParaRPr lang="en-US"/>
+          </a:p>
+        </p:txBody>
+      </p:sp>
+      <p:sp>
+        <p:nvSpPr>
+          <p:cNvPr id="3" name="Date Placeholder 2"/>
+          <p:cNvSpPr>
+            <a:spLocks noGrp="1"/>
+          </p:cNvSpPr>
+          <p:nvPr>
+            <p:ph type="dt" idx="1"/>
+          </p:nvPr>
+        </p:nvSpPr>
+        <p:spPr>
+          <a:xfrm>
+            <a:off x="3884613" y="0"/>
+            <a:ext cx="2971800" cy="458788"/>
+          </a:xfrm>
+          <a:prstGeom prst="rect">
+            <a:avLst/>
+          </a:prstGeom>
+        </p:spPr>
+        <p:txBody>
+          <a:bodyPr vert="horz" lIns="91440" tIns="45720" rIns="91440" bIns="45720" rtlCol="0"/>
+          <a:lstStyle>
+            <a:lvl1pPr algn="r">
+              <a:defRPr sz="1200"/>
+            </a:lvl1pPr>
+          </a:lstStyle>
+          <a:p>
+            <a:fld id="{C9923096-100F-074F-9CA1-3F642340D143}" type="datetimeFigureOut">
+              <a:rPr lang="en-US" smtClean="0"/>
+              <a:t>2/23/24</a:t>
+            </a:fld>
+            <a:endParaRPr lang="en-US"/>
+          </a:p>
+        </p:txBody>
+      </p:sp>
+      <p:sp>
+        <p:nvSpPr>
+          <p:cNvPr id="4" name="Slide Image Placeholder 3"/>
+          <p:cNvSpPr>
+            <a:spLocks noGrp="1" noRot="1" noChangeAspect="1"/>
+          </p:cNvSpPr>
+          <p:nvPr>
+            <p:ph type="sldImg" idx="2"/>
+          </p:nvPr>
+        </p:nvSpPr>
+        <p:spPr>
+          <a:xfrm>
+            <a:off x="685800" y="1143000"/>
+            <a:ext cx="5486400" cy="3086100"/>
+          </a:xfrm>
+          <a:prstGeom prst="rect">
+            <a:avLst/>
+          </a:prstGeom>
+          <a:noFill/>
+          <a:ln w="12700">
+            <a:solidFill>
+              <a:prstClr val="black"/>
+            </a:solidFill>
+          </a:ln>
+        </p:spPr>
+        <p:txBody>
+          <a:bodyPr vert="horz" lIns="91440" tIns="45720" rIns="91440" bIns="45720" rtlCol="0" anchor="ctr"/>
+          <a:lstStyle/>
+          <a:p>
+            <a:endParaRPr lang="en-US"/>
+          </a:p>
+        </p:txBody>
+      </p:sp>
+      <p:sp>
+        <p:nvSpPr>
+          <p:cNvPr id="5" name="Notes Placeholder 4"/>
+          <p:cNvSpPr>
+            <a:spLocks noGrp="1"/>
+          </p:cNvSpPr>
+          <p:nvPr>
+            <p:ph type="body" sz="quarter" idx="3"/>
+          </p:nvPr>
+        </p:nvSpPr>
+        <p:spPr>
+          <a:xfrm>
+            <a:off x="685800" y="4400550"/>
+            <a:ext cx="5486400" cy="3600450"/>
+          </a:xfrm>
+          <a:prstGeom prst="rect">
+            <a:avLst/>
+          </a:prstGeom>
+        </p:spPr>
+        <p:txBody>
+          <a:bodyPr vert="horz" lIns="91440" tIns="45720" rIns="91440" bIns="45720" rtlCol="0"/>
+          <a:lstStyle/>
+          <a:p>
+            <a:pPr lvl="0"/>
+            <a:r>
+              <a:rPr lang="en-GB"/>
+              <a:t>Click to edit Master text styles</a:t>
+            </a:r>
+          </a:p>
+          <a:p>
+            <a:pPr lvl="1"/>
+            <a:r>
+              <a:rPr lang="en-GB"/>
+              <a:t>Second level</a:t>
+            </a:r>
+          </a:p>
+          <a:p>
+            <a:pPr lvl="2"/>
+            <a:r>
+              <a:rPr lang="en-GB"/>
+              <a:t>Third level</a:t>
+            </a:r>
+          </a:p>
+          <a:p>
+            <a:pPr lvl="3"/>
+            <a:r>
+              <a:rPr lang="en-GB"/>
+              <a:t>Fourth level</a:t>
+            </a:r>
+          </a:p>
+          <a:p>
+            <a:pPr lvl="4"/>
+            <a:r>
+              <a:rPr lang="en-GB"/>
+              <a:t>Fifth level</a:t>
+            </a:r>
+            <a:endParaRPr lang="en-US"/>
+          </a:p>
+        </p:txBody>
+      </p:sp>
+      <p:sp>
+        <p:nvSpPr>
+          <p:cNvPr id="6" name="Footer Placeholder 5"/>
+          <p:cNvSpPr>
+            <a:spLocks noGrp="1"/>
+          </p:cNvSpPr>
+          <p:nvPr>
+            <p:ph type="ftr" sz="quarter" idx="4"/>
+          </p:nvPr>
+        </p:nvSpPr>
+        <p:spPr>
+          <a:xfrm>
+            <a:off x="0" y="8685213"/>
+            <a:ext cx="2971800" cy="458787"/>
+          </a:xfrm>
+          <a:prstGeom prst="rect">
+            <a:avLst/>
+          </a:prstGeom>
+        </p:spPr>
+        <p:txBody>
+          <a:bodyPr vert="horz" lIns="91440" tIns="45720" rIns="91440" bIns="45720" rtlCol="0" anchor="b"/>
+          <a:lstStyle>
+            <a:lvl1pPr algn="l">
+              <a:defRPr sz="1200"/>
+            </a:lvl1pPr>
+          </a:lstStyle>
+          <a:p>
+            <a:endParaRPr lang="en-US"/>
+          </a:p>
+        </p:txBody>
+      </p:sp>
+      <p:sp>
+        <p:nvSpPr>
+          <p:cNvPr id="7" name="Slide Number Placeholder 6"/>
+          <p:cNvSpPr>
+            <a:spLocks noGrp="1"/>
+          </p:cNvSpPr>
+          <p:nvPr>
+            <p:ph type="sldNum" sz="quarter" idx="5"/>
+          </p:nvPr>
+        </p:nvSpPr>
+        <p:spPr>
+          <a:xfrm>
+            <a:off x="3884613" y="8685213"/>
+            <a:ext cx="2971800" cy="458787"/>
+          </a:xfrm>
+          <a:prstGeom prst="rect">
+            <a:avLst/>
+          </a:prstGeom>
+        </p:spPr>
+        <p:txBody>
+          <a:bodyPr vert="horz" lIns="91440" tIns="45720" rIns="91440" bIns="45720" rtlCol="0" anchor="b"/>
+          <a:lstStyle>
+            <a:lvl1pPr algn="r">
+              <a:defRPr sz="1200"/>
+            </a:lvl1pPr>
+          </a:lstStyle>
+          <a:p>
+            <a:fld id="{05ACF06C-0BE7-BA48-8EDF-19B0C11EA7B8}" type="slidenum">
+              <a:rPr lang="en-US" smtClean="0"/>
+              <a:t>‹#›</a:t>
+            </a:fld>
+            <a:endParaRPr lang="en-US"/>
+          </a:p>
+        </p:txBody>
+      </p:sp>
+    </p:spTree>
+    <p:extLst>
+      <p:ext uri="{BB962C8B-B14F-4D97-AF65-F5344CB8AC3E}">
+        <p14:creationId xmlns:p14="http://schemas.microsoft.com/office/powerpoint/2010/main" val="1357077258"/>
+      </p:ext>
+    </p:extLst>
+  </p:cSld>
+  <p:clrMap bg1="lt1" tx1="dk1" bg2="lt2" tx2="dk2" accent1="accent1" accent2="accent2" accent3="accent3" accent4="accent4" accent5="accent5" accent6="accent6" hlink="hlink" folHlink="folHlink"/>
+  <p:notesStyle>
+    <a:lvl1pPr marL="0" algn="l" defTabSz="914400" rtl="0" eaLnBrk="1" latinLnBrk="0" hangingPunct="1">
+      <a:defRPr sz="1200" kern="1200">
+        <a:solidFill>
+          <a:schemeClr val="tx1"/>
+        </a:solidFill>
+        <a:latin typeface="+mn-lt"/>
+        <a:ea typeface="+mn-ea"/>
+        <a:cs typeface="+mn-cs"/>
+      </a:defRPr>
+    </a:lvl1pPr>
+    <a:lvl2pPr marL="457200" algn="l" defTabSz="914400" rtl="0" eaLnBrk="1" latinLnBrk="0" hangingPunct="1">
+      <a:defRPr sz="1200" kern="1200">
+        <a:solidFill>
+          <a:schemeClr val="tx1"/>
+        </a:solidFill>
+        <a:latin typeface="+mn-lt"/>
+        <a:ea typeface="+mn-ea"/>
+        <a:cs typeface="+mn-cs"/>
+      </a:defRPr>
+    </a:lvl2pPr>
+    <a:lvl3pPr marL="914400" algn="l" defTabSz="914400" rtl="0" eaLnBrk="1" latinLnBrk="0" hangingPunct="1">
+      <a:defRPr sz="1200" kern="1200">
+        <a:solidFill>
+          <a:schemeClr val="tx1"/>
+        </a:solidFill>
+        <a:latin typeface="+mn-lt"/>
+        <a:ea typeface="+mn-ea"/>
+        <a:cs typeface="+mn-cs"/>
+      </a:defRPr>
+    </a:lvl3pPr>
+    <a:lvl4pPr marL="1371600" algn="l" defTabSz="914400" rtl="0" eaLnBrk="1" latinLnBrk="0" hangingPunct="1">
+      <a:defRPr sz="1200" kern="1200">
+        <a:solidFill>
+          <a:schemeClr val="tx1"/>
+        </a:solidFill>
+        <a:latin typeface="+mn-lt"/>
+        <a:ea typeface="+mn-ea"/>
+        <a:cs typeface="+mn-cs"/>
+      </a:defRPr>
+    </a:lvl4pPr>
+    <a:lvl5pPr marL="1828800" algn="l" defTabSz="914400" rtl="0" eaLnBrk="1" latinLnBrk="0" hangingPunct="1">
+      <a:defRPr sz="1200" kern="1200">
+        <a:solidFill>
+          <a:schemeClr val="tx1"/>
+        </a:solidFill>
+        <a:latin typeface="+mn-lt"/>
+        <a:ea typeface="+mn-ea"/>
+        <a:cs typeface="+mn-cs"/>
+      </a:defRPr>
+    </a:lvl5pPr>
+    <a:lvl6pPr marL="2286000" algn="l" defTabSz="914400" rtl="0" eaLnBrk="1" latinLnBrk="0" hangingPunct="1">
+      <a:defRPr sz="1200" kern="1200">
+        <a:solidFill>
+          <a:schemeClr val="tx1"/>
+        </a:solidFill>
+        <a:latin typeface="+mn-lt"/>
+        <a:ea typeface="+mn-ea"/>
+        <a:cs typeface="+mn-cs"/>
+      </a:defRPr>
+    </a:lvl6pPr>
+    <a:lvl7pPr marL="2743200" algn="l" defTabSz="914400" rtl="0" eaLnBrk="1" latinLnBrk="0" hangingPunct="1">
+      <a:defRPr sz="1200" kern="1200">
+        <a:solidFill>
+          <a:schemeClr val="tx1"/>
+        </a:solidFill>
+        <a:latin typeface="+mn-lt"/>
+        <a:ea typeface="+mn-ea"/>
+        <a:cs typeface="+mn-cs"/>
+      </a:defRPr>
+    </a:lvl7pPr>
+    <a:lvl8pPr marL="3200400" algn="l" defTabSz="914400" rtl="0" eaLnBrk="1" latinLnBrk="0" hangingPunct="1">
+      <a:defRPr sz="1200" kern="1200">
+        <a:solidFill>
+          <a:schemeClr val="tx1"/>
+        </a:solidFill>
+        <a:latin typeface="+mn-lt"/>
+        <a:ea typeface="+mn-ea"/>
+        <a:cs typeface="+mn-cs"/>
+      </a:defRPr>
+    </a:lvl8pPr>
+    <a:lvl9pPr marL="3657600" algn="l" defTabSz="914400" rtl="0" eaLnBrk="1" latinLnBrk="0" hangingPunct="1">
+      <a:defRPr sz="1200" kern="1200">
+        <a:solidFill>
+          <a:schemeClr val="tx1"/>
+        </a:solidFill>
+        <a:latin typeface="+mn-lt"/>
+        <a:ea typeface="+mn-ea"/>
+        <a:cs typeface="+mn-cs"/>
+      </a:defRPr>
+    </a:lvl9pPr>
+  </p:notesStyle>
+</p:notesMaster>
+</file>
+
+<file path=ppt/notesSlides/notesSlide1.xml><?xml version="1.0" encoding="utf-8"?>
+<p:notes xmlns:a="http://schemas.openxmlformats.org/drawingml/2006/main" xmlns:r="http://schemas.openxmlformats.org/officeDocument/2006/relationships" xmlns:p="http://schemas.openxmlformats.org/presentationml/2006/main">
+  <p:cSld>
+    <p:spTree>
+      <p:nvGrpSpPr>
+        <p:cNvPr id="1" name=""/>
+        <p:cNvGrpSpPr/>
+        <p:nvPr/>
+      </p:nvGrpSpPr>
+      <p:grpSpPr>
+        <a:xfrm>
+          <a:off x="0" y="0"/>
+          <a:ext cx="0" cy="0"/>
+          <a:chOff x="0" y="0"/>
+          <a:chExt cx="0" cy="0"/>
+        </a:xfrm>
+      </p:grpSpPr>
+      <p:sp>
+        <p:nvSpPr>
+          <p:cNvPr id="2" name="Slide Image Placeholder 1"/>
+          <p:cNvSpPr>
+            <a:spLocks noGrp="1" noRot="1" noChangeAspect="1"/>
+          </p:cNvSpPr>
+          <p:nvPr>
+            <p:ph type="sldImg"/>
+          </p:nvPr>
+        </p:nvSpPr>
+        <p:spPr/>
+      </p:sp>
+      <p:sp>
+        <p:nvSpPr>
+          <p:cNvPr id="3" name="Notes Placeholder 2"/>
+          <p:cNvSpPr>
+            <a:spLocks noGrp="1"/>
+          </p:cNvSpPr>
+          <p:nvPr>
+            <p:ph type="body" idx="1"/>
+          </p:nvPr>
+        </p:nvSpPr>
+        <p:spPr/>
+        <p:txBody>
+          <a:bodyPr/>
+          <a:lstStyle/>
+          <a:p>
+            <a:endParaRPr lang="en-US" dirty="0"/>
+          </a:p>
+        </p:txBody>
+      </p:sp>
+      <p:sp>
+        <p:nvSpPr>
+          <p:cNvPr id="4" name="Slide Number Placeholder 3"/>
+          <p:cNvSpPr>
+            <a:spLocks noGrp="1"/>
+          </p:cNvSpPr>
+          <p:nvPr>
+            <p:ph type="sldNum" sz="quarter" idx="5"/>
+          </p:nvPr>
+        </p:nvSpPr>
+        <p:spPr/>
+        <p:txBody>
+          <a:bodyPr/>
+          <a:lstStyle/>
+          <a:p>
+            <a:fld id="{05ACF06C-0BE7-BA48-8EDF-19B0C11EA7B8}" type="slidenum">
+              <a:rPr lang="en-US" smtClean="0"/>
+              <a:t>12</a:t>
+            </a:fld>
+            <a:endParaRPr lang="en-US"/>
+          </a:p>
+        </p:txBody>
+      </p:sp>
+    </p:spTree>
+    <p:extLst>
+      <p:ext uri="{BB962C8B-B14F-4D97-AF65-F5344CB8AC3E}">
+        <p14:creationId xmlns:p14="http://schemas.microsoft.com/office/powerpoint/2010/main" val="3899449753"/>
+      </p:ext>
+    </p:extLst>
+  </p:cSld>
+  <p:clrMapOvr>
+    <a:masterClrMapping/>
+  </p:clrMapOvr>
+</p:notes>
 </file>
 
 <file path=ppt/slideLayouts/slideLayout1.xml><?xml version="1.0" encoding="utf-8"?>
@@ -3879,7 +4316,7 @@
             <a:pPr lvl="2"/>
             <a:r>
               <a:rPr lang="en-GB" dirty="0">
-                <a:hlinkClick r:id="rId2"/>
+                <a:hlinkClick r:id="rId3"/>
               </a:rPr>
               <a:t>RAN3</a:t>
             </a:r>
@@ -3892,7 +4329,7 @@
             <a:pPr lvl="2"/>
             <a:r>
               <a:rPr lang="en-GB" dirty="0">
-                <a:hlinkClick r:id="rId3"/>
+                <a:hlinkClick r:id="rId4"/>
               </a:rPr>
               <a:t>SA3</a:t>
             </a:r>
@@ -4026,7 +4463,7 @@
             <p:ph idx="1"/>
             <p:extLst>
               <p:ext uri="{D42A27DB-BD31-4B8C-83A1-F6EECF244321}">
-                <p14:modId xmlns:p14="http://schemas.microsoft.com/office/powerpoint/2010/main" val="2162992760"/>
+                <p14:modId xmlns:p14="http://schemas.microsoft.com/office/powerpoint/2010/main" val="1514431243"/>
               </p:ext>
             </p:extLst>
           </p:nvPr>
@@ -4426,7 +4863,19 @@
                     <a:p>
                       <a:r>
                         <a:rPr lang="en-US" dirty="0"/>
-                        <a:t>Two IPR disclosures (RAND)</a:t>
+                        <a:t>Two IPR disclosures (</a:t>
+                      </a:r>
+                      <a:r>
+                        <a:rPr lang="en-US" dirty="0">
+                          <a:solidFill>
+                            <a:srgbClr val="FF0000"/>
+                          </a:solidFill>
+                        </a:rPr>
+                        <a:t>Defensive + </a:t>
+                      </a:r>
+                      <a:r>
+                        <a:rPr lang="en-US" dirty="0"/>
+                        <a:t>RAND)</a:t>
                       </a:r>
                     </a:p>
                   </a:txBody>
@@ -4785,13 +5234,18 @@
                     <a:p>
                       <a:r>
                         <a:rPr lang="en-US" dirty="0"/>
-                        <a:t>No changes to current split between SCTP stack and SSL/</a:t>
+                        <a:t>No changes to current split between SCTP stack and SSL/TLS libraries</a:t>
                       </a:r>
+                    </a:p>
+                    <a:p>
                       <a:r>
-                        <a:rPr lang="en-US"/>
-                        <a:t>TLS libraries</a:t>
+                        <a:rPr lang="en-US" dirty="0">
+                          <a:solidFill>
+                            <a:srgbClr val="FF0000"/>
+                          </a:solidFill>
+                        </a:rPr>
+                        <a:t>Does not support partial reliability</a:t>
                       </a:r>
-                      <a:endParaRPr lang="en-US" dirty="0"/>
                     </a:p>
                   </a:txBody>
                   <a:tcPr/>
@@ -6341,7 +6795,54 @@
           <a:bodyPr/>
           <a:lstStyle/>
           <a:p>
-            <a:endParaRPr lang="en-US"/>
+            <a:pPr marL="514350" indent="-514350">
+              <a:buFont typeface="+mj-lt"/>
+              <a:buAutoNum type="alphaUcPeriod"/>
+            </a:pPr>
+            <a:r>
+              <a:rPr lang="en-US" dirty="0"/>
+              <a:t>Two RAND license applying to implementation on top of a SCTP stack</a:t>
+            </a:r>
+          </a:p>
+          <a:p>
+            <a:pPr marL="514350" indent="-514350">
+              <a:buFont typeface="+mj-lt"/>
+              <a:buAutoNum type="alphaUcPeriod"/>
+            </a:pPr>
+            <a:r>
+              <a:rPr lang="en-US" dirty="0"/>
+              <a:t>Two different parts:</a:t>
+            </a:r>
+          </a:p>
+          <a:p>
+            <a:pPr marL="971550" lvl="1" indent="-514350">
+              <a:buFont typeface="+mj-lt"/>
+              <a:buAutoNum type="alphaUcPeriod"/>
+            </a:pPr>
+            <a:r>
+              <a:rPr lang="en-US" dirty="0"/>
+              <a:t>Defensive Declaration with option of RAND on implementation that ends up inside SCTP stack attempting to not impact kernel open source</a:t>
+            </a:r>
+          </a:p>
+          <a:p>
+            <a:pPr marL="971550" lvl="1" indent="-514350">
+              <a:buFont typeface="+mj-lt"/>
+              <a:buAutoNum type="alphaUcPeriod"/>
+            </a:pPr>
+            <a:r>
+              <a:rPr lang="en-US" dirty="0"/>
+              <a:t>A RAND license for the Rekeying implementation on top of the SCTP stack</a:t>
+            </a:r>
+          </a:p>
+          <a:p>
+            <a:pPr marL="514350" indent="-514350">
+              <a:buFont typeface="+mj-lt"/>
+              <a:buAutoNum type="alphaUcPeriod"/>
+            </a:pPr>
+            <a:r>
+              <a:rPr lang="en-US" dirty="0"/>
+              <a:t>Currently no IPR disclosure</a:t>
+            </a:r>
           </a:p>
         </p:txBody>
       </p:sp>
@@ -6818,4 +7319,319 @@
     </a:ext>
   </a:extLst>
 </a:theme>
+</file>
+
+<file path=ppt/theme/theme2.xml><?xml version="1.0" encoding="utf-8"?>
+<a:theme xmlns:a="http://schemas.openxmlformats.org/drawingml/2006/main" name="Office Theme">
+  <a:themeElements>
+    <a:clrScheme name="Office">
+      <a:dk1>
+        <a:sysClr val="windowText" lastClr="000000"/>
+      </a:dk1>
+      <a:lt1>
+        <a:sysClr val="window" lastClr="FFFFFF"/>
+      </a:lt1>
+      <a:dk2>
+        <a:srgbClr val="0E2841"/>
+      </a:dk2>
+      <a:lt2>
+        <a:srgbClr val="E8E8E8"/>
+      </a:lt2>
+      <a:accent1>
+        <a:srgbClr val="156082"/>
+      </a:accent1>
+      <a:accent2>
+        <a:srgbClr val="E97132"/>
+      </a:accent2>
+      <a:accent3>
+        <a:srgbClr val="196B24"/>
+      </a:accent3>
+      <a:accent4>
+        <a:srgbClr val="0F9ED5"/>
+      </a:accent4>
+      <a:accent5>
+        <a:srgbClr val="A02B93"/>
+      </a:accent5>
+      <a:accent6>
+        <a:srgbClr val="4EA72E"/>
+      </a:accent6>
+      <a:hlink>
+        <a:srgbClr val="467886"/>
+      </a:hlink>
+      <a:folHlink>
+        <a:srgbClr val="96607D"/>
+      </a:folHlink>
+    </a:clrScheme>
+    <a:fontScheme name="Office">
+      <a:majorFont>
+        <a:latin typeface="Aptos Display" panose="02110004020202020204"/>
+        <a:ea typeface=""/>
+        <a:cs typeface=""/>
+        <a:font script="Jpan" typeface="游ゴシック Light"/>
+        <a:font script="Hang" typeface="맑은 고딕"/>
+        <a:font script="Hans" typeface="等线 Light"/>
+        <a:font script="Hant" typeface="新細明體"/>
+        <a:font script="Arab" typeface="Times New Roman"/>
+        <a:font script="Hebr" typeface="Times New Roman"/>
+        <a:font script="Thai" typeface="Angsana New"/>
+        <a:font script="Ethi" typeface="Nyala"/>
+        <a:font script="Beng" typeface="Vrinda"/>
+        <a:font script="Gujr" typeface="Shruti"/>
+        <a:font script="Khmr" typeface="MoolBoran"/>
+        <a:font script="Knda" typeface="Tunga"/>
+        <a:font script="Guru" typeface="Raavi"/>
+        <a:font script="Cans" typeface="Euphemia"/>
+        <a:font script="Cher" typeface="Plantagenet Cherokee"/>
+        <a:font script="Yiii" typeface="Microsoft Yi Baiti"/>
+        <a:font script="Tibt" typeface="Microsoft Himalaya"/>
+        <a:font script="Thaa" typeface="MV Boli"/>
+        <a:font script="Deva" typeface="Mangal"/>
+        <a:font script="Telu" typeface="Gautami"/>
+        <a:font script="Taml" typeface="Latha"/>
+        <a:font script="Syrc" typeface="Estrangelo Edessa"/>
+        <a:font script="Orya" typeface="Kalinga"/>
+        <a:font script="Mlym" typeface="Kartika"/>
+        <a:font script="Laoo" typeface="DokChampa"/>
+        <a:font script="Sinh" typeface="Iskoola Pota"/>
+        <a:font script="Mong" typeface="Mongolian Baiti"/>
+        <a:font script="Viet" typeface="Times New Roman"/>
+        <a:font script="Uigh" typeface="Microsoft Uighur"/>
+        <a:font script="Geor" typeface="Sylfaen"/>
+        <a:font script="Armn" typeface="Arial"/>
+        <a:font script="Bugi" typeface="Leelawadee UI"/>
+        <a:font script="Bopo" typeface="Microsoft JhengHei"/>
+        <a:font script="Java" typeface="Javanese Text"/>
+        <a:font script="Lisu" typeface="Segoe UI"/>
+        <a:font script="Mymr" typeface="Myanmar Text"/>
+        <a:font script="Nkoo" typeface="Ebrima"/>
+        <a:font script="Olck" typeface="Nirmala UI"/>
+        <a:font script="Osma" typeface="Ebrima"/>
+        <a:font script="Phag" typeface="Phagspa"/>
+        <a:font script="Syrn" typeface="Estrangelo Edessa"/>
+        <a:font script="Syrj" typeface="Estrangelo Edessa"/>
+        <a:font script="Syre" typeface="Estrangelo Edessa"/>
+        <a:font script="Sora" typeface="Nirmala UI"/>
+        <a:font script="Tale" typeface="Microsoft Tai Le"/>
+        <a:font script="Talu" typeface="Microsoft New Tai Lue"/>
+        <a:font script="Tfng" typeface="Ebrima"/>
+      </a:majorFont>
+      <a:minorFont>
+        <a:latin typeface="Aptos" panose="02110004020202020204"/>
+        <a:ea typeface=""/>
+        <a:cs typeface=""/>
+        <a:font script="Jpan" typeface="游ゴシック"/>
+        <a:font script="Hang" typeface="맑은 고딕"/>
+        <a:font script="Hans" typeface="等线"/>
+        <a:font script="Hant" typeface="新細明體"/>
+        <a:font script="Arab" typeface="Arial"/>
+        <a:font script="Hebr" typeface="Arial"/>
+        <a:font script="Thai" typeface="Cordia New"/>
+        <a:font script="Ethi" typeface="Nyala"/>
+        <a:font script="Beng" typeface="Vrinda"/>
+        <a:font script="Gujr" typeface="Shruti"/>
+        <a:font script="Khmr" typeface="DaunPenh"/>
+        <a:font script="Knda" typeface="Tunga"/>
+        <a:font script="Guru" typeface="Raavi"/>
+        <a:font script="Cans" typeface="Euphemia"/>
+        <a:font script="Cher" typeface="Plantagenet Cherokee"/>
+        <a:font script="Yiii" typeface="Microsoft Yi Baiti"/>
+        <a:font script="Tibt" typeface="Microsoft Himalaya"/>
+        <a:font script="Thaa" typeface="MV Boli"/>
+        <a:font script="Deva" typeface="Mangal"/>
+        <a:font script="Telu" typeface="Gautami"/>
+        <a:font script="Taml" typeface="Latha"/>
+        <a:font script="Syrc" typeface="Estrangelo Edessa"/>
+        <a:font script="Orya" typeface="Kalinga"/>
+        <a:font script="Mlym" typeface="Kartika"/>
+        <a:font script="Laoo" typeface="DokChampa"/>
+        <a:font script="Sinh" typeface="Iskoola Pota"/>
+        <a:font script="Mong" typeface="Mongolian Baiti"/>
+        <a:font script="Viet" typeface="Arial"/>
+        <a:font script="Uigh" typeface="Microsoft Uighur"/>
+        <a:font script="Geor" typeface="Sylfaen"/>
+        <a:font script="Armn" typeface="Arial"/>
+        <a:font script="Bugi" typeface="Leelawadee UI"/>
+        <a:font script="Bopo" typeface="Microsoft JhengHei"/>
+        <a:font script="Java" typeface="Javanese Text"/>
+        <a:font script="Lisu" typeface="Segoe UI"/>
+        <a:font script="Mymr" typeface="Myanmar Text"/>
+        <a:font script="Nkoo" typeface="Ebrima"/>
+        <a:font script="Olck" typeface="Nirmala UI"/>
+        <a:font script="Osma" typeface="Ebrima"/>
+        <a:font script="Phag" typeface="Phagspa"/>
+        <a:font script="Syrn" typeface="Estrangelo Edessa"/>
+        <a:font script="Syrj" typeface="Estrangelo Edessa"/>
+        <a:font script="Syre" typeface="Estrangelo Edessa"/>
+        <a:font script="Sora" typeface="Nirmala UI"/>
+        <a:font script="Tale" typeface="Microsoft Tai Le"/>
+        <a:font script="Talu" typeface="Microsoft New Tai Lue"/>
+        <a:font script="Tfng" typeface="Ebrima"/>
+      </a:minorFont>
+    </a:fontScheme>
+    <a:fmtScheme name="Office">
+      <a:fillStyleLst>
+        <a:solidFill>
+          <a:schemeClr val="phClr"/>
+        </a:solidFill>
+        <a:gradFill rotWithShape="1">
+          <a:gsLst>
+            <a:gs pos="0">
+              <a:schemeClr val="phClr">
+                <a:lumMod val="110000"/>
+                <a:satMod val="105000"/>
+                <a:tint val="67000"/>
+              </a:schemeClr>
+            </a:gs>
+            <a:gs pos="50000">
+              <a:schemeClr val="phClr">
+                <a:lumMod val="105000"/>
+                <a:satMod val="103000"/>
+                <a:tint val="73000"/>
+              </a:schemeClr>
+            </a:gs>
+            <a:gs pos="100000">
+              <a:schemeClr val="phClr">
+                <a:lumMod val="105000"/>
+                <a:satMod val="109000"/>
+                <a:tint val="81000"/>
+              </a:schemeClr>
+            </a:gs>
+          </a:gsLst>
+          <a:lin ang="5400000" scaled="0"/>
+        </a:gradFill>
+        <a:gradFill rotWithShape="1">
+          <a:gsLst>
+            <a:gs pos="0">
+              <a:schemeClr val="phClr">
+                <a:satMod val="103000"/>
+                <a:lumMod val="102000"/>
+                <a:tint val="94000"/>
+              </a:schemeClr>
+            </a:gs>
+            <a:gs pos="50000">
+              <a:schemeClr val="phClr">
+                <a:satMod val="110000"/>
+                <a:lumMod val="100000"/>
+                <a:shade val="100000"/>
+              </a:schemeClr>
+            </a:gs>
+            <a:gs pos="100000">
+              <a:schemeClr val="phClr">
+                <a:lumMod val="99000"/>
+                <a:satMod val="120000"/>
+                <a:shade val="78000"/>
+              </a:schemeClr>
+            </a:gs>
+          </a:gsLst>
+          <a:lin ang="5400000" scaled="0"/>
+        </a:gradFill>
+      </a:fillStyleLst>
+      <a:lnStyleLst>
+        <a:ln w="12700" cap="flat" cmpd="sng" algn="ctr">
+          <a:solidFill>
+            <a:schemeClr val="phClr"/>
+          </a:solidFill>
+          <a:prstDash val="solid"/>
+          <a:miter lim="800000"/>
+        </a:ln>
+        <a:ln w="19050" cap="flat" cmpd="sng" algn="ctr">
+          <a:solidFill>
+            <a:schemeClr val="phClr"/>
+          </a:solidFill>
+          <a:prstDash val="solid"/>
+          <a:miter lim="800000"/>
+        </a:ln>
+        <a:ln w="25400" cap="flat" cmpd="sng" algn="ctr">
+          <a:solidFill>
+            <a:schemeClr val="phClr"/>
+          </a:solidFill>
+          <a:prstDash val="solid"/>
+          <a:miter lim="800000"/>
+        </a:ln>
+      </a:lnStyleLst>
+      <a:effectStyleLst>
+        <a:effectStyle>
+          <a:effectLst/>
+        </a:effectStyle>
+        <a:effectStyle>
+          <a:effectLst/>
+        </a:effectStyle>
+        <a:effectStyle>
+          <a:effectLst>
+            <a:outerShdw blurRad="57150" dist="19050" dir="5400000" algn="ctr" rotWithShape="0">
+              <a:srgbClr val="000000">
+                <a:alpha val="63000"/>
+              </a:srgbClr>
+            </a:outerShdw>
+          </a:effectLst>
+        </a:effectStyle>
+      </a:effectStyleLst>
+      <a:bgFillStyleLst>
+        <a:solidFill>
+          <a:schemeClr val="phClr"/>
+        </a:solidFill>
+        <a:solidFill>
+          <a:schemeClr val="phClr">
+            <a:tint val="95000"/>
+            <a:satMod val="170000"/>
+          </a:schemeClr>
+        </a:solidFill>
+        <a:gradFill rotWithShape="1">
+          <a:gsLst>
+            <a:gs pos="0">
+              <a:schemeClr val="phClr">
+                <a:tint val="93000"/>
+                <a:satMod val="150000"/>
+                <a:shade val="98000"/>
+                <a:lumMod val="102000"/>
+              </a:schemeClr>
+            </a:gs>
+            <a:gs pos="50000">
+              <a:schemeClr val="phClr">
+                <a:tint val="98000"/>
+                <a:satMod val="130000"/>
+                <a:shade val="90000"/>
+                <a:lumMod val="103000"/>
+              </a:schemeClr>
+            </a:gs>
+            <a:gs pos="100000">
+              <a:schemeClr val="phClr">
+                <a:shade val="63000"/>
+                <a:satMod val="120000"/>
+              </a:schemeClr>
+            </a:gs>
+          </a:gsLst>
+          <a:lin ang="5400000" scaled="0"/>
+        </a:gradFill>
+      </a:bgFillStyleLst>
+    </a:fmtScheme>
+  </a:themeElements>
+  <a:objectDefaults>
+    <a:lnDef>
+      <a:spPr/>
+      <a:bodyPr/>
+      <a:lstStyle/>
+      <a:style>
+        <a:lnRef idx="2">
+          <a:schemeClr val="accent1"/>
+        </a:lnRef>
+        <a:fillRef idx="0">
+          <a:schemeClr val="accent1"/>
+        </a:fillRef>
+        <a:effectRef idx="1">
+          <a:schemeClr val="accent1"/>
+        </a:effectRef>
+        <a:fontRef idx="minor">
+          <a:schemeClr val="tx1"/>
+        </a:fontRef>
+      </a:style>
+    </a:lnDef>
+  </a:objectDefaults>
+  <a:extraClrSchemeLst/>
+  <a:extLst>
+    <a:ext uri="{05A4C25C-085E-4340-85A3-A5531E510DB2}">
+      <thm15:themeFamily xmlns:thm15="http://schemas.microsoft.com/office/thememl/2012/main" name="Office Theme" id="{2E142A2C-CD16-42D6-873A-C26D2A0506FA}" vid="{1BDDFF52-6CD6-40A5-AB3C-68EB2F1E4D0A}"/>
+    </a:ext>
+  </a:extLst>
+</a:theme>
 </file>
</xml_diff>

<commit_message>
Updated slides after DT discussion on the 240223
</commit_message>
<xml_diff>
--- a/dtls-for-sctp-design-team-report.pptx
+++ b/dtls-for-sctp-design-team-report.pptx
@@ -3854,8 +3854,8 @@
           <a:lstStyle/>
           <a:p>
             <a:r>
-              <a:rPr lang="en-US"/>
-              <a:t>2024-02-02</a:t>
+              <a:rPr lang="en-US" dirty="0"/>
+              <a:t>2024-02-23</a:t>
             </a:r>
           </a:p>
         </p:txBody>
@@ -4017,7 +4017,7 @@
             </a:r>
             <a:r>
               <a:rPr lang="en-US" dirty="0"/>
-              <a:t>)</a:t>
+              <a:t>) (Optional improvement for large MTUs)</a:t>
             </a:r>
           </a:p>
           <a:p>
@@ -4463,14 +4463,14 @@
             <p:ph idx="1"/>
             <p:extLst>
               <p:ext uri="{D42A27DB-BD31-4B8C-83A1-F6EECF244321}">
-                <p14:modId xmlns:p14="http://schemas.microsoft.com/office/powerpoint/2010/main" val="1514431243"/>
+                <p14:modId xmlns:p14="http://schemas.microsoft.com/office/powerpoint/2010/main" val="3420668380"/>
               </p:ext>
             </p:extLst>
           </p:nvPr>
         </p:nvGraphicFramePr>
         <p:xfrm>
           <a:off x="255494" y="293635"/>
-          <a:ext cx="11681012" cy="6270730"/>
+          <a:ext cx="11681012" cy="6052558"/>
         </p:xfrm>
         <a:graphic>
           <a:graphicData uri="http://schemas.openxmlformats.org/drawingml/2006/table">
@@ -4507,14 +4507,14 @@
                     </a:ext>
                   </a:extLst>
                 </a:gridCol>
-                <a:gridCol w="1258957">
+                <a:gridCol w="1478678">
                   <a:extLst>
                     <a:ext uri="{9D8B030D-6E8A-4147-A177-3AD203B41FA5}">
                       <a16:colId xmlns:a16="http://schemas.microsoft.com/office/drawing/2014/main" val="2134915857"/>
                     </a:ext>
                   </a:extLst>
                 </a:gridCol>
-                <a:gridCol w="3176819">
+                <a:gridCol w="2957098">
                   <a:extLst>
                     <a:ext uri="{9D8B030D-6E8A-4147-A177-3AD203B41FA5}">
                       <a16:colId xmlns:a16="http://schemas.microsoft.com/office/drawing/2014/main" val="648747510"/>
@@ -4559,11 +4559,11 @@
                       <a:pPr algn="ctr"/>
                       <a:r>
                         <a:rPr lang="en-US" dirty="0"/>
-                        <a:t>WG involved</a:t>
+                        <a:t>WGs involved</a:t>
                       </a:r>
                     </a:p>
                   </a:txBody>
-                  <a:tcPr/>
+                  <a:tcPr marL="72000" marR="72000"/>
                 </a:tc>
                 <a:tc>
                   <a:txBody>
@@ -4732,7 +4732,7 @@
                     <a:p>
                       <a:r>
                         <a:rPr lang="en-US" dirty="0"/>
-                        <a:t>TDB- IPR impact</a:t>
+                        <a:t>No IPR claim on SCTP part</a:t>
                       </a:r>
                     </a:p>
                     <a:p>
@@ -4868,10 +4868,18 @@
                       <a:r>
                         <a:rPr lang="en-US" dirty="0">
                           <a:solidFill>
+                            <a:schemeClr val="tx1"/>
+                          </a:solidFill>
+                        </a:rPr>
+                        <a:t>Defensive +</a:t>
+                      </a:r>
+                      <a:r>
+                        <a:rPr lang="en-US" dirty="0">
+                          <a:solidFill>
                             <a:srgbClr val="FF0000"/>
                           </a:solidFill>
                         </a:rPr>
-                        <a:t>Defensive + </a:t>
+                        <a:t> </a:t>
                       </a:r>
                       <a:r>
                         <a:rPr lang="en-US" dirty="0"/>
@@ -4921,7 +4929,7 @@
                     <a:p>
                       <a:r>
                         <a:rPr lang="en-US" dirty="0"/>
-                        <a:t>TDB –IPR impact</a:t>
+                        <a:t>1 Defensive IPR on SCTP part</a:t>
                       </a:r>
                     </a:p>
                     <a:p>
@@ -5222,29 +5230,28 @@
                     <a:p>
                       <a:r>
                         <a:rPr lang="en-US" dirty="0"/>
-                        <a:t>No Implementation obstacles.</a:t>
+                        <a:t>Full solution can be implemented license free.</a:t>
                       </a:r>
                     </a:p>
                     <a:p>
                       <a:r>
                         <a:rPr lang="en-US" dirty="0"/>
-                        <a:t>Should be available in opensource SCTP implementations.</a:t>
+                        <a:t>Same split as A between SCTP stack and SSL/</a:t>
                       </a:r>
-                    </a:p>
-                    <a:p>
                       <a:r>
-                        <a:rPr lang="en-US" dirty="0"/>
-                        <a:t>No changes to current split between SCTP stack and SSL/TLS libraries</a:t>
+                        <a:rPr lang="en-US"/>
+                        <a:t>TLS libraries.</a:t>
                       </a:r>
+                      <a:endParaRPr lang="en-US" dirty="0"/>
                     </a:p>
                     <a:p>
                       <a:r>
                         <a:rPr lang="en-US" dirty="0">
                           <a:solidFill>
-                            <a:srgbClr val="FF0000"/>
+                            <a:schemeClr val="tx1"/>
                           </a:solidFill>
                         </a:rPr>
-                        <a:t>Does not support partial reliability</a:t>
+                        <a:t>Does not support partial reliability over 16384 bytes</a:t>
                       </a:r>
                     </a:p>
                   </a:txBody>
@@ -6237,7 +6244,7 @@
         <p:spPr/>
         <p:txBody>
           <a:bodyPr>
-            <a:normAutofit fontScale="92500" lnSpcReduction="20000"/>
+            <a:normAutofit fontScale="85000" lnSpcReduction="20000"/>
           </a:bodyPr>
           <a:lstStyle/>
           <a:p>
@@ -6306,6 +6313,13 @@
             <a:r>
               <a:rPr lang="en-US" dirty="0"/>
               <a:t>Dependent on adopting one technical function (key-update) into TLS WG</a:t>
+            </a:r>
+          </a:p>
+          <a:p>
+            <a:pPr lvl="2"/>
+            <a:r>
+              <a:rPr lang="en-US" dirty="0"/>
+              <a:t>Key-update has general use not only for DTLS for SCTP</a:t>
             </a:r>
           </a:p>
           <a:p>
@@ -6677,6 +6691,25 @@
               </a:rPr>
               <a:t>-handshake: </a:t>
             </a:r>
+            <a:endParaRPr lang="en-GB" dirty="0">
+              <a:solidFill>
+                <a:srgbClr val="212529"/>
+              </a:solidFill>
+              <a:latin typeface="Inter"/>
+            </a:endParaRPr>
+          </a:p>
+          <a:p>
+            <a:pPr lvl="2"/>
+            <a:r>
+              <a:rPr lang="en-GB" b="0" i="0" u="none" strike="noStrike" dirty="0">
+                <a:solidFill>
+                  <a:srgbClr val="212529"/>
+                </a:solidFill>
+                <a:effectLst/>
+                <a:latin typeface="Inter"/>
+              </a:rPr>
+              <a:t>RAND license: </a:t>
+            </a:r>
             <a:r>
               <a:rPr lang="en-GB" b="0" i="0" u="none" strike="noStrike" dirty="0">
                 <a:solidFill>
@@ -6801,7 +6834,7 @@
             </a:pPr>
             <a:r>
               <a:rPr lang="en-US" dirty="0"/>
-              <a:t>Two RAND license applying to implementation on top of a SCTP stack</a:t>
+              <a:t>Two RAND license applying to implementation on top of a SCTP stack of DTLS for SCTP</a:t>
             </a:r>
           </a:p>
           <a:p>
@@ -6817,17 +6850,17 @@
           <a:p>
             <a:pPr marL="971550" lvl="1" indent="-514350">
               <a:buFont typeface="+mj-lt"/>
-              <a:buAutoNum type="alphaUcPeriod"/>
+              <a:buAutoNum type="arabicParenR"/>
             </a:pPr>
             <a:r>
               <a:rPr lang="en-US" dirty="0"/>
-              <a:t>Defensive Declaration with option of RAND on implementation that ends up inside SCTP stack attempting to not impact kernel open source</a:t>
+              <a:t>Defensive Declaration with option of RAND on implementation that ends up inside SCTP stack, the license is attempting to not impact kernel open source</a:t>
             </a:r>
           </a:p>
           <a:p>
             <a:pPr marL="971550" lvl="1" indent="-514350">
               <a:buFont typeface="+mj-lt"/>
-              <a:buAutoNum type="alphaUcPeriod"/>
+              <a:buAutoNum type="arabicParenR"/>
             </a:pPr>
             <a:r>
               <a:rPr lang="en-US" dirty="0"/>

</xml_diff>

<commit_message>
Result of reivew and discussion on the 8th of March.
</commit_message>
<xml_diff>
--- a/dtls-for-sctp-design-team-report.pptx
+++ b/dtls-for-sctp-design-team-report.pptx
@@ -5,7 +5,7 @@
     <p:sldMasterId id="2147483648" r:id="rId1"/>
   </p:sldMasterIdLst>
   <p:notesMasterIdLst>
-    <p:notesMasterId r:id="rId16"/>
+    <p:notesMasterId r:id="rId17"/>
   </p:notesMasterIdLst>
   <p:sldIdLst>
     <p:sldId id="258" r:id="rId2"/>
@@ -21,7 +21,8 @@
     <p:sldId id="267" r:id="rId12"/>
     <p:sldId id="269" r:id="rId13"/>
     <p:sldId id="271" r:id="rId14"/>
-    <p:sldId id="272" r:id="rId15"/>
+    <p:sldId id="273" r:id="rId15"/>
+    <p:sldId id="272" r:id="rId16"/>
   </p:sldIdLst>
   <p:sldSz cx="12192000" cy="6858000"/>
   <p:notesSz cx="6858000" cy="9144000"/>
@@ -210,7 +211,7 @@
           <a:p>
             <a:fld id="{C9923096-100F-074F-9CA1-3F642340D143}" type="datetimeFigureOut">
               <a:rPr lang="en-US" smtClean="0"/>
-              <a:t>2/23/24</a:t>
+              <a:t>3/8/24</a:t>
             </a:fld>
             <a:endParaRPr lang="en-US"/>
           </a:p>
@@ -711,7 +712,7 @@
           <a:p>
             <a:fld id="{F590127B-264E-4C46-AF4D-D678C54EFD2B}" type="datetimeFigureOut">
               <a:rPr lang="en-US" smtClean="0"/>
-              <a:t>2/23/24</a:t>
+              <a:t>3/8/24</a:t>
             </a:fld>
             <a:endParaRPr lang="en-US"/>
           </a:p>
@@ -911,7 +912,7 @@
           <a:p>
             <a:fld id="{F590127B-264E-4C46-AF4D-D678C54EFD2B}" type="datetimeFigureOut">
               <a:rPr lang="en-US" smtClean="0"/>
-              <a:t>2/23/24</a:t>
+              <a:t>3/8/24</a:t>
             </a:fld>
             <a:endParaRPr lang="en-US"/>
           </a:p>
@@ -1121,7 +1122,7 @@
           <a:p>
             <a:fld id="{F590127B-264E-4C46-AF4D-D678C54EFD2B}" type="datetimeFigureOut">
               <a:rPr lang="en-US" smtClean="0"/>
-              <a:t>2/23/24</a:t>
+              <a:t>3/8/24</a:t>
             </a:fld>
             <a:endParaRPr lang="en-US"/>
           </a:p>
@@ -1321,7 +1322,7 @@
           <a:p>
             <a:fld id="{F590127B-264E-4C46-AF4D-D678C54EFD2B}" type="datetimeFigureOut">
               <a:rPr lang="en-US" smtClean="0"/>
-              <a:t>2/23/24</a:t>
+              <a:t>3/8/24</a:t>
             </a:fld>
             <a:endParaRPr lang="en-US"/>
           </a:p>
@@ -1597,7 +1598,7 @@
           <a:p>
             <a:fld id="{F590127B-264E-4C46-AF4D-D678C54EFD2B}" type="datetimeFigureOut">
               <a:rPr lang="en-US" smtClean="0"/>
-              <a:t>2/23/24</a:t>
+              <a:t>3/8/24</a:t>
             </a:fld>
             <a:endParaRPr lang="en-US"/>
           </a:p>
@@ -1865,7 +1866,7 @@
           <a:p>
             <a:fld id="{F590127B-264E-4C46-AF4D-D678C54EFD2B}" type="datetimeFigureOut">
               <a:rPr lang="en-US" smtClean="0"/>
-              <a:t>2/23/24</a:t>
+              <a:t>3/8/24</a:t>
             </a:fld>
             <a:endParaRPr lang="en-US"/>
           </a:p>
@@ -2280,7 +2281,7 @@
           <a:p>
             <a:fld id="{F590127B-264E-4C46-AF4D-D678C54EFD2B}" type="datetimeFigureOut">
               <a:rPr lang="en-US" smtClean="0"/>
-              <a:t>2/23/24</a:t>
+              <a:t>3/8/24</a:t>
             </a:fld>
             <a:endParaRPr lang="en-US"/>
           </a:p>
@@ -2422,7 +2423,7 @@
           <a:p>
             <a:fld id="{F590127B-264E-4C46-AF4D-D678C54EFD2B}" type="datetimeFigureOut">
               <a:rPr lang="en-US" smtClean="0"/>
-              <a:t>2/23/24</a:t>
+              <a:t>3/8/24</a:t>
             </a:fld>
             <a:endParaRPr lang="en-US"/>
           </a:p>
@@ -2535,7 +2536,7 @@
           <a:p>
             <a:fld id="{F590127B-264E-4C46-AF4D-D678C54EFD2B}" type="datetimeFigureOut">
               <a:rPr lang="en-US" smtClean="0"/>
-              <a:t>2/23/24</a:t>
+              <a:t>3/8/24</a:t>
             </a:fld>
             <a:endParaRPr lang="en-US"/>
           </a:p>
@@ -2848,7 +2849,7 @@
           <a:p>
             <a:fld id="{F590127B-264E-4C46-AF4D-D678C54EFD2B}" type="datetimeFigureOut">
               <a:rPr lang="en-US" smtClean="0"/>
-              <a:t>2/23/24</a:t>
+              <a:t>3/8/24</a:t>
             </a:fld>
             <a:endParaRPr lang="en-US"/>
           </a:p>
@@ -3137,7 +3138,7 @@
           <a:p>
             <a:fld id="{F590127B-264E-4C46-AF4D-D678C54EFD2B}" type="datetimeFigureOut">
               <a:rPr lang="en-US" smtClean="0"/>
-              <a:t>2/23/24</a:t>
+              <a:t>3/8/24</a:t>
             </a:fld>
             <a:endParaRPr lang="en-US"/>
           </a:p>
@@ -3380,7 +3381,7 @@
           <a:p>
             <a:fld id="{F590127B-264E-4C46-AF4D-D678C54EFD2B}" type="datetimeFigureOut">
               <a:rPr lang="en-US" smtClean="0"/>
-              <a:t>2/23/24</a:t>
+              <a:t>3/8/24</a:t>
             </a:fld>
             <a:endParaRPr lang="en-US"/>
           </a:p>
@@ -5302,7 +5303,7 @@
           <p:cNvPr id="2" name="Title 1">
             <a:extLst>
               <a:ext uri="{FF2B5EF4-FFF2-40B4-BE49-F238E27FC236}">
-                <a16:creationId xmlns:a16="http://schemas.microsoft.com/office/drawing/2014/main" id="{3BE4773F-F8CE-4962-F632-B98EE92C957E}"/>
+                <a16:creationId xmlns:a16="http://schemas.microsoft.com/office/drawing/2014/main" id="{C5E803F8-DDED-A707-EBF0-74EA15C62EBC}"/>
               </a:ext>
             </a:extLst>
           </p:cNvPr>
@@ -5320,25 +5321,530 @@
           <a:p>
             <a:r>
               <a:rPr lang="en-US" dirty="0"/>
-              <a:t>WG Question</a:t>
-            </a:r>
-          </a:p>
-        </p:txBody>
-      </p:sp>
-      <p:sp>
-        <p:nvSpPr>
-          <p:cNvPr id="3" name="Content Placeholder 2">
-            <a:extLst>
-              <a:ext uri="{FF2B5EF4-FFF2-40B4-BE49-F238E27FC236}">
-                <a16:creationId xmlns:a16="http://schemas.microsoft.com/office/drawing/2014/main" id="{5F9D3E2F-7FBC-9A5C-EE1D-F9DA827A3C6B}"/>
-              </a:ext>
-            </a:extLst>
-          </p:cNvPr>
-          <p:cNvSpPr>
-            <a:spLocks noGrp="1"/>
-          </p:cNvSpPr>
+              <a:t>Preferences from Participants in Design Team</a:t>
+            </a:r>
+          </a:p>
+        </p:txBody>
+      </p:sp>
+      <p:graphicFrame>
+        <p:nvGraphicFramePr>
+          <p:cNvPr id="4" name="Content Placeholder 3">
+            <a:extLst>
+              <a:ext uri="{FF2B5EF4-FFF2-40B4-BE49-F238E27FC236}">
+                <a16:creationId xmlns:a16="http://schemas.microsoft.com/office/drawing/2014/main" id="{C252CE5F-83E4-E93C-C850-CFC4A56C0C55}"/>
+              </a:ext>
+            </a:extLst>
+          </p:cNvPr>
+          <p:cNvGraphicFramePr>
+            <a:graphicFrameLocks noGrp="1"/>
+          </p:cNvGraphicFramePr>
           <p:nvPr>
             <p:ph idx="1"/>
+            <p:extLst>
+              <p:ext uri="{D42A27DB-BD31-4B8C-83A1-F6EECF244321}">
+                <p14:modId xmlns:p14="http://schemas.microsoft.com/office/powerpoint/2010/main" val="808354743"/>
+              </p:ext>
+            </p:extLst>
+          </p:nvPr>
+        </p:nvGraphicFramePr>
+        <p:xfrm>
+          <a:off x="838200" y="1825625"/>
+          <a:ext cx="10515600" cy="3307080"/>
+        </p:xfrm>
+        <a:graphic>
+          <a:graphicData uri="http://schemas.openxmlformats.org/drawingml/2006/table">
+            <a:tbl>
+              <a:tblPr firstRow="1" bandRow="1">
+                <a:tableStyleId>{5C22544A-7EE6-4342-B048-85BDC9FD1C3A}</a:tableStyleId>
+              </a:tblPr>
+              <a:tblGrid>
+                <a:gridCol w="2103120">
+                  <a:extLst>
+                    <a:ext uri="{9D8B030D-6E8A-4147-A177-3AD203B41FA5}">
+                      <a16:colId xmlns:a16="http://schemas.microsoft.com/office/drawing/2014/main" val="1331471951"/>
+                    </a:ext>
+                  </a:extLst>
+                </a:gridCol>
+                <a:gridCol w="2103120">
+                  <a:extLst>
+                    <a:ext uri="{9D8B030D-6E8A-4147-A177-3AD203B41FA5}">
+                      <a16:colId xmlns:a16="http://schemas.microsoft.com/office/drawing/2014/main" val="2394049863"/>
+                    </a:ext>
+                  </a:extLst>
+                </a:gridCol>
+                <a:gridCol w="2103120">
+                  <a:extLst>
+                    <a:ext uri="{9D8B030D-6E8A-4147-A177-3AD203B41FA5}">
+                      <a16:colId xmlns:a16="http://schemas.microsoft.com/office/drawing/2014/main" val="1604936888"/>
+                    </a:ext>
+                  </a:extLst>
+                </a:gridCol>
+                <a:gridCol w="2103120">
+                  <a:extLst>
+                    <a:ext uri="{9D8B030D-6E8A-4147-A177-3AD203B41FA5}">
+                      <a16:colId xmlns:a16="http://schemas.microsoft.com/office/drawing/2014/main" val="239814760"/>
+                    </a:ext>
+                  </a:extLst>
+                </a:gridCol>
+                <a:gridCol w="2103120">
+                  <a:extLst>
+                    <a:ext uri="{9D8B030D-6E8A-4147-A177-3AD203B41FA5}">
+                      <a16:colId xmlns:a16="http://schemas.microsoft.com/office/drawing/2014/main" val="3673547869"/>
+                    </a:ext>
+                  </a:extLst>
+                </a:gridCol>
+              </a:tblGrid>
+              <a:tr h="370840">
+                <a:tc>
+                  <a:txBody>
+                    <a:bodyPr/>
+                    <a:lstStyle/>
+                    <a:p>
+                      <a:r>
+                        <a:rPr lang="en-US" dirty="0"/>
+                        <a:t>Party</a:t>
+                      </a:r>
+                    </a:p>
+                  </a:txBody>
+                  <a:tcPr/>
+                </a:tc>
+                <a:tc>
+                  <a:txBody>
+                    <a:bodyPr/>
+                    <a:lstStyle/>
+                    <a:p>
+                      <a:r>
+                        <a:rPr lang="en-US" dirty="0"/>
+                        <a:t>Most Preferred</a:t>
+                      </a:r>
+                    </a:p>
+                  </a:txBody>
+                  <a:tcPr/>
+                </a:tc>
+                <a:tc>
+                  <a:txBody>
+                    <a:bodyPr/>
+                    <a:lstStyle/>
+                    <a:p>
+                      <a:endParaRPr lang="en-US" dirty="0"/>
+                    </a:p>
+                  </a:txBody>
+                  <a:tcPr/>
+                </a:tc>
+                <a:tc>
+                  <a:txBody>
+                    <a:bodyPr/>
+                    <a:lstStyle/>
+                    <a:p>
+                      <a:r>
+                        <a:rPr lang="en-US" dirty="0"/>
+                        <a:t>Least Preferred</a:t>
+                      </a:r>
+                    </a:p>
+                  </a:txBody>
+                  <a:tcPr/>
+                </a:tc>
+                <a:tc>
+                  <a:txBody>
+                    <a:bodyPr/>
+                    <a:lstStyle/>
+                    <a:p>
+                      <a:r>
+                        <a:rPr lang="en-US" dirty="0"/>
+                        <a:t>Comments</a:t>
+                      </a:r>
+                    </a:p>
+                  </a:txBody>
+                  <a:tcPr/>
+                </a:tc>
+                <a:extLst>
+                  <a:ext uri="{0D108BD9-81ED-4DB2-BD59-A6C34878D82A}">
+                    <a16:rowId xmlns:a16="http://schemas.microsoft.com/office/drawing/2014/main" val="2341213691"/>
+                  </a:ext>
+                </a:extLst>
+              </a:tr>
+              <a:tr h="370840">
+                <a:tc>
+                  <a:txBody>
+                    <a:bodyPr/>
+                    <a:lstStyle/>
+                    <a:p>
+                      <a:r>
+                        <a:rPr lang="en-US" dirty="0"/>
+                        <a:t>Ericsson Participants</a:t>
+                      </a:r>
+                    </a:p>
+                  </a:txBody>
+                  <a:tcPr/>
+                </a:tc>
+                <a:tc>
+                  <a:txBody>
+                    <a:bodyPr/>
+                    <a:lstStyle/>
+                    <a:p>
+                      <a:r>
+                        <a:rPr lang="en-US" dirty="0"/>
+                        <a:t>B</a:t>
+                      </a:r>
+                    </a:p>
+                  </a:txBody>
+                  <a:tcPr/>
+                </a:tc>
+                <a:tc>
+                  <a:txBody>
+                    <a:bodyPr/>
+                    <a:lstStyle/>
+                    <a:p>
+                      <a:r>
+                        <a:rPr lang="en-US" dirty="0"/>
+                        <a:t>A</a:t>
+                      </a:r>
+                    </a:p>
+                  </a:txBody>
+                  <a:tcPr/>
+                </a:tc>
+                <a:tc>
+                  <a:txBody>
+                    <a:bodyPr/>
+                    <a:lstStyle/>
+                    <a:p>
+                      <a:r>
+                        <a:rPr lang="en-US" dirty="0"/>
+                        <a:t>C</a:t>
+                      </a:r>
+                    </a:p>
+                  </a:txBody>
+                  <a:tcPr/>
+                </a:tc>
+                <a:tc>
+                  <a:txBody>
+                    <a:bodyPr/>
+                    <a:lstStyle/>
+                    <a:p>
+                      <a:r>
+                        <a:rPr lang="en-US" dirty="0"/>
+                        <a:t>C is expected to take too long time</a:t>
+                      </a:r>
+                    </a:p>
+                  </a:txBody>
+                  <a:tcPr/>
+                </a:tc>
+                <a:extLst>
+                  <a:ext uri="{0D108BD9-81ED-4DB2-BD59-A6C34878D82A}">
+                    <a16:rowId xmlns:a16="http://schemas.microsoft.com/office/drawing/2014/main" val="2063903255"/>
+                  </a:ext>
+                </a:extLst>
+              </a:tr>
+              <a:tr h="370840">
+                <a:tc>
+                  <a:txBody>
+                    <a:bodyPr/>
+                    <a:lstStyle/>
+                    <a:p>
+                      <a:r>
+                        <a:rPr lang="en-US" dirty="0"/>
+                        <a:t>Nokia Participants</a:t>
+                      </a:r>
+                    </a:p>
+                  </a:txBody>
+                  <a:tcPr/>
+                </a:tc>
+                <a:tc>
+                  <a:txBody>
+                    <a:bodyPr/>
+                    <a:lstStyle/>
+                    <a:p>
+                      <a:r>
+                        <a:rPr lang="en-US" dirty="0"/>
+                        <a:t>C</a:t>
+                      </a:r>
+                    </a:p>
+                  </a:txBody>
+                  <a:tcPr/>
+                </a:tc>
+                <a:tc>
+                  <a:txBody>
+                    <a:bodyPr/>
+                    <a:lstStyle/>
+                    <a:p>
+                      <a:r>
+                        <a:rPr lang="en-US" dirty="0"/>
+                        <a:t>B</a:t>
+                      </a:r>
+                    </a:p>
+                  </a:txBody>
+                  <a:tcPr/>
+                </a:tc>
+                <a:tc>
+                  <a:txBody>
+                    <a:bodyPr/>
+                    <a:lstStyle/>
+                    <a:p>
+                      <a:r>
+                        <a:rPr lang="en-US" dirty="0"/>
+                        <a:t>A</a:t>
+                      </a:r>
+                    </a:p>
+                  </a:txBody>
+                  <a:tcPr/>
+                </a:tc>
+                <a:tc>
+                  <a:txBody>
+                    <a:bodyPr/>
+                    <a:lstStyle/>
+                    <a:p>
+                      <a:endParaRPr lang="en-US" dirty="0"/>
+                    </a:p>
+                  </a:txBody>
+                  <a:tcPr/>
+                </a:tc>
+                <a:extLst>
+                  <a:ext uri="{0D108BD9-81ED-4DB2-BD59-A6C34878D82A}">
+                    <a16:rowId xmlns:a16="http://schemas.microsoft.com/office/drawing/2014/main" val="217255304"/>
+                  </a:ext>
+                </a:extLst>
+              </a:tr>
+              <a:tr h="370840">
+                <a:tc>
+                  <a:txBody>
+                    <a:bodyPr/>
+                    <a:lstStyle/>
+                    <a:p>
+                      <a:r>
+                        <a:rPr lang="en-US" dirty="0"/>
+                        <a:t>FreeBSD Maintainer</a:t>
+                      </a:r>
+                    </a:p>
+                  </a:txBody>
+                  <a:tcPr/>
+                </a:tc>
+                <a:tc>
+                  <a:txBody>
+                    <a:bodyPr/>
+                    <a:lstStyle/>
+                    <a:p>
+                      <a:r>
+                        <a:rPr lang="en-US" dirty="0"/>
+                        <a:t>C</a:t>
+                      </a:r>
+                    </a:p>
+                  </a:txBody>
+                  <a:tcPr/>
+                </a:tc>
+                <a:tc>
+                  <a:txBody>
+                    <a:bodyPr/>
+                    <a:lstStyle/>
+                    <a:p>
+                      <a:endParaRPr lang="en-US" dirty="0"/>
+                    </a:p>
+                  </a:txBody>
+                  <a:tcPr/>
+                </a:tc>
+                <a:tc>
+                  <a:txBody>
+                    <a:bodyPr/>
+                    <a:lstStyle/>
+                    <a:p>
+                      <a:endParaRPr lang="en-US" dirty="0"/>
+                    </a:p>
+                  </a:txBody>
+                  <a:tcPr/>
+                </a:tc>
+                <a:tc>
+                  <a:txBody>
+                    <a:bodyPr/>
+                    <a:lstStyle/>
+                    <a:p>
+                      <a:r>
+                        <a:rPr lang="en-US" dirty="0"/>
+                        <a:t>Could only implement half of B</a:t>
+                      </a:r>
+                    </a:p>
+                  </a:txBody>
+                  <a:tcPr/>
+                </a:tc>
+                <a:extLst>
+                  <a:ext uri="{0D108BD9-81ED-4DB2-BD59-A6C34878D82A}">
+                    <a16:rowId xmlns:a16="http://schemas.microsoft.com/office/drawing/2014/main" val="3717589033"/>
+                  </a:ext>
+                </a:extLst>
+              </a:tr>
+              <a:tr h="370840">
+                <a:tc>
+                  <a:txBody>
+                    <a:bodyPr/>
+                    <a:lstStyle/>
+                    <a:p>
+                      <a:r>
+                        <a:rPr lang="en-GB" dirty="0"/>
+                        <a:t>Red Hat Linux and upstream SCTP stack maintainer</a:t>
+                      </a:r>
+                      <a:endParaRPr lang="en-US" dirty="0"/>
+                    </a:p>
+                  </a:txBody>
+                  <a:tcPr/>
+                </a:tc>
+                <a:tc>
+                  <a:txBody>
+                    <a:bodyPr/>
+                    <a:lstStyle/>
+                    <a:p>
+                      <a:r>
+                        <a:rPr lang="en-US" dirty="0"/>
+                        <a:t>C</a:t>
+                      </a:r>
+                    </a:p>
+                  </a:txBody>
+                  <a:tcPr/>
+                </a:tc>
+                <a:tc>
+                  <a:txBody>
+                    <a:bodyPr/>
+                    <a:lstStyle/>
+                    <a:p>
+                      <a:endParaRPr lang="en-US" dirty="0"/>
+                    </a:p>
+                  </a:txBody>
+                  <a:tcPr/>
+                </a:tc>
+                <a:tc>
+                  <a:txBody>
+                    <a:bodyPr/>
+                    <a:lstStyle/>
+                    <a:p>
+                      <a:endParaRPr lang="en-US" dirty="0"/>
+                    </a:p>
+                  </a:txBody>
+                  <a:tcPr/>
+                </a:tc>
+                <a:tc>
+                  <a:txBody>
+                    <a:bodyPr/>
+                    <a:lstStyle/>
+                    <a:p>
+                      <a:endParaRPr lang="en-US" dirty="0"/>
+                    </a:p>
+                  </a:txBody>
+                  <a:tcPr/>
+                </a:tc>
+                <a:extLst>
+                  <a:ext uri="{0D108BD9-81ED-4DB2-BD59-A6C34878D82A}">
+                    <a16:rowId xmlns:a16="http://schemas.microsoft.com/office/drawing/2014/main" val="2500447014"/>
+                  </a:ext>
+                </a:extLst>
+              </a:tr>
+              <a:tr h="370840">
+                <a:tc>
+                  <a:txBody>
+                    <a:bodyPr/>
+                    <a:lstStyle/>
+                    <a:p>
+                      <a:r>
+                        <a:rPr lang="en-US" dirty="0"/>
+                        <a:t>TLS Implementer</a:t>
+                      </a:r>
+                    </a:p>
+                  </a:txBody>
+                  <a:tcPr/>
+                </a:tc>
+                <a:tc>
+                  <a:txBody>
+                    <a:bodyPr/>
+                    <a:lstStyle/>
+                    <a:p>
+                      <a:r>
+                        <a:rPr lang="en-US" dirty="0"/>
+                        <a:t>C</a:t>
+                      </a:r>
+                    </a:p>
+                  </a:txBody>
+                  <a:tcPr/>
+                </a:tc>
+                <a:tc>
+                  <a:txBody>
+                    <a:bodyPr/>
+                    <a:lstStyle/>
+                    <a:p>
+                      <a:endParaRPr lang="en-US" dirty="0"/>
+                    </a:p>
+                  </a:txBody>
+                  <a:tcPr/>
+                </a:tc>
+                <a:tc>
+                  <a:txBody>
+                    <a:bodyPr/>
+                    <a:lstStyle/>
+                    <a:p>
+                      <a:endParaRPr lang="en-US" dirty="0"/>
+                    </a:p>
+                  </a:txBody>
+                  <a:tcPr/>
+                </a:tc>
+                <a:tc>
+                  <a:txBody>
+                    <a:bodyPr/>
+                    <a:lstStyle/>
+                    <a:p>
+                      <a:endParaRPr lang="en-US" dirty="0"/>
+                    </a:p>
+                  </a:txBody>
+                  <a:tcPr/>
+                </a:tc>
+                <a:extLst>
+                  <a:ext uri="{0D108BD9-81ED-4DB2-BD59-A6C34878D82A}">
+                    <a16:rowId xmlns:a16="http://schemas.microsoft.com/office/drawing/2014/main" val="2032728778"/>
+                  </a:ext>
+                </a:extLst>
+              </a:tr>
+            </a:tbl>
+          </a:graphicData>
+        </a:graphic>
+      </p:graphicFrame>
+    </p:spTree>
+    <p:extLst>
+      <p:ext uri="{BB962C8B-B14F-4D97-AF65-F5344CB8AC3E}">
+        <p14:creationId xmlns:p14="http://schemas.microsoft.com/office/powerpoint/2010/main" val="2733950167"/>
+      </p:ext>
+    </p:extLst>
+  </p:cSld>
+  <p:clrMapOvr>
+    <a:masterClrMapping/>
+  </p:clrMapOvr>
+</p:sld>
+</file>
+
+<file path=ppt/slides/slide15.xml><?xml version="1.0" encoding="utf-8"?>
+<p:sld xmlns:a="http://schemas.openxmlformats.org/drawingml/2006/main" xmlns:r="http://schemas.openxmlformats.org/officeDocument/2006/relationships" xmlns:p="http://schemas.openxmlformats.org/presentationml/2006/main">
+  <p:cSld>
+    <p:spTree>
+      <p:nvGrpSpPr>
+        <p:cNvPr id="1" name=""/>
+        <p:cNvGrpSpPr/>
+        <p:nvPr/>
+      </p:nvGrpSpPr>
+      <p:grpSpPr>
+        <a:xfrm>
+          <a:off x="0" y="0"/>
+          <a:ext cx="0" cy="0"/>
+          <a:chOff x="0" y="0"/>
+          <a:chExt cx="0" cy="0"/>
+        </a:xfrm>
+      </p:grpSpPr>
+      <p:sp>
+        <p:nvSpPr>
+          <p:cNvPr id="2" name="Title 1">
+            <a:extLst>
+              <a:ext uri="{FF2B5EF4-FFF2-40B4-BE49-F238E27FC236}">
+                <a16:creationId xmlns:a16="http://schemas.microsoft.com/office/drawing/2014/main" id="{3BE4773F-F8CE-4962-F632-B98EE92C957E}"/>
+              </a:ext>
+            </a:extLst>
+          </p:cNvPr>
+          <p:cNvSpPr>
+            <a:spLocks noGrp="1"/>
+          </p:cNvSpPr>
+          <p:nvPr>
+            <p:ph type="title"/>
           </p:nvPr>
         </p:nvSpPr>
         <p:spPr/>
@@ -5346,7 +5852,47 @@
           <a:bodyPr/>
           <a:lstStyle/>
           <a:p>
-            <a:endParaRPr lang="en-US"/>
+            <a:r>
+              <a:rPr lang="en-US" dirty="0"/>
+              <a:t>Conclusions</a:t>
+            </a:r>
+          </a:p>
+        </p:txBody>
+      </p:sp>
+      <p:sp>
+        <p:nvSpPr>
+          <p:cNvPr id="3" name="Content Placeholder 2">
+            <a:extLst>
+              <a:ext uri="{FF2B5EF4-FFF2-40B4-BE49-F238E27FC236}">
+                <a16:creationId xmlns:a16="http://schemas.microsoft.com/office/drawing/2014/main" id="{5F9D3E2F-7FBC-9A5C-EE1D-F9DA827A3C6B}"/>
+              </a:ext>
+            </a:extLst>
+          </p:cNvPr>
+          <p:cNvSpPr>
+            <a:spLocks noGrp="1"/>
+          </p:cNvSpPr>
+          <p:nvPr>
+            <p:ph idx="1"/>
+          </p:nvPr>
+        </p:nvSpPr>
+        <p:spPr/>
+        <p:txBody>
+          <a:bodyPr/>
+          <a:lstStyle/>
+          <a:p>
+            <a:r>
+              <a:rPr lang="en-US" dirty="0"/>
+              <a:t>Does the WG agree that the requirements are acceptable?</a:t>
+            </a:r>
+          </a:p>
+          <a:p>
+            <a:endParaRPr lang="en-US" dirty="0"/>
+          </a:p>
+          <a:p>
+            <a:r>
+              <a:rPr lang="en-US" dirty="0"/>
+              <a:t>Can we close the Design Team?</a:t>
+            </a:r>
           </a:p>
         </p:txBody>
       </p:sp>

</xml_diff>